<commit_message>
Outer Cross Validation correction
</commit_message>
<xml_diff>
--- a/Presentation.pptx
+++ b/Presentation.pptx
@@ -5,7 +5,7 @@
     <p:sldMasterId id="2147483648" r:id="rId1"/>
   </p:sldMasterIdLst>
   <p:notesMasterIdLst>
-    <p:notesMasterId r:id="rId30"/>
+    <p:notesMasterId r:id="rId32"/>
   </p:notesMasterIdLst>
   <p:sldIdLst>
     <p:sldId id="256" r:id="rId2"/>
@@ -19,45 +19,47 @@
     <p:sldId id="288" r:id="rId10"/>
     <p:sldId id="309" r:id="rId11"/>
     <p:sldId id="289" r:id="rId12"/>
-    <p:sldId id="286" r:id="rId13"/>
-    <p:sldId id="280" r:id="rId14"/>
-    <p:sldId id="290" r:id="rId15"/>
-    <p:sldId id="291" r:id="rId16"/>
-    <p:sldId id="294" r:id="rId17"/>
-    <p:sldId id="296" r:id="rId18"/>
-    <p:sldId id="281" r:id="rId19"/>
-    <p:sldId id="295" r:id="rId20"/>
-    <p:sldId id="301" r:id="rId21"/>
-    <p:sldId id="305" r:id="rId22"/>
-    <p:sldId id="298" r:id="rId23"/>
-    <p:sldId id="310" r:id="rId24"/>
-    <p:sldId id="307" r:id="rId25"/>
-    <p:sldId id="283" r:id="rId26"/>
-    <p:sldId id="261" r:id="rId27"/>
-    <p:sldId id="308" r:id="rId28"/>
-    <p:sldId id="276" r:id="rId29"/>
+    <p:sldId id="292" r:id="rId13"/>
+    <p:sldId id="286" r:id="rId14"/>
+    <p:sldId id="280" r:id="rId15"/>
+    <p:sldId id="290" r:id="rId16"/>
+    <p:sldId id="291" r:id="rId17"/>
+    <p:sldId id="294" r:id="rId18"/>
+    <p:sldId id="296" r:id="rId19"/>
+    <p:sldId id="281" r:id="rId20"/>
+    <p:sldId id="295" r:id="rId21"/>
+    <p:sldId id="301" r:id="rId22"/>
+    <p:sldId id="305" r:id="rId23"/>
+    <p:sldId id="298" r:id="rId24"/>
+    <p:sldId id="311" r:id="rId25"/>
+    <p:sldId id="310" r:id="rId26"/>
+    <p:sldId id="307" r:id="rId27"/>
+    <p:sldId id="283" r:id="rId28"/>
+    <p:sldId id="261" r:id="rId29"/>
+    <p:sldId id="308" r:id="rId30"/>
+    <p:sldId id="276" r:id="rId31"/>
   </p:sldIdLst>
   <p:sldSz cx="12192000" cy="6858000"/>
   <p:notesSz cx="6858000" cy="9144000"/>
   <p:embeddedFontLst>
     <p:embeddedFont>
       <p:font typeface="Play" panose="020B0604020202020204" charset="0"/>
-      <p:regular r:id="rId31"/>
-      <p:bold r:id="rId32"/>
+      <p:regular r:id="rId33"/>
+      <p:bold r:id="rId34"/>
     </p:embeddedFont>
     <p:embeddedFont>
       <p:font typeface="Roboto" panose="02000000000000000000" pitchFamily="2" charset="0"/>
-      <p:regular r:id="rId33"/>
-      <p:bold r:id="rId34"/>
-      <p:italic r:id="rId35"/>
-      <p:boldItalic r:id="rId36"/>
+      <p:regular r:id="rId35"/>
+      <p:bold r:id="rId36"/>
+      <p:italic r:id="rId37"/>
+      <p:boldItalic r:id="rId38"/>
     </p:embeddedFont>
     <p:embeddedFont>
       <p:font typeface="Roboto Medium" panose="02000000000000000000" pitchFamily="2" charset="0"/>
-      <p:regular r:id="rId37"/>
-      <p:bold r:id="rId38"/>
-      <p:italic r:id="rId39"/>
-      <p:boldItalic r:id="rId40"/>
+      <p:regular r:id="rId39"/>
+      <p:bold r:id="rId40"/>
+      <p:italic r:id="rId41"/>
+      <p:boldItalic r:id="rId42"/>
     </p:embeddedFont>
   </p:embeddedFontLst>
   <p:defaultTextStyle>
@@ -2077,6 +2079,203 @@
   <p:cSld>
     <p:spTree>
       <p:nvGrpSpPr>
+        <p:cNvPr id="1" name="Shape 214">
+          <a:extLst>
+            <a:ext uri="{FF2B5EF4-FFF2-40B4-BE49-F238E27FC236}">
+              <a16:creationId xmlns:a16="http://schemas.microsoft.com/office/drawing/2014/main" id="{56064262-5F4F-364B-3AEE-D80AFD6A7372}"/>
+            </a:ext>
+          </a:extLst>
+        </p:cNvPr>
+        <p:cNvGrpSpPr/>
+        <p:nvPr/>
+      </p:nvGrpSpPr>
+      <p:grpSpPr>
+        <a:xfrm>
+          <a:off x="0" y="0"/>
+          <a:ext cx="0" cy="0"/>
+          <a:chOff x="0" y="0"/>
+          <a:chExt cx="0" cy="0"/>
+        </a:xfrm>
+      </p:grpSpPr>
+      <p:sp>
+        <p:nvSpPr>
+          <p:cNvPr id="215" name="Google Shape;215;p11:notes">
+            <a:extLst>
+              <a:ext uri="{FF2B5EF4-FFF2-40B4-BE49-F238E27FC236}">
+                <a16:creationId xmlns:a16="http://schemas.microsoft.com/office/drawing/2014/main" id="{45994FE8-9E37-3280-4887-C8F0F634ED53}"/>
+              </a:ext>
+            </a:extLst>
+          </p:cNvPr>
+          <p:cNvSpPr>
+            <a:spLocks noGrp="1" noRot="1" noChangeAspect="1"/>
+          </p:cNvSpPr>
+          <p:nvPr>
+            <p:ph type="sldImg" idx="2"/>
+          </p:nvPr>
+        </p:nvSpPr>
+        <p:spPr>
+          <a:xfrm>
+            <a:off x="685800" y="1143000"/>
+            <a:ext cx="5486400" cy="3086100"/>
+          </a:xfrm>
+          <a:custGeom>
+            <a:avLst/>
+            <a:gdLst/>
+            <a:ahLst/>
+            <a:cxnLst/>
+            <a:rect l="l" t="t" r="r" b="b"/>
+            <a:pathLst>
+              <a:path w="120000" h="120000" extrusionOk="0">
+                <a:moveTo>
+                  <a:pt x="0" y="0"/>
+                </a:moveTo>
+                <a:lnTo>
+                  <a:pt x="120000" y="0"/>
+                </a:lnTo>
+                <a:lnTo>
+                  <a:pt x="120000" y="120000"/>
+                </a:lnTo>
+                <a:lnTo>
+                  <a:pt x="0" y="120000"/>
+                </a:lnTo>
+                <a:close/>
+              </a:path>
+            </a:pathLst>
+          </a:custGeom>
+          <a:noFill/>
+          <a:ln w="12700" cap="flat" cmpd="sng">
+            <a:solidFill>
+              <a:srgbClr val="000000"/>
+            </a:solidFill>
+            <a:prstDash val="solid"/>
+            <a:round/>
+            <a:headEnd type="none" w="sm" len="sm"/>
+            <a:tailEnd type="none" w="sm" len="sm"/>
+          </a:ln>
+        </p:spPr>
+      </p:sp>
+      <p:sp>
+        <p:nvSpPr>
+          <p:cNvPr id="216" name="Google Shape;216;p11:notes">
+            <a:extLst>
+              <a:ext uri="{FF2B5EF4-FFF2-40B4-BE49-F238E27FC236}">
+                <a16:creationId xmlns:a16="http://schemas.microsoft.com/office/drawing/2014/main" id="{98B453D2-1716-835A-0A04-2C8BB1A68B73}"/>
+              </a:ext>
+            </a:extLst>
+          </p:cNvPr>
+          <p:cNvSpPr txBox="1">
+            <a:spLocks noGrp="1"/>
+          </p:cNvSpPr>
+          <p:nvPr>
+            <p:ph type="body" idx="1"/>
+          </p:nvPr>
+        </p:nvSpPr>
+        <p:spPr>
+          <a:xfrm>
+            <a:off x="685800" y="4400550"/>
+            <a:ext cx="5486400" cy="3600450"/>
+          </a:xfrm>
+          <a:prstGeom prst="rect">
+            <a:avLst/>
+          </a:prstGeom>
+          <a:noFill/>
+          <a:ln>
+            <a:noFill/>
+          </a:ln>
+        </p:spPr>
+        <p:txBody>
+          <a:bodyPr spcFirstLastPara="1" wrap="square" lIns="91425" tIns="45700" rIns="91425" bIns="45700" anchor="t" anchorCtr="0">
+            <a:noAutofit/>
+          </a:bodyPr>
+          <a:lstStyle/>
+          <a:p>
+            <a:pPr marL="0" lvl="0" indent="0" algn="l" rtl="0">
+              <a:spcBef>
+                <a:spcPts val="0"/>
+              </a:spcBef>
+              <a:spcAft>
+                <a:spcPts val="0"/>
+              </a:spcAft>
+              <a:buNone/>
+            </a:pPr>
+            <a:endParaRPr u="none" dirty="0">
+              <a:solidFill>
+                <a:schemeClr val="accent1"/>
+              </a:solidFill>
+            </a:endParaRPr>
+          </a:p>
+        </p:txBody>
+      </p:sp>
+      <p:sp>
+        <p:nvSpPr>
+          <p:cNvPr id="217" name="Google Shape;217;p11:notes">
+            <a:extLst>
+              <a:ext uri="{FF2B5EF4-FFF2-40B4-BE49-F238E27FC236}">
+                <a16:creationId xmlns:a16="http://schemas.microsoft.com/office/drawing/2014/main" id="{B8D850B6-9ED9-A5C6-21A2-CA7267345770}"/>
+              </a:ext>
+            </a:extLst>
+          </p:cNvPr>
+          <p:cNvSpPr txBox="1">
+            <a:spLocks noGrp="1"/>
+          </p:cNvSpPr>
+          <p:nvPr>
+            <p:ph type="sldNum" idx="12"/>
+          </p:nvPr>
+        </p:nvSpPr>
+        <p:spPr>
+          <a:xfrm>
+            <a:off x="3884613" y="8685213"/>
+            <a:ext cx="2971800" cy="458787"/>
+          </a:xfrm>
+          <a:prstGeom prst="rect">
+            <a:avLst/>
+          </a:prstGeom>
+          <a:noFill/>
+          <a:ln>
+            <a:noFill/>
+          </a:ln>
+        </p:spPr>
+        <p:txBody>
+          <a:bodyPr spcFirstLastPara="1" wrap="square" lIns="91425" tIns="45700" rIns="91425" bIns="45700" anchor="b" anchorCtr="0">
+            <a:noAutofit/>
+          </a:bodyPr>
+          <a:lstStyle/>
+          <a:p>
+            <a:pPr marL="0" lvl="0" indent="0" algn="r" rtl="0">
+              <a:spcBef>
+                <a:spcPts val="0"/>
+              </a:spcBef>
+              <a:spcAft>
+                <a:spcPts val="0"/>
+              </a:spcAft>
+              <a:buNone/>
+            </a:pPr>
+            <a:fld id="{00000000-1234-1234-1234-123412341234}" type="slidenum">
+              <a:rPr lang="en-US"/>
+              <a:t>12</a:t>
+            </a:fld>
+            <a:endParaRPr dirty="0"/>
+          </a:p>
+        </p:txBody>
+      </p:sp>
+    </p:spTree>
+    <p:extLst>
+      <p:ext uri="{BB962C8B-B14F-4D97-AF65-F5344CB8AC3E}">
+        <p14:creationId xmlns:p14="http://schemas.microsoft.com/office/powerpoint/2010/main" val="4250899482"/>
+      </p:ext>
+    </p:extLst>
+  </p:cSld>
+  <p:clrMapOvr>
+    <a:masterClrMapping/>
+  </p:clrMapOvr>
+</p:notes>
+</file>
+
+<file path=ppt/notesSlides/notesSlide13.xml><?xml version="1.0" encoding="utf-8"?>
+<p:notes xmlns:a="http://schemas.openxmlformats.org/drawingml/2006/main" xmlns:r="http://schemas.openxmlformats.org/officeDocument/2006/relationships" xmlns:p="http://schemas.openxmlformats.org/presentationml/2006/main" showMasterSp="0" showMasterPhAnim="0">
+  <p:cSld>
+    <p:spTree>
+      <p:nvGrpSpPr>
         <p:cNvPr id="1" name="Shape 254">
           <a:extLst>
             <a:ext uri="{FF2B5EF4-FFF2-40B4-BE49-F238E27FC236}">
@@ -2250,7 +2449,7 @@
             </a:pPr>
             <a:fld id="{00000000-1234-1234-1234-123412341234}" type="slidenum">
               <a:rPr lang="en-US"/>
-              <a:t>12</a:t>
+              <a:t>13</a:t>
             </a:fld>
             <a:endParaRPr dirty="0"/>
           </a:p>
@@ -2269,7 +2468,7 @@
 </p:notes>
 </file>
 
-<file path=ppt/notesSlides/notesSlide13.xml><?xml version="1.0" encoding="utf-8"?>
+<file path=ppt/notesSlides/notesSlide14.xml><?xml version="1.0" encoding="utf-8"?>
 <p:notes xmlns:a="http://schemas.openxmlformats.org/drawingml/2006/main" xmlns:r="http://schemas.openxmlformats.org/officeDocument/2006/relationships" xmlns:p="http://schemas.openxmlformats.org/presentationml/2006/main" showMasterSp="0" showMasterPhAnim="0">
   <p:cSld>
     <p:spTree>
@@ -2447,7 +2646,7 @@
             </a:pPr>
             <a:fld id="{00000000-1234-1234-1234-123412341234}" type="slidenum">
               <a:rPr lang="en-US"/>
-              <a:t>13</a:t>
+              <a:t>14</a:t>
             </a:fld>
             <a:endParaRPr dirty="0"/>
           </a:p>
@@ -2466,7 +2665,7 @@
 </p:notes>
 </file>
 
-<file path=ppt/notesSlides/notesSlide14.xml><?xml version="1.0" encoding="utf-8"?>
+<file path=ppt/notesSlides/notesSlide15.xml><?xml version="1.0" encoding="utf-8"?>
 <p:notes xmlns:a="http://schemas.openxmlformats.org/drawingml/2006/main" xmlns:r="http://schemas.openxmlformats.org/officeDocument/2006/relationships" xmlns:p="http://schemas.openxmlformats.org/presentationml/2006/main" showMasterSp="0" showMasterPhAnim="0">
   <p:cSld>
     <p:spTree>
@@ -2640,7 +2839,7 @@
             </a:pPr>
             <a:fld id="{00000000-1234-1234-1234-123412341234}" type="slidenum">
               <a:rPr lang="en-US"/>
-              <a:t>14</a:t>
+              <a:t>15</a:t>
             </a:fld>
             <a:endParaRPr dirty="0"/>
           </a:p>
@@ -2659,7 +2858,7 @@
 </p:notes>
 </file>
 
-<file path=ppt/notesSlides/notesSlide15.xml><?xml version="1.0" encoding="utf-8"?>
+<file path=ppt/notesSlides/notesSlide16.xml><?xml version="1.0" encoding="utf-8"?>
 <p:notes xmlns:a="http://schemas.openxmlformats.org/drawingml/2006/main" xmlns:r="http://schemas.openxmlformats.org/officeDocument/2006/relationships" xmlns:p="http://schemas.openxmlformats.org/presentationml/2006/main" showMasterSp="0" showMasterPhAnim="0">
   <p:cSld>
     <p:spTree>
@@ -2837,7 +3036,7 @@
             </a:pPr>
             <a:fld id="{00000000-1234-1234-1234-123412341234}" type="slidenum">
               <a:rPr lang="en-US"/>
-              <a:t>15</a:t>
+              <a:t>16</a:t>
             </a:fld>
             <a:endParaRPr dirty="0"/>
           </a:p>
@@ -2856,7 +3055,7 @@
 </p:notes>
 </file>
 
-<file path=ppt/notesSlides/notesSlide16.xml><?xml version="1.0" encoding="utf-8"?>
+<file path=ppt/notesSlides/notesSlide17.xml><?xml version="1.0" encoding="utf-8"?>
 <p:notes xmlns:a="http://schemas.openxmlformats.org/drawingml/2006/main" xmlns:r="http://schemas.openxmlformats.org/officeDocument/2006/relationships" xmlns:p="http://schemas.openxmlformats.org/presentationml/2006/main" showMasterSp="0" showMasterPhAnim="0">
   <p:cSld>
     <p:spTree>
@@ -3034,7 +3233,7 @@
             </a:pPr>
             <a:fld id="{00000000-1234-1234-1234-123412341234}" type="slidenum">
               <a:rPr lang="en-US"/>
-              <a:t>16</a:t>
+              <a:t>17</a:t>
             </a:fld>
             <a:endParaRPr dirty="0"/>
           </a:p>
@@ -3053,7 +3252,7 @@
 </p:notes>
 </file>
 
-<file path=ppt/notesSlides/notesSlide17.xml><?xml version="1.0" encoding="utf-8"?>
+<file path=ppt/notesSlides/notesSlide18.xml><?xml version="1.0" encoding="utf-8"?>
 <p:notes xmlns:a="http://schemas.openxmlformats.org/drawingml/2006/main" xmlns:r="http://schemas.openxmlformats.org/officeDocument/2006/relationships" xmlns:p="http://schemas.openxmlformats.org/presentationml/2006/main" showMasterSp="0" showMasterPhAnim="0">
   <p:cSld>
     <p:spTree>
@@ -3231,7 +3430,7 @@
             </a:pPr>
             <a:fld id="{00000000-1234-1234-1234-123412341234}" type="slidenum">
               <a:rPr lang="en-US"/>
-              <a:t>17</a:t>
+              <a:t>18</a:t>
             </a:fld>
             <a:endParaRPr dirty="0"/>
           </a:p>
@@ -3250,7 +3449,7 @@
 </p:notes>
 </file>
 
-<file path=ppt/notesSlides/notesSlide18.xml><?xml version="1.0" encoding="utf-8"?>
+<file path=ppt/notesSlides/notesSlide19.xml><?xml version="1.0" encoding="utf-8"?>
 <p:notes xmlns:a="http://schemas.openxmlformats.org/drawingml/2006/main" xmlns:r="http://schemas.openxmlformats.org/officeDocument/2006/relationships" xmlns:p="http://schemas.openxmlformats.org/presentationml/2006/main" showMasterSp="0" showMasterPhAnim="0">
   <p:cSld>
     <p:spTree>
@@ -3428,7 +3627,7 @@
             </a:pPr>
             <a:fld id="{00000000-1234-1234-1234-123412341234}" type="slidenum">
               <a:rPr lang="en-US"/>
-              <a:t>18</a:t>
+              <a:t>19</a:t>
             </a:fld>
             <a:endParaRPr dirty="0"/>
           </a:p>
@@ -3447,7 +3646,175 @@
 </p:notes>
 </file>
 
-<file path=ppt/notesSlides/notesSlide19.xml><?xml version="1.0" encoding="utf-8"?>
+<file path=ppt/notesSlides/notesSlide2.xml><?xml version="1.0" encoding="utf-8"?>
+<p:notes xmlns:a="http://schemas.openxmlformats.org/drawingml/2006/main" xmlns:r="http://schemas.openxmlformats.org/officeDocument/2006/relationships" xmlns:p="http://schemas.openxmlformats.org/presentationml/2006/main" showMasterSp="0" showMasterPhAnim="0">
+  <p:cSld>
+    <p:spTree>
+      <p:nvGrpSpPr>
+        <p:cNvPr id="1" name="Shape 115"/>
+        <p:cNvGrpSpPr/>
+        <p:nvPr/>
+      </p:nvGrpSpPr>
+      <p:grpSpPr>
+        <a:xfrm>
+          <a:off x="0" y="0"/>
+          <a:ext cx="0" cy="0"/>
+          <a:chOff x="0" y="0"/>
+          <a:chExt cx="0" cy="0"/>
+        </a:xfrm>
+      </p:grpSpPr>
+      <p:sp>
+        <p:nvSpPr>
+          <p:cNvPr id="116" name="Google Shape;116;p3:notes"/>
+          <p:cNvSpPr>
+            <a:spLocks noGrp="1" noRot="1" noChangeAspect="1"/>
+          </p:cNvSpPr>
+          <p:nvPr>
+            <p:ph type="sldImg" idx="2"/>
+          </p:nvPr>
+        </p:nvSpPr>
+        <p:spPr>
+          <a:xfrm>
+            <a:off x="685800" y="1143000"/>
+            <a:ext cx="5486400" cy="3086100"/>
+          </a:xfrm>
+          <a:custGeom>
+            <a:avLst/>
+            <a:gdLst/>
+            <a:ahLst/>
+            <a:cxnLst/>
+            <a:rect l="l" t="t" r="r" b="b"/>
+            <a:pathLst>
+              <a:path w="120000" h="120000" extrusionOk="0">
+                <a:moveTo>
+                  <a:pt x="0" y="0"/>
+                </a:moveTo>
+                <a:lnTo>
+                  <a:pt x="120000" y="0"/>
+                </a:lnTo>
+                <a:lnTo>
+                  <a:pt x="120000" y="120000"/>
+                </a:lnTo>
+                <a:lnTo>
+                  <a:pt x="0" y="120000"/>
+                </a:lnTo>
+                <a:close/>
+              </a:path>
+            </a:pathLst>
+          </a:custGeom>
+          <a:noFill/>
+          <a:ln w="12700" cap="flat" cmpd="sng">
+            <a:solidFill>
+              <a:srgbClr val="000000"/>
+            </a:solidFill>
+            <a:prstDash val="solid"/>
+            <a:round/>
+            <a:headEnd type="none" w="sm" len="sm"/>
+            <a:tailEnd type="none" w="sm" len="sm"/>
+          </a:ln>
+        </p:spPr>
+      </p:sp>
+      <p:sp>
+        <p:nvSpPr>
+          <p:cNvPr id="117" name="Google Shape;117;p3:notes"/>
+          <p:cNvSpPr txBox="1">
+            <a:spLocks noGrp="1"/>
+          </p:cNvSpPr>
+          <p:nvPr>
+            <p:ph type="body" idx="1"/>
+          </p:nvPr>
+        </p:nvSpPr>
+        <p:spPr>
+          <a:xfrm>
+            <a:off x="685800" y="4400550"/>
+            <a:ext cx="5486400" cy="3600450"/>
+          </a:xfrm>
+          <a:prstGeom prst="rect">
+            <a:avLst/>
+          </a:prstGeom>
+          <a:noFill/>
+          <a:ln>
+            <a:noFill/>
+          </a:ln>
+        </p:spPr>
+        <p:txBody>
+          <a:bodyPr spcFirstLastPara="1" wrap="square" lIns="91425" tIns="45700" rIns="91425" bIns="45700" anchor="t" anchorCtr="0">
+            <a:noAutofit/>
+          </a:bodyPr>
+          <a:lstStyle/>
+          <a:p>
+            <a:pPr marL="0" lvl="0" indent="0" algn="l" rtl="0">
+              <a:spcBef>
+                <a:spcPts val="0"/>
+              </a:spcBef>
+              <a:spcAft>
+                <a:spcPts val="0"/>
+              </a:spcAft>
+              <a:buNone/>
+            </a:pPr>
+            <a:endParaRPr u="none" dirty="0">
+              <a:solidFill>
+                <a:schemeClr val="accent1"/>
+              </a:solidFill>
+            </a:endParaRPr>
+          </a:p>
+        </p:txBody>
+      </p:sp>
+      <p:sp>
+        <p:nvSpPr>
+          <p:cNvPr id="118" name="Google Shape;118;p3:notes"/>
+          <p:cNvSpPr txBox="1">
+            <a:spLocks noGrp="1"/>
+          </p:cNvSpPr>
+          <p:nvPr>
+            <p:ph type="sldNum" idx="12"/>
+          </p:nvPr>
+        </p:nvSpPr>
+        <p:spPr>
+          <a:xfrm>
+            <a:off x="3884613" y="8685213"/>
+            <a:ext cx="2971800" cy="458787"/>
+          </a:xfrm>
+          <a:prstGeom prst="rect">
+            <a:avLst/>
+          </a:prstGeom>
+          <a:noFill/>
+          <a:ln>
+            <a:noFill/>
+          </a:ln>
+        </p:spPr>
+        <p:txBody>
+          <a:bodyPr spcFirstLastPara="1" wrap="square" lIns="91425" tIns="45700" rIns="91425" bIns="45700" anchor="b" anchorCtr="0">
+            <a:noAutofit/>
+          </a:bodyPr>
+          <a:lstStyle/>
+          <a:p>
+            <a:pPr marL="0" lvl="0" indent="0" algn="r" rtl="0">
+              <a:spcBef>
+                <a:spcPts val="0"/>
+              </a:spcBef>
+              <a:spcAft>
+                <a:spcPts val="0"/>
+              </a:spcAft>
+              <a:buNone/>
+            </a:pPr>
+            <a:fld id="{00000000-1234-1234-1234-123412341234}" type="slidenum">
+              <a:rPr lang="en-US"/>
+              <a:t>2</a:t>
+            </a:fld>
+            <a:endParaRPr dirty="0"/>
+          </a:p>
+        </p:txBody>
+      </p:sp>
+    </p:spTree>
+  </p:cSld>
+  <p:clrMapOvr>
+    <a:masterClrMapping/>
+  </p:clrMapOvr>
+</p:notes>
+</file>
+
+<file path=ppt/notesSlides/notesSlide20.xml><?xml version="1.0" encoding="utf-8"?>
 <p:notes xmlns:a="http://schemas.openxmlformats.org/drawingml/2006/main" xmlns:r="http://schemas.openxmlformats.org/officeDocument/2006/relationships" xmlns:p="http://schemas.openxmlformats.org/presentationml/2006/main" showMasterSp="0" showMasterPhAnim="0">
   <p:cSld>
     <p:spTree>
@@ -3645,7 +4012,7 @@
             </a:pPr>
             <a:fld id="{00000000-1234-1234-1234-123412341234}" type="slidenum">
               <a:rPr lang="en-US"/>
-              <a:t>19</a:t>
+              <a:t>20</a:t>
             </a:fld>
             <a:endParaRPr dirty="0"/>
           </a:p>
@@ -3664,175 +4031,7 @@
 </p:notes>
 </file>
 
-<file path=ppt/notesSlides/notesSlide2.xml><?xml version="1.0" encoding="utf-8"?>
-<p:notes xmlns:a="http://schemas.openxmlformats.org/drawingml/2006/main" xmlns:r="http://schemas.openxmlformats.org/officeDocument/2006/relationships" xmlns:p="http://schemas.openxmlformats.org/presentationml/2006/main" showMasterSp="0" showMasterPhAnim="0">
-  <p:cSld>
-    <p:spTree>
-      <p:nvGrpSpPr>
-        <p:cNvPr id="1" name="Shape 115"/>
-        <p:cNvGrpSpPr/>
-        <p:nvPr/>
-      </p:nvGrpSpPr>
-      <p:grpSpPr>
-        <a:xfrm>
-          <a:off x="0" y="0"/>
-          <a:ext cx="0" cy="0"/>
-          <a:chOff x="0" y="0"/>
-          <a:chExt cx="0" cy="0"/>
-        </a:xfrm>
-      </p:grpSpPr>
-      <p:sp>
-        <p:nvSpPr>
-          <p:cNvPr id="116" name="Google Shape;116;p3:notes"/>
-          <p:cNvSpPr>
-            <a:spLocks noGrp="1" noRot="1" noChangeAspect="1"/>
-          </p:cNvSpPr>
-          <p:nvPr>
-            <p:ph type="sldImg" idx="2"/>
-          </p:nvPr>
-        </p:nvSpPr>
-        <p:spPr>
-          <a:xfrm>
-            <a:off x="685800" y="1143000"/>
-            <a:ext cx="5486400" cy="3086100"/>
-          </a:xfrm>
-          <a:custGeom>
-            <a:avLst/>
-            <a:gdLst/>
-            <a:ahLst/>
-            <a:cxnLst/>
-            <a:rect l="l" t="t" r="r" b="b"/>
-            <a:pathLst>
-              <a:path w="120000" h="120000" extrusionOk="0">
-                <a:moveTo>
-                  <a:pt x="0" y="0"/>
-                </a:moveTo>
-                <a:lnTo>
-                  <a:pt x="120000" y="0"/>
-                </a:lnTo>
-                <a:lnTo>
-                  <a:pt x="120000" y="120000"/>
-                </a:lnTo>
-                <a:lnTo>
-                  <a:pt x="0" y="120000"/>
-                </a:lnTo>
-                <a:close/>
-              </a:path>
-            </a:pathLst>
-          </a:custGeom>
-          <a:noFill/>
-          <a:ln w="12700" cap="flat" cmpd="sng">
-            <a:solidFill>
-              <a:srgbClr val="000000"/>
-            </a:solidFill>
-            <a:prstDash val="solid"/>
-            <a:round/>
-            <a:headEnd type="none" w="sm" len="sm"/>
-            <a:tailEnd type="none" w="sm" len="sm"/>
-          </a:ln>
-        </p:spPr>
-      </p:sp>
-      <p:sp>
-        <p:nvSpPr>
-          <p:cNvPr id="117" name="Google Shape;117;p3:notes"/>
-          <p:cNvSpPr txBox="1">
-            <a:spLocks noGrp="1"/>
-          </p:cNvSpPr>
-          <p:nvPr>
-            <p:ph type="body" idx="1"/>
-          </p:nvPr>
-        </p:nvSpPr>
-        <p:spPr>
-          <a:xfrm>
-            <a:off x="685800" y="4400550"/>
-            <a:ext cx="5486400" cy="3600450"/>
-          </a:xfrm>
-          <a:prstGeom prst="rect">
-            <a:avLst/>
-          </a:prstGeom>
-          <a:noFill/>
-          <a:ln>
-            <a:noFill/>
-          </a:ln>
-        </p:spPr>
-        <p:txBody>
-          <a:bodyPr spcFirstLastPara="1" wrap="square" lIns="91425" tIns="45700" rIns="91425" bIns="45700" anchor="t" anchorCtr="0">
-            <a:noAutofit/>
-          </a:bodyPr>
-          <a:lstStyle/>
-          <a:p>
-            <a:pPr marL="0" lvl="0" indent="0" algn="l" rtl="0">
-              <a:spcBef>
-                <a:spcPts val="0"/>
-              </a:spcBef>
-              <a:spcAft>
-                <a:spcPts val="0"/>
-              </a:spcAft>
-              <a:buNone/>
-            </a:pPr>
-            <a:endParaRPr u="none" dirty="0">
-              <a:solidFill>
-                <a:schemeClr val="accent1"/>
-              </a:solidFill>
-            </a:endParaRPr>
-          </a:p>
-        </p:txBody>
-      </p:sp>
-      <p:sp>
-        <p:nvSpPr>
-          <p:cNvPr id="118" name="Google Shape;118;p3:notes"/>
-          <p:cNvSpPr txBox="1">
-            <a:spLocks noGrp="1"/>
-          </p:cNvSpPr>
-          <p:nvPr>
-            <p:ph type="sldNum" idx="12"/>
-          </p:nvPr>
-        </p:nvSpPr>
-        <p:spPr>
-          <a:xfrm>
-            <a:off x="3884613" y="8685213"/>
-            <a:ext cx="2971800" cy="458787"/>
-          </a:xfrm>
-          <a:prstGeom prst="rect">
-            <a:avLst/>
-          </a:prstGeom>
-          <a:noFill/>
-          <a:ln>
-            <a:noFill/>
-          </a:ln>
-        </p:spPr>
-        <p:txBody>
-          <a:bodyPr spcFirstLastPara="1" wrap="square" lIns="91425" tIns="45700" rIns="91425" bIns="45700" anchor="b" anchorCtr="0">
-            <a:noAutofit/>
-          </a:bodyPr>
-          <a:lstStyle/>
-          <a:p>
-            <a:pPr marL="0" lvl="0" indent="0" algn="r" rtl="0">
-              <a:spcBef>
-                <a:spcPts val="0"/>
-              </a:spcBef>
-              <a:spcAft>
-                <a:spcPts val="0"/>
-              </a:spcAft>
-              <a:buNone/>
-            </a:pPr>
-            <a:fld id="{00000000-1234-1234-1234-123412341234}" type="slidenum">
-              <a:rPr lang="en-US"/>
-              <a:t>2</a:t>
-            </a:fld>
-            <a:endParaRPr dirty="0"/>
-          </a:p>
-        </p:txBody>
-      </p:sp>
-    </p:spTree>
-  </p:cSld>
-  <p:clrMapOvr>
-    <a:masterClrMapping/>
-  </p:clrMapOvr>
-</p:notes>
-</file>
-
-<file path=ppt/notesSlides/notesSlide20.xml><?xml version="1.0" encoding="utf-8"?>
+<file path=ppt/notesSlides/notesSlide21.xml><?xml version="1.0" encoding="utf-8"?>
 <p:notes xmlns:a="http://schemas.openxmlformats.org/drawingml/2006/main" xmlns:r="http://schemas.openxmlformats.org/officeDocument/2006/relationships" xmlns:p="http://schemas.openxmlformats.org/presentationml/2006/main" showMasterSp="0" showMasterPhAnim="0">
   <p:cSld>
     <p:spTree>
@@ -4010,7 +4209,7 @@
             </a:pPr>
             <a:fld id="{00000000-1234-1234-1234-123412341234}" type="slidenum">
               <a:rPr lang="en-US"/>
-              <a:t>20</a:t>
+              <a:t>21</a:t>
             </a:fld>
             <a:endParaRPr dirty="0"/>
           </a:p>
@@ -4029,7 +4228,7 @@
 </p:notes>
 </file>
 
-<file path=ppt/notesSlides/notesSlide21.xml><?xml version="1.0" encoding="utf-8"?>
+<file path=ppt/notesSlides/notesSlide22.xml><?xml version="1.0" encoding="utf-8"?>
 <p:notes xmlns:a="http://schemas.openxmlformats.org/drawingml/2006/main" xmlns:r="http://schemas.openxmlformats.org/officeDocument/2006/relationships" xmlns:p="http://schemas.openxmlformats.org/presentationml/2006/main" showMasterSp="0" showMasterPhAnim="0">
   <p:cSld>
     <p:spTree>
@@ -4227,7 +4426,7 @@
             </a:pPr>
             <a:fld id="{00000000-1234-1234-1234-123412341234}" type="slidenum">
               <a:rPr lang="en-US"/>
-              <a:t>21</a:t>
+              <a:t>22</a:t>
             </a:fld>
             <a:endParaRPr dirty="0"/>
           </a:p>
@@ -4246,7 +4445,7 @@
 </p:notes>
 </file>
 
-<file path=ppt/notesSlides/notesSlide22.xml><?xml version="1.0" encoding="utf-8"?>
+<file path=ppt/notesSlides/notesSlide23.xml><?xml version="1.0" encoding="utf-8"?>
 <p:notes xmlns:a="http://schemas.openxmlformats.org/drawingml/2006/main" xmlns:r="http://schemas.openxmlformats.org/officeDocument/2006/relationships" xmlns:p="http://schemas.openxmlformats.org/presentationml/2006/main" showMasterSp="0" showMasterPhAnim="0">
   <p:cSld>
     <p:spTree>
@@ -4444,7 +4643,7 @@
             </a:pPr>
             <a:fld id="{00000000-1234-1234-1234-123412341234}" type="slidenum">
               <a:rPr lang="en-US"/>
-              <a:t>22</a:t>
+              <a:t>23</a:t>
             </a:fld>
             <a:endParaRPr dirty="0"/>
           </a:p>
@@ -4463,7 +4662,7 @@
 </p:notes>
 </file>
 
-<file path=ppt/notesSlides/notesSlide23.xml><?xml version="1.0" encoding="utf-8"?>
+<file path=ppt/notesSlides/notesSlide24.xml><?xml version="1.0" encoding="utf-8"?>
 <p:notes xmlns:a="http://schemas.openxmlformats.org/drawingml/2006/main" xmlns:r="http://schemas.openxmlformats.org/officeDocument/2006/relationships" xmlns:p="http://schemas.openxmlformats.org/presentationml/2006/main" showMasterSp="0" showMasterPhAnim="0">
   <p:cSld>
     <p:spTree>
@@ -4661,7 +4860,7 @@
             </a:pPr>
             <a:fld id="{00000000-1234-1234-1234-123412341234}" type="slidenum">
               <a:rPr lang="en-US"/>
-              <a:t>23</a:t>
+              <a:t>25</a:t>
             </a:fld>
             <a:endParaRPr dirty="0"/>
           </a:p>
@@ -4680,7 +4879,7 @@
 </p:notes>
 </file>
 
-<file path=ppt/notesSlides/notesSlide24.xml><?xml version="1.0" encoding="utf-8"?>
+<file path=ppt/notesSlides/notesSlide25.xml><?xml version="1.0" encoding="utf-8"?>
 <p:notes xmlns:a="http://schemas.openxmlformats.org/drawingml/2006/main" xmlns:r="http://schemas.openxmlformats.org/officeDocument/2006/relationships" xmlns:p="http://schemas.openxmlformats.org/presentationml/2006/main" showMasterSp="0" showMasterPhAnim="0">
   <p:cSld>
     <p:spTree>
@@ -4858,7 +5057,7 @@
             </a:pPr>
             <a:fld id="{00000000-1234-1234-1234-123412341234}" type="slidenum">
               <a:rPr lang="en-US"/>
-              <a:t>24</a:t>
+              <a:t>26</a:t>
             </a:fld>
             <a:endParaRPr dirty="0"/>
           </a:p>
@@ -4877,7 +5076,7 @@
 </p:notes>
 </file>
 
-<file path=ppt/notesSlides/notesSlide25.xml><?xml version="1.0" encoding="utf-8"?>
+<file path=ppt/notesSlides/notesSlide26.xml><?xml version="1.0" encoding="utf-8"?>
 <p:notes xmlns:a="http://schemas.openxmlformats.org/drawingml/2006/main" xmlns:r="http://schemas.openxmlformats.org/officeDocument/2006/relationships" xmlns:p="http://schemas.openxmlformats.org/presentationml/2006/main" showMasterSp="0" showMasterPhAnim="0">
   <p:cSld>
     <p:spTree>
@@ -5055,7 +5254,7 @@
             </a:pPr>
             <a:fld id="{00000000-1234-1234-1234-123412341234}" type="slidenum">
               <a:rPr lang="en-US"/>
-              <a:t>25</a:t>
+              <a:t>27</a:t>
             </a:fld>
             <a:endParaRPr dirty="0"/>
           </a:p>
@@ -5074,7 +5273,7 @@
 </p:notes>
 </file>
 
-<file path=ppt/notesSlides/notesSlide26.xml><?xml version="1.0" encoding="utf-8"?>
+<file path=ppt/notesSlides/notesSlide27.xml><?xml version="1.0" encoding="utf-8"?>
 <p:notes xmlns:a="http://schemas.openxmlformats.org/drawingml/2006/main" xmlns:r="http://schemas.openxmlformats.org/officeDocument/2006/relationships" xmlns:p="http://schemas.openxmlformats.org/presentationml/2006/main" showMasterSp="0" showMasterPhAnim="0">
   <p:cSld>
     <p:spTree>
@@ -5228,7 +5427,7 @@
             </a:pPr>
             <a:fld id="{00000000-1234-1234-1234-123412341234}" type="slidenum">
               <a:rPr lang="en-US"/>
-              <a:t>26</a:t>
+              <a:t>28</a:t>
             </a:fld>
             <a:endParaRPr dirty="0"/>
           </a:p>
@@ -5242,7 +5441,7 @@
 </p:notes>
 </file>
 
-<file path=ppt/notesSlides/notesSlide27.xml><?xml version="1.0" encoding="utf-8"?>
+<file path=ppt/notesSlides/notesSlide28.xml><?xml version="1.0" encoding="utf-8"?>
 <p:notes xmlns:a="http://schemas.openxmlformats.org/drawingml/2006/main" xmlns:r="http://schemas.openxmlformats.org/officeDocument/2006/relationships" xmlns:p="http://schemas.openxmlformats.org/presentationml/2006/main" showMasterSp="0" showMasterPhAnim="0">
   <p:cSld>
     <p:spTree>
@@ -5420,7 +5619,7 @@
             </a:pPr>
             <a:fld id="{00000000-1234-1234-1234-123412341234}" type="slidenum">
               <a:rPr lang="en-US"/>
-              <a:t>27</a:t>
+              <a:t>29</a:t>
             </a:fld>
             <a:endParaRPr dirty="0"/>
           </a:p>
@@ -5439,7 +5638,7 @@
 </p:notes>
 </file>
 
-<file path=ppt/notesSlides/notesSlide28.xml><?xml version="1.0" encoding="utf-8"?>
+<file path=ppt/notesSlides/notesSlide29.xml><?xml version="1.0" encoding="utf-8"?>
 <p:notes xmlns:a="http://schemas.openxmlformats.org/drawingml/2006/main" xmlns:r="http://schemas.openxmlformats.org/officeDocument/2006/relationships" xmlns:p="http://schemas.openxmlformats.org/presentationml/2006/main" showMasterSp="0" showMasterPhAnim="0">
   <p:cSld>
     <p:spTree>
@@ -5593,7 +5792,7 @@
             </a:pPr>
             <a:fld id="{00000000-1234-1234-1234-123412341234}" type="slidenum">
               <a:rPr lang="en-US"/>
-              <a:t>28</a:t>
+              <a:t>30</a:t>
             </a:fld>
             <a:endParaRPr dirty="0"/>
           </a:p>
@@ -20200,7 +20399,7 @@
         </p:nvSpPr>
         <p:spPr>
           <a:xfrm>
-            <a:off x="5741471" y="5290755"/>
+            <a:off x="5912378" y="5285374"/>
             <a:ext cx="3071221" cy="1205988"/>
           </a:xfrm>
           <a:prstGeom prst="rect">
@@ -20307,7 +20506,7 @@
         </p:nvSpPr>
         <p:spPr>
           <a:xfrm>
-            <a:off x="6003730" y="4604947"/>
+            <a:off x="5991013" y="4523493"/>
             <a:ext cx="2716692" cy="895532"/>
           </a:xfrm>
           <a:prstGeom prst="rect">
@@ -20474,7 +20673,7 @@
         </p:nvSpPr>
         <p:spPr>
           <a:xfrm>
-            <a:off x="8904963" y="4604947"/>
+            <a:off x="8892246" y="4523493"/>
             <a:ext cx="2362159" cy="895532"/>
           </a:xfrm>
           <a:prstGeom prst="rect">
@@ -20530,7 +20729,7 @@
         </p:nvSpPr>
         <p:spPr>
           <a:xfrm>
-            <a:off x="8904963" y="5474730"/>
+            <a:off x="8869851" y="5391133"/>
             <a:ext cx="2362159" cy="1205988"/>
           </a:xfrm>
           <a:prstGeom prst="rect">
@@ -20710,7 +20909,7 @@
         </p:spPr>
         <p:txBody>
           <a:bodyPr spcFirstLastPara="1" wrap="square" lIns="91425" tIns="45700" rIns="91425" bIns="45700" anchor="t" anchorCtr="0">
-            <a:normAutofit fontScale="92500" lnSpcReduction="10000"/>
+            <a:normAutofit/>
           </a:bodyPr>
           <a:lstStyle/>
           <a:p>
@@ -20722,7 +20921,7 @@
             </a:pPr>
             <a:r>
               <a:rPr lang="en-US" dirty="0"/>
-              <a:t>One-hot encoding (PTMARRY), binary mapping (PTGENDER: Male=1, Female=0) and ordinal encoding for DX (CN=0, EMCI=1, LMCI=2, AD=3).</a:t>
+              <a:t>One-hot encoding (PTMARRY) and binary mapping (PTGENDER: Male=1, Female=0).</a:t>
             </a:r>
           </a:p>
           <a:p>
@@ -20874,6 +21073,669 @@
 </file>
 
 <file path=ppt/slides/slide12.xml><?xml version="1.0" encoding="utf-8"?>
+<p:sld xmlns:a="http://schemas.openxmlformats.org/drawingml/2006/main" xmlns:r="http://schemas.openxmlformats.org/officeDocument/2006/relationships" xmlns:p="http://schemas.openxmlformats.org/presentationml/2006/main">
+  <p:cSld>
+    <p:spTree>
+      <p:nvGrpSpPr>
+        <p:cNvPr id="1" name="Shape 218">
+          <a:extLst>
+            <a:ext uri="{FF2B5EF4-FFF2-40B4-BE49-F238E27FC236}">
+              <a16:creationId xmlns:a16="http://schemas.microsoft.com/office/drawing/2014/main" id="{FDBCA41B-D638-B66A-65F1-E6193318437C}"/>
+            </a:ext>
+          </a:extLst>
+        </p:cNvPr>
+        <p:cNvGrpSpPr/>
+        <p:nvPr/>
+      </p:nvGrpSpPr>
+      <p:grpSpPr>
+        <a:xfrm>
+          <a:off x="0" y="0"/>
+          <a:ext cx="0" cy="0"/>
+          <a:chOff x="0" y="0"/>
+          <a:chExt cx="0" cy="0"/>
+        </a:xfrm>
+      </p:grpSpPr>
+      <p:sp>
+        <p:nvSpPr>
+          <p:cNvPr id="220" name="Google Shape;220;p11">
+            <a:extLst>
+              <a:ext uri="{FF2B5EF4-FFF2-40B4-BE49-F238E27FC236}">
+                <a16:creationId xmlns:a16="http://schemas.microsoft.com/office/drawing/2014/main" id="{5221D6E3-990A-4E42-AD6D-EA15303E10CD}"/>
+              </a:ext>
+            </a:extLst>
+          </p:cNvPr>
+          <p:cNvSpPr txBox="1"/>
+          <p:nvPr/>
+        </p:nvSpPr>
+        <p:spPr>
+          <a:xfrm>
+            <a:off x="1034026" y="560898"/>
+            <a:ext cx="6131885" cy="895532"/>
+          </a:xfrm>
+          <a:prstGeom prst="rect">
+            <a:avLst/>
+          </a:prstGeom>
+          <a:noFill/>
+          <a:ln>
+            <a:noFill/>
+          </a:ln>
+        </p:spPr>
+        <p:txBody>
+          <a:bodyPr spcFirstLastPara="1" wrap="square" lIns="91425" tIns="45700" rIns="91425" bIns="45700" anchor="ctr" anchorCtr="0">
+            <a:normAutofit/>
+          </a:bodyPr>
+          <a:lstStyle/>
+          <a:p>
+            <a:pPr marL="0" marR="0" lvl="0" indent="0" algn="l" rtl="0">
+              <a:lnSpc>
+                <a:spcPct val="90000"/>
+              </a:lnSpc>
+              <a:spcBef>
+                <a:spcPts val="0"/>
+              </a:spcBef>
+              <a:spcAft>
+                <a:spcPts val="0"/>
+              </a:spcAft>
+              <a:buClr>
+                <a:schemeClr val="dk2"/>
+              </a:buClr>
+              <a:buSzPts val="3200"/>
+              <a:buFont typeface="Roboto Medium"/>
+              <a:buNone/>
+            </a:pPr>
+            <a:r>
+              <a:rPr lang="en-US" sz="3200" b="1" noProof="0" dirty="0">
+                <a:solidFill>
+                  <a:schemeClr val="dk2"/>
+                </a:solidFill>
+                <a:latin typeface="Roboto Medium"/>
+                <a:ea typeface="Roboto Medium"/>
+                <a:cs typeface="Roboto Medium"/>
+                <a:sym typeface="Roboto Medium"/>
+              </a:rPr>
+              <a:t>Outlier Detection</a:t>
+            </a:r>
+            <a:endParaRPr lang="en-US" noProof="0" dirty="0"/>
+          </a:p>
+        </p:txBody>
+      </p:sp>
+      <p:sp>
+        <p:nvSpPr>
+          <p:cNvPr id="223" name="Google Shape;223;p11">
+            <a:extLst>
+              <a:ext uri="{FF2B5EF4-FFF2-40B4-BE49-F238E27FC236}">
+                <a16:creationId xmlns:a16="http://schemas.microsoft.com/office/drawing/2014/main" id="{B080845D-67F5-5CDE-AFCE-ACA6D1FA0404}"/>
+              </a:ext>
+            </a:extLst>
+          </p:cNvPr>
+          <p:cNvSpPr txBox="1"/>
+          <p:nvPr/>
+        </p:nvSpPr>
+        <p:spPr>
+          <a:xfrm>
+            <a:off x="136034" y="1579301"/>
+            <a:ext cx="7104521" cy="1820910"/>
+          </a:xfrm>
+          <a:prstGeom prst="rect">
+            <a:avLst/>
+          </a:prstGeom>
+          <a:noFill/>
+          <a:ln>
+            <a:noFill/>
+          </a:ln>
+        </p:spPr>
+        <p:txBody>
+          <a:bodyPr spcFirstLastPara="1" wrap="square" lIns="91425" tIns="45700" rIns="91425" bIns="45700" anchor="t" anchorCtr="0">
+            <a:noAutofit/>
+          </a:bodyPr>
+          <a:lstStyle/>
+          <a:p>
+            <a:pPr marL="342900" lvl="0" indent="-342900">
+              <a:buClr>
+                <a:schemeClr val="dk1"/>
+              </a:buClr>
+              <a:buSzPts val="2000"/>
+              <a:buFont typeface="Arial" panose="020B0604020202020204" pitchFamily="34" charset="0"/>
+              <a:buChar char="•"/>
+            </a:pPr>
+            <a:r>
+              <a:rPr lang="en-US" sz="1800" b="1" noProof="0" dirty="0">
+                <a:solidFill>
+                  <a:schemeClr val="dk1"/>
+                </a:solidFill>
+                <a:latin typeface="Roboto"/>
+                <a:ea typeface="Roboto"/>
+                <a:cs typeface="Roboto"/>
+                <a:sym typeface="Roboto"/>
+              </a:rPr>
+              <a:t>Univariate Analysis: </a:t>
+            </a:r>
+            <a:r>
+              <a:rPr lang="en-US" sz="1800" noProof="0" dirty="0">
+                <a:solidFill>
+                  <a:schemeClr val="dk1"/>
+                </a:solidFill>
+                <a:latin typeface="Roboto"/>
+                <a:ea typeface="Roboto"/>
+                <a:cs typeface="Roboto"/>
+                <a:sym typeface="Roboto"/>
+              </a:rPr>
+              <a:t>use </a:t>
+            </a:r>
+            <a:r>
+              <a:rPr lang="en-US" sz="1800" i="1" noProof="0" dirty="0">
+                <a:solidFill>
+                  <a:schemeClr val="dk1"/>
+                </a:solidFill>
+                <a:latin typeface="Roboto"/>
+                <a:ea typeface="Roboto"/>
+                <a:cs typeface="Roboto"/>
+                <a:sym typeface="Roboto"/>
+              </a:rPr>
+              <a:t>IQR</a:t>
+            </a:r>
+            <a:r>
+              <a:rPr lang="en-US" sz="1800" noProof="0" dirty="0">
+                <a:solidFill>
+                  <a:schemeClr val="dk1"/>
+                </a:solidFill>
+                <a:latin typeface="Roboto"/>
+                <a:ea typeface="Roboto"/>
+                <a:cs typeface="Roboto"/>
+                <a:sym typeface="Roboto"/>
+              </a:rPr>
+              <a:t> for each column to find outliers and </a:t>
+            </a:r>
+            <a:r>
+              <a:rPr lang="en-US" sz="1800" i="1" noProof="0" dirty="0">
+                <a:solidFill>
+                  <a:schemeClr val="dk1"/>
+                </a:solidFill>
+                <a:latin typeface="Roboto"/>
+                <a:ea typeface="Roboto"/>
+                <a:cs typeface="Roboto"/>
+                <a:sym typeface="Roboto"/>
+              </a:rPr>
+              <a:t>to remove problematic outliers</a:t>
+            </a:r>
+            <a:r>
+              <a:rPr lang="en-US" sz="1800" noProof="0" dirty="0">
+                <a:solidFill>
+                  <a:schemeClr val="dk1"/>
+                </a:solidFill>
+                <a:latin typeface="Roboto"/>
+                <a:ea typeface="Roboto"/>
+                <a:cs typeface="Roboto"/>
+                <a:sym typeface="Roboto"/>
+              </a:rPr>
+              <a:t>. </a:t>
+            </a:r>
+          </a:p>
+          <a:p>
+            <a:pPr marL="342900" lvl="0" indent="-342900">
+              <a:buClr>
+                <a:schemeClr val="dk1"/>
+              </a:buClr>
+              <a:buSzPts val="2000"/>
+              <a:buFont typeface="Arial" panose="020B0604020202020204" pitchFamily="34" charset="0"/>
+              <a:buChar char="•"/>
+            </a:pPr>
+            <a:r>
+              <a:rPr lang="en-US" sz="1800" b="1" noProof="0" dirty="0">
+                <a:solidFill>
+                  <a:schemeClr val="dk1"/>
+                </a:solidFill>
+                <a:latin typeface="Roboto"/>
+                <a:ea typeface="Roboto"/>
+                <a:cs typeface="Roboto"/>
+                <a:sym typeface="Roboto"/>
+              </a:rPr>
+              <a:t>Multivariate Analysis: </a:t>
+            </a:r>
+            <a:r>
+              <a:rPr lang="en-US" sz="1800" noProof="0" dirty="0">
+                <a:solidFill>
+                  <a:schemeClr val="dk1"/>
+                </a:solidFill>
+                <a:latin typeface="Roboto"/>
+                <a:ea typeface="Roboto"/>
+                <a:cs typeface="Roboto"/>
+                <a:sym typeface="Roboto"/>
+              </a:rPr>
+              <a:t>create groups of columns (EcogPt, EcogSP, Cognitive Score, MRI/ICV, CSF/ABETA), apply </a:t>
+            </a:r>
+            <a:r>
+              <a:rPr lang="en-US" sz="1800" i="1" noProof="0" dirty="0">
+                <a:solidFill>
+                  <a:schemeClr val="dk1"/>
+                </a:solidFill>
+                <a:latin typeface="Roboto"/>
+                <a:ea typeface="Roboto"/>
+                <a:cs typeface="Roboto"/>
+                <a:sym typeface="Roboto"/>
+              </a:rPr>
+              <a:t>LOF</a:t>
+            </a:r>
+            <a:r>
+              <a:rPr lang="en-US" sz="1800" noProof="0" dirty="0">
+                <a:solidFill>
+                  <a:schemeClr val="dk1"/>
+                </a:solidFill>
+                <a:latin typeface="Roboto"/>
+                <a:ea typeface="Roboto"/>
+                <a:cs typeface="Roboto"/>
+                <a:sym typeface="Roboto"/>
+              </a:rPr>
+              <a:t> on the normalized data (</a:t>
+            </a:r>
+            <a:r>
+              <a:rPr lang="en-US" sz="1800" noProof="0" dirty="0" err="1">
+                <a:solidFill>
+                  <a:schemeClr val="dk1"/>
+                </a:solidFill>
+                <a:latin typeface="Roboto"/>
+                <a:ea typeface="Roboto"/>
+                <a:cs typeface="Roboto"/>
+                <a:sym typeface="Roboto"/>
+              </a:rPr>
+              <a:t>RobustScaler</a:t>
+            </a:r>
+            <a:r>
+              <a:rPr lang="en-US" sz="1800" noProof="0" dirty="0">
+                <a:solidFill>
+                  <a:schemeClr val="dk1"/>
+                </a:solidFill>
+                <a:latin typeface="Roboto"/>
+                <a:ea typeface="Roboto"/>
+                <a:cs typeface="Roboto"/>
+                <a:sym typeface="Roboto"/>
+              </a:rPr>
+              <a:t>)</a:t>
+            </a:r>
+            <a:r>
+              <a:rPr lang="en-US" sz="1800" dirty="0">
+                <a:solidFill>
+                  <a:schemeClr val="dk1"/>
+                </a:solidFill>
+                <a:latin typeface="Roboto"/>
+                <a:ea typeface="Roboto"/>
+                <a:cs typeface="Roboto"/>
+                <a:sym typeface="Roboto"/>
+              </a:rPr>
+              <a:t> to find outliers and </a:t>
+            </a:r>
+            <a:r>
+              <a:rPr lang="en-US" sz="1800" i="1" dirty="0">
+                <a:solidFill>
+                  <a:schemeClr val="dk1"/>
+                </a:solidFill>
+                <a:latin typeface="Roboto"/>
+                <a:ea typeface="Roboto"/>
+                <a:cs typeface="Roboto"/>
+                <a:sym typeface="Roboto"/>
+              </a:rPr>
+              <a:t>to analyze them</a:t>
+            </a:r>
+            <a:r>
+              <a:rPr lang="en-US" sz="1800" dirty="0">
+                <a:solidFill>
+                  <a:schemeClr val="dk1"/>
+                </a:solidFill>
+                <a:latin typeface="Roboto"/>
+                <a:ea typeface="Roboto"/>
+                <a:cs typeface="Roboto"/>
+                <a:sym typeface="Roboto"/>
+              </a:rPr>
+              <a:t>. </a:t>
+            </a:r>
+            <a:endParaRPr lang="en-US" sz="1800" noProof="0" dirty="0">
+              <a:solidFill>
+                <a:schemeClr val="dk1"/>
+              </a:solidFill>
+              <a:latin typeface="Roboto"/>
+              <a:ea typeface="Roboto"/>
+              <a:cs typeface="Roboto"/>
+              <a:sym typeface="Roboto"/>
+            </a:endParaRPr>
+          </a:p>
+        </p:txBody>
+      </p:sp>
+      <p:sp>
+        <p:nvSpPr>
+          <p:cNvPr id="225" name="Google Shape;225;p11">
+            <a:extLst>
+              <a:ext uri="{FF2B5EF4-FFF2-40B4-BE49-F238E27FC236}">
+                <a16:creationId xmlns:a16="http://schemas.microsoft.com/office/drawing/2014/main" id="{FDA3671B-00C8-CC1B-3165-1D17E5B657C0}"/>
+              </a:ext>
+            </a:extLst>
+          </p:cNvPr>
+          <p:cNvSpPr txBox="1"/>
+          <p:nvPr/>
+        </p:nvSpPr>
+        <p:spPr>
+          <a:xfrm>
+            <a:off x="8449143" y="6190031"/>
+            <a:ext cx="2778325" cy="246221"/>
+          </a:xfrm>
+          <a:prstGeom prst="rect">
+            <a:avLst/>
+          </a:prstGeom>
+          <a:noFill/>
+          <a:ln>
+            <a:noFill/>
+          </a:ln>
+        </p:spPr>
+        <p:txBody>
+          <a:bodyPr spcFirstLastPara="1" wrap="square" lIns="91425" tIns="45700" rIns="91425" bIns="45700" anchor="t" anchorCtr="0">
+            <a:spAutoFit/>
+          </a:bodyPr>
+          <a:lstStyle/>
+          <a:p>
+            <a:pPr marL="0" marR="0" lvl="0" indent="0" algn="r" rtl="0">
+              <a:spcBef>
+                <a:spcPts val="0"/>
+              </a:spcBef>
+              <a:spcAft>
+                <a:spcPts val="0"/>
+              </a:spcAft>
+              <a:buNone/>
+            </a:pPr>
+            <a:r>
+              <a:rPr lang="en-US" sz="1000" noProof="0" dirty="0">
+                <a:solidFill>
+                  <a:schemeClr val="lt1"/>
+                </a:solidFill>
+                <a:latin typeface="Roboto"/>
+                <a:ea typeface="Roboto"/>
+                <a:cs typeface="Roboto"/>
+                <a:sym typeface="Roboto"/>
+              </a:rPr>
+              <a:t>Use the </a:t>
+            </a:r>
+            <a:r>
+              <a:rPr lang="en-US" sz="1000" u="sng" noProof="0" dirty="0">
+                <a:solidFill>
+                  <a:schemeClr val="lt1"/>
+                </a:solidFill>
+                <a:latin typeface="Roboto"/>
+                <a:ea typeface="Roboto"/>
+                <a:cs typeface="Roboto"/>
+                <a:sym typeface="Roboto"/>
+                <a:hlinkClick r:id="" action="ppaction://noaction">
+                  <a:extLst>
+                    <a:ext uri="{A12FA001-AC4F-418D-AE19-62706E023703}">
+                      <ahyp:hlinkClr xmlns:ahyp="http://schemas.microsoft.com/office/drawing/2018/hyperlinkcolor" val="tx"/>
+                    </a:ext>
+                  </a:extLst>
+                </a:hlinkClick>
+              </a:rPr>
+              <a:t>Resource section</a:t>
+            </a:r>
+            <a:r>
+              <a:rPr lang="en-US" sz="1000" noProof="0" dirty="0">
+                <a:solidFill>
+                  <a:schemeClr val="lt1"/>
+                </a:solidFill>
+                <a:latin typeface="Roboto"/>
+                <a:ea typeface="Roboto"/>
+                <a:cs typeface="Roboto"/>
+                <a:sym typeface="Roboto"/>
+              </a:rPr>
+              <a:t> to swap this figure</a:t>
+            </a:r>
+            <a:endParaRPr lang="en-US" noProof="0" dirty="0">
+              <a:solidFill>
+                <a:schemeClr val="lt1"/>
+              </a:solidFill>
+            </a:endParaRPr>
+          </a:p>
+        </p:txBody>
+      </p:sp>
+      <p:pic>
+        <p:nvPicPr>
+          <p:cNvPr id="3" name="Immagine 2">
+            <a:extLst>
+              <a:ext uri="{FF2B5EF4-FFF2-40B4-BE49-F238E27FC236}">
+                <a16:creationId xmlns:a16="http://schemas.microsoft.com/office/drawing/2014/main" id="{FFB5C262-5E45-8686-6F0E-35BF3FEF4567}"/>
+              </a:ext>
+            </a:extLst>
+          </p:cNvPr>
+          <p:cNvPicPr>
+            <a:picLocks noChangeAspect="1"/>
+          </p:cNvPicPr>
+          <p:nvPr/>
+        </p:nvPicPr>
+        <p:blipFill>
+          <a:blip r:embed="rId3"/>
+          <a:stretch>
+            <a:fillRect/>
+          </a:stretch>
+        </p:blipFill>
+        <p:spPr>
+          <a:xfrm>
+            <a:off x="7333861" y="0"/>
+            <a:ext cx="4858139" cy="3400211"/>
+          </a:xfrm>
+          <a:prstGeom prst="rect">
+            <a:avLst/>
+          </a:prstGeom>
+        </p:spPr>
+      </p:pic>
+      <p:pic>
+        <p:nvPicPr>
+          <p:cNvPr id="5" name="Immagine 4">
+            <a:extLst>
+              <a:ext uri="{FF2B5EF4-FFF2-40B4-BE49-F238E27FC236}">
+                <a16:creationId xmlns:a16="http://schemas.microsoft.com/office/drawing/2014/main" id="{DEC53112-1BA2-2449-F5D6-35C52551753D}"/>
+              </a:ext>
+            </a:extLst>
+          </p:cNvPr>
+          <p:cNvPicPr>
+            <a:picLocks noChangeAspect="1"/>
+          </p:cNvPicPr>
+          <p:nvPr/>
+        </p:nvPicPr>
+        <p:blipFill>
+          <a:blip r:embed="rId4"/>
+          <a:stretch>
+            <a:fillRect/>
+          </a:stretch>
+        </p:blipFill>
+        <p:spPr>
+          <a:xfrm>
+            <a:off x="7333861" y="3481036"/>
+            <a:ext cx="4858139" cy="3400211"/>
+          </a:xfrm>
+          <a:prstGeom prst="rect">
+            <a:avLst/>
+          </a:prstGeom>
+        </p:spPr>
+      </p:pic>
+      <p:sp>
+        <p:nvSpPr>
+          <p:cNvPr id="2" name="Google Shape;153;p5">
+            <a:extLst>
+              <a:ext uri="{FF2B5EF4-FFF2-40B4-BE49-F238E27FC236}">
+                <a16:creationId xmlns:a16="http://schemas.microsoft.com/office/drawing/2014/main" id="{5B77457A-7A20-8D16-5A66-B75D03A6A1B2}"/>
+              </a:ext>
+            </a:extLst>
+          </p:cNvPr>
+          <p:cNvSpPr txBox="1"/>
+          <p:nvPr/>
+        </p:nvSpPr>
+        <p:spPr>
+          <a:xfrm>
+            <a:off x="587376" y="549275"/>
+            <a:ext cx="340240" cy="307777"/>
+          </a:xfrm>
+          <a:prstGeom prst="rect">
+            <a:avLst/>
+          </a:prstGeom>
+          <a:noFill/>
+          <a:ln>
+            <a:noFill/>
+          </a:ln>
+        </p:spPr>
+        <p:txBody>
+          <a:bodyPr spcFirstLastPara="1" wrap="square" lIns="91425" tIns="45700" rIns="91425" bIns="45700" anchor="t" anchorCtr="0">
+            <a:spAutoFit/>
+          </a:bodyPr>
+          <a:lstStyle/>
+          <a:p>
+            <a:pPr marL="0" marR="0" lvl="0" indent="0" algn="l" rtl="0">
+              <a:lnSpc>
+                <a:spcPct val="100000"/>
+              </a:lnSpc>
+              <a:spcBef>
+                <a:spcPts val="0"/>
+              </a:spcBef>
+              <a:spcAft>
+                <a:spcPts val="0"/>
+              </a:spcAft>
+              <a:buClr>
+                <a:schemeClr val="accent1"/>
+              </a:buClr>
+              <a:buSzPts val="1400"/>
+              <a:buFont typeface="Roboto"/>
+              <a:buNone/>
+            </a:pPr>
+            <a:r>
+              <a:rPr lang="en-US" sz="1400" u="none" strike="noStrike" cap="none" noProof="0" dirty="0">
+                <a:solidFill>
+                  <a:schemeClr val="accent1"/>
+                </a:solidFill>
+                <a:latin typeface="Roboto"/>
+                <a:ea typeface="Roboto"/>
+                <a:cs typeface="Roboto"/>
+                <a:sym typeface="Roboto"/>
+              </a:rPr>
+              <a:t>II</a:t>
+            </a:r>
+          </a:p>
+        </p:txBody>
+      </p:sp>
+      <p:sp>
+        <p:nvSpPr>
+          <p:cNvPr id="4" name="Google Shape;166;p6">
+            <a:extLst>
+              <a:ext uri="{FF2B5EF4-FFF2-40B4-BE49-F238E27FC236}">
+                <a16:creationId xmlns:a16="http://schemas.microsoft.com/office/drawing/2014/main" id="{9545ED1C-268D-AA4D-B18C-533632427E1F}"/>
+              </a:ext>
+            </a:extLst>
+          </p:cNvPr>
+          <p:cNvSpPr txBox="1"/>
+          <p:nvPr/>
+        </p:nvSpPr>
+        <p:spPr>
+          <a:xfrm>
+            <a:off x="843554" y="549275"/>
+            <a:ext cx="3109013" cy="307736"/>
+          </a:xfrm>
+          <a:prstGeom prst="rect">
+            <a:avLst/>
+          </a:prstGeom>
+          <a:noFill/>
+          <a:ln>
+            <a:noFill/>
+          </a:ln>
+        </p:spPr>
+        <p:txBody>
+          <a:bodyPr spcFirstLastPara="1" wrap="square" lIns="91425" tIns="45700" rIns="91425" bIns="45700" anchor="t" anchorCtr="0">
+            <a:spAutoFit/>
+          </a:bodyPr>
+          <a:lstStyle/>
+          <a:p>
+            <a:pPr lvl="0">
+              <a:buClr>
+                <a:schemeClr val="accent1"/>
+              </a:buClr>
+              <a:buSzPts val="1400"/>
+            </a:pPr>
+            <a:r>
+              <a:rPr lang="en-US" noProof="0" dirty="0">
+                <a:solidFill>
+                  <a:schemeClr val="accent1"/>
+                </a:solidFill>
+                <a:latin typeface="Roboto"/>
+                <a:ea typeface="Roboto"/>
+                <a:cs typeface="Roboto"/>
+                <a:sym typeface="Roboto"/>
+              </a:rPr>
+              <a:t>Dataset ADNI</a:t>
+            </a:r>
+            <a:endParaRPr lang="en-US" sz="1400" u="none" strike="noStrike" cap="none" noProof="0" dirty="0">
+              <a:solidFill>
+                <a:schemeClr val="accent1"/>
+              </a:solidFill>
+              <a:latin typeface="Roboto"/>
+              <a:ea typeface="Roboto"/>
+              <a:cs typeface="Roboto"/>
+              <a:sym typeface="Roboto"/>
+            </a:endParaRPr>
+          </a:p>
+        </p:txBody>
+      </p:sp>
+      <p:pic>
+        <p:nvPicPr>
+          <p:cNvPr id="1028" name="Picture 4" descr="No description has been provided for this image">
+            <a:extLst>
+              <a:ext uri="{FF2B5EF4-FFF2-40B4-BE49-F238E27FC236}">
+                <a16:creationId xmlns:a16="http://schemas.microsoft.com/office/drawing/2014/main" id="{A1D0CAA0-557C-06CA-719E-E992211646F7}"/>
+              </a:ext>
+            </a:extLst>
+          </p:cNvPr>
+          <p:cNvPicPr>
+            <a:picLocks noChangeAspect="1" noChangeArrowheads="1"/>
+          </p:cNvPicPr>
+          <p:nvPr/>
+        </p:nvPicPr>
+        <p:blipFill>
+          <a:blip r:embed="rId5">
+            <a:extLst>
+              <a:ext uri="{28A0092B-C50C-407E-A947-70E740481C1C}">
+                <a14:useLocalDpi xmlns:a14="http://schemas.microsoft.com/office/drawing/2010/main" val="0"/>
+              </a:ext>
+            </a:extLst>
+          </a:blip>
+          <a:srcRect/>
+          <a:stretch>
+            <a:fillRect/>
+          </a:stretch>
+        </p:blipFill>
+        <p:spPr bwMode="auto">
+          <a:xfrm>
+            <a:off x="3184306" y="3523082"/>
+            <a:ext cx="4149555" cy="3334918"/>
+          </a:xfrm>
+          <a:prstGeom prst="rect">
+            <a:avLst/>
+          </a:prstGeom>
+          <a:noFill/>
+          <a:extLst>
+            <a:ext uri="{909E8E84-426E-40DD-AFC4-6F175D3DCCD1}">
+              <a14:hiddenFill xmlns:a14="http://schemas.microsoft.com/office/drawing/2010/main">
+                <a:solidFill>
+                  <a:srgbClr val="FFFFFF"/>
+                </a:solidFill>
+              </a14:hiddenFill>
+            </a:ext>
+          </a:extLst>
+        </p:spPr>
+      </p:pic>
+    </p:spTree>
+    <p:extLst>
+      <p:ext uri="{BB962C8B-B14F-4D97-AF65-F5344CB8AC3E}">
+        <p14:creationId xmlns:p14="http://schemas.microsoft.com/office/powerpoint/2010/main" val="618964106"/>
+      </p:ext>
+    </p:extLst>
+  </p:cSld>
+  <p:clrMapOvr>
+    <a:masterClrMapping/>
+  </p:clrMapOvr>
+</p:sld>
+</file>
+
+<file path=ppt/slides/slide13.xml><?xml version="1.0" encoding="utf-8"?>
 <p:sld xmlns:a="http://schemas.openxmlformats.org/drawingml/2006/main" xmlns:r="http://schemas.openxmlformats.org/officeDocument/2006/relationships" xmlns:p="http://schemas.openxmlformats.org/presentationml/2006/main">
   <p:cSld>
     <p:bg>
@@ -21531,7 +22393,7 @@
 </p:sld>
 </file>
 
-<file path=ppt/slides/slide13.xml><?xml version="1.0" encoding="utf-8"?>
+<file path=ppt/slides/slide14.xml><?xml version="1.0" encoding="utf-8"?>
 <p:sld xmlns:a="http://schemas.openxmlformats.org/drawingml/2006/main" xmlns:r="http://schemas.openxmlformats.org/officeDocument/2006/relationships" xmlns:p="http://schemas.openxmlformats.org/presentationml/2006/main">
   <p:cSld>
     <p:bg>
@@ -21632,7 +22494,7 @@
 </p:sld>
 </file>
 
-<file path=ppt/slides/slide14.xml><?xml version="1.0" encoding="utf-8"?>
+<file path=ppt/slides/slide15.xml><?xml version="1.0" encoding="utf-8"?>
 <p:sld xmlns:a="http://schemas.openxmlformats.org/drawingml/2006/main" xmlns:r="http://schemas.openxmlformats.org/officeDocument/2006/relationships" xmlns:p="http://schemas.openxmlformats.org/presentationml/2006/main">
   <p:cSld>
     <p:bg>
@@ -22247,7 +23109,7 @@
 </p:sld>
 </file>
 
-<file path=ppt/slides/slide15.xml><?xml version="1.0" encoding="utf-8"?>
+<file path=ppt/slides/slide16.xml><?xml version="1.0" encoding="utf-8"?>
 <p:sld xmlns:a="http://schemas.openxmlformats.org/drawingml/2006/main" xmlns:r="http://schemas.openxmlformats.org/officeDocument/2006/relationships" xmlns:p="http://schemas.openxmlformats.org/presentationml/2006/main">
   <p:cSld>
     <p:bg>
@@ -22983,7 +23845,7 @@
 </p:sld>
 </file>
 
-<file path=ppt/slides/slide16.xml><?xml version="1.0" encoding="utf-8"?>
+<file path=ppt/slides/slide17.xml><?xml version="1.0" encoding="utf-8"?>
 <p:sld xmlns:a="http://schemas.openxmlformats.org/drawingml/2006/main" xmlns:r="http://schemas.openxmlformats.org/officeDocument/2006/relationships" xmlns:p="http://schemas.openxmlformats.org/presentationml/2006/main">
   <p:cSld>
     <p:bg>
@@ -23092,8 +23954,8 @@
         </p:nvSpPr>
         <p:spPr>
           <a:xfrm>
-            <a:off x="1668547" y="1371600"/>
-            <a:ext cx="8941706" cy="3498939"/>
+            <a:off x="840816" y="1371600"/>
+            <a:ext cx="10423568" cy="3498939"/>
           </a:xfrm>
           <a:prstGeom prst="rect">
             <a:avLst/>
@@ -23105,7 +23967,7 @@
         </p:spPr>
         <p:txBody>
           <a:bodyPr spcFirstLastPara="1" wrap="square" lIns="91425" tIns="45700" rIns="91425" bIns="45700" anchor="t" anchorCtr="0">
-            <a:normAutofit/>
+            <a:normAutofit fontScale="92500" lnSpcReduction="10000"/>
           </a:bodyPr>
           <a:lstStyle/>
           <a:p>
@@ -23118,160 +23980,334 @@
               <a:buChar char="•"/>
             </a:pPr>
             <a:r>
-              <a:rPr lang="en-US" sz="2000" b="1" noProof="0" dirty="0">
-                <a:solidFill>
-                  <a:schemeClr val="dk1"/>
-                </a:solidFill>
-                <a:latin typeface="Roboto"/>
-                <a:ea typeface="Roboto"/>
-                <a:cs typeface="Roboto"/>
-                <a:sym typeface="Roboto"/>
-              </a:rPr>
-              <a:t>Removal of redundant features: </a:t>
-            </a:r>
-            <a:r>
-              <a:rPr lang="en-US" sz="2000" i="1" noProof="0" dirty="0">
-                <a:solidFill>
-                  <a:schemeClr val="dk1"/>
-                </a:solidFill>
-                <a:latin typeface="Roboto"/>
-                <a:ea typeface="Roboto"/>
-                <a:cs typeface="Roboto"/>
-                <a:sym typeface="Roboto"/>
-              </a:rPr>
-              <a:t>ADAS11</a:t>
-            </a:r>
-            <a:r>
-              <a:rPr lang="en-US" sz="2000" noProof="0" dirty="0">
-                <a:solidFill>
-                  <a:schemeClr val="dk1"/>
-                </a:solidFill>
-                <a:latin typeface="Roboto"/>
-                <a:ea typeface="Roboto"/>
-                <a:cs typeface="Roboto"/>
-                <a:sym typeface="Roboto"/>
+              <a:rPr lang="en-US" sz="2000" b="1" dirty="0">
+                <a:latin typeface="Roboto" panose="02000000000000000000" pitchFamily="2" charset="0"/>
+                <a:ea typeface="Roboto" panose="02000000000000000000" pitchFamily="2" charset="0"/>
+                <a:cs typeface="Roboto" panose="02000000000000000000" pitchFamily="2" charset="0"/>
+              </a:rPr>
+              <a:t>Biomarker raw values replaced by ratios: </a:t>
+            </a:r>
+            <a:r>
+              <a:rPr lang="en-US" sz="2000" i="1" dirty="0">
+                <a:latin typeface="Roboto" panose="02000000000000000000" pitchFamily="2" charset="0"/>
+                <a:ea typeface="Roboto" panose="02000000000000000000" pitchFamily="2" charset="0"/>
+                <a:cs typeface="Roboto" panose="02000000000000000000" pitchFamily="2" charset="0"/>
+              </a:rPr>
+              <a:t>TAU</a:t>
+            </a:r>
+            <a:r>
+              <a:rPr lang="en-US" sz="2000" dirty="0">
+                <a:latin typeface="Roboto" panose="02000000000000000000" pitchFamily="2" charset="0"/>
+                <a:ea typeface="Roboto" panose="02000000000000000000" pitchFamily="2" charset="0"/>
+                <a:cs typeface="Roboto" panose="02000000000000000000" pitchFamily="2" charset="0"/>
               </a:rPr>
               <a:t>, </a:t>
             </a:r>
             <a:r>
-              <a:rPr lang="en-US" sz="2000" i="1" noProof="0" dirty="0">
-                <a:solidFill>
-                  <a:schemeClr val="dk1"/>
-                </a:solidFill>
-                <a:latin typeface="Roboto"/>
-                <a:ea typeface="Roboto"/>
-                <a:cs typeface="Roboto"/>
-                <a:sym typeface="Roboto"/>
-              </a:rPr>
-              <a:t>ADASQ4</a:t>
-            </a:r>
-            <a:r>
-              <a:rPr lang="en-US" sz="2000" noProof="0" dirty="0">
-                <a:solidFill>
-                  <a:schemeClr val="dk1"/>
-                </a:solidFill>
-                <a:latin typeface="Roboto"/>
-                <a:ea typeface="Roboto"/>
-                <a:cs typeface="Roboto"/>
-                <a:sym typeface="Roboto"/>
+              <a:rPr lang="en-US" sz="2000" i="1" dirty="0">
+                <a:latin typeface="Roboto" panose="02000000000000000000" pitchFamily="2" charset="0"/>
+                <a:ea typeface="Roboto" panose="02000000000000000000" pitchFamily="2" charset="0"/>
+                <a:cs typeface="Roboto" panose="02000000000000000000" pitchFamily="2" charset="0"/>
+              </a:rPr>
+              <a:t>PTAU</a:t>
+            </a:r>
+            <a:r>
+              <a:rPr lang="en-US" sz="2000" dirty="0">
+                <a:latin typeface="Roboto" panose="02000000000000000000" pitchFamily="2" charset="0"/>
+                <a:ea typeface="Roboto" panose="02000000000000000000" pitchFamily="2" charset="0"/>
+                <a:cs typeface="Roboto" panose="02000000000000000000" pitchFamily="2" charset="0"/>
               </a:rPr>
               <a:t>, </a:t>
             </a:r>
             <a:r>
-              <a:rPr lang="en-US" sz="2000" i="1" noProof="0" dirty="0">
-                <a:solidFill>
-                  <a:schemeClr val="dk1"/>
-                </a:solidFill>
-                <a:latin typeface="Roboto"/>
-                <a:ea typeface="Roboto"/>
-                <a:cs typeface="Roboto"/>
-                <a:sym typeface="Roboto"/>
-              </a:rPr>
-              <a:t>EcogPtTotal</a:t>
-            </a:r>
-            <a:r>
-              <a:rPr lang="en-US" sz="2000" noProof="0" dirty="0">
-                <a:solidFill>
-                  <a:schemeClr val="dk1"/>
-                </a:solidFill>
-                <a:latin typeface="Roboto"/>
-                <a:ea typeface="Roboto"/>
-                <a:cs typeface="Roboto"/>
-                <a:sym typeface="Roboto"/>
+              <a:rPr lang="en-US" sz="2000" i="1" dirty="0">
+                <a:latin typeface="Roboto" panose="02000000000000000000" pitchFamily="2" charset="0"/>
+                <a:ea typeface="Roboto" panose="02000000000000000000" pitchFamily="2" charset="0"/>
+                <a:cs typeface="Roboto" panose="02000000000000000000" pitchFamily="2" charset="0"/>
+              </a:rPr>
+              <a:t>ABETA</a:t>
+            </a:r>
+            <a:r>
+              <a:rPr lang="en-US" sz="2000" dirty="0">
+                <a:latin typeface="Roboto" panose="02000000000000000000" pitchFamily="2" charset="0"/>
+                <a:ea typeface="Roboto" panose="02000000000000000000" pitchFamily="2" charset="0"/>
+                <a:cs typeface="Roboto" panose="02000000000000000000" pitchFamily="2" charset="0"/>
+              </a:rPr>
+              <a:t> are replaced by </a:t>
+            </a:r>
+            <a:r>
+              <a:rPr lang="en-US" sz="2000" i="1" dirty="0">
+                <a:latin typeface="Roboto" panose="02000000000000000000" pitchFamily="2" charset="0"/>
+                <a:ea typeface="Roboto" panose="02000000000000000000" pitchFamily="2" charset="0"/>
+                <a:cs typeface="Roboto" panose="02000000000000000000" pitchFamily="2" charset="0"/>
+              </a:rPr>
+              <a:t>TAU/ABETA </a:t>
+            </a:r>
+            <a:r>
+              <a:rPr lang="en-US" sz="2000" dirty="0">
+                <a:latin typeface="Roboto" panose="02000000000000000000" pitchFamily="2" charset="0"/>
+                <a:ea typeface="Roboto" panose="02000000000000000000" pitchFamily="2" charset="0"/>
+                <a:cs typeface="Roboto" panose="02000000000000000000" pitchFamily="2" charset="0"/>
+              </a:rPr>
+              <a:t>and </a:t>
+            </a:r>
+            <a:r>
+              <a:rPr lang="en-US" sz="2000" i="1" dirty="0">
+                <a:latin typeface="Roboto" panose="02000000000000000000" pitchFamily="2" charset="0"/>
+                <a:ea typeface="Roboto" panose="02000000000000000000" pitchFamily="2" charset="0"/>
+                <a:cs typeface="Roboto" panose="02000000000000000000" pitchFamily="2" charset="0"/>
+              </a:rPr>
+              <a:t>PTAU/ABETA</a:t>
+            </a:r>
+            <a:r>
+              <a:rPr lang="en-US" sz="2000" dirty="0">
+                <a:latin typeface="Roboto" panose="02000000000000000000" pitchFamily="2" charset="0"/>
+                <a:ea typeface="Roboto" panose="02000000000000000000" pitchFamily="2" charset="0"/>
+                <a:cs typeface="Roboto" panose="02000000000000000000" pitchFamily="2" charset="0"/>
+              </a:rPr>
+              <a:t>;</a:t>
+            </a:r>
+          </a:p>
+          <a:p>
+            <a:pPr marL="228600" indent="-228600">
+              <a:buClr>
+                <a:schemeClr val="dk1"/>
+              </a:buClr>
+              <a:buSzPts val="2000"/>
+              <a:buFont typeface="Arial"/>
+              <a:buChar char="•"/>
+            </a:pPr>
+            <a:r>
+              <a:rPr lang="en-US" sz="2000" b="1" dirty="0">
+                <a:latin typeface="Roboto" panose="02000000000000000000" pitchFamily="2" charset="0"/>
+                <a:ea typeface="Roboto" panose="02000000000000000000" pitchFamily="2" charset="0"/>
+                <a:cs typeface="Roboto" panose="02000000000000000000" pitchFamily="2" charset="0"/>
+              </a:rPr>
+              <a:t>MRI are normalized by ICV: </a:t>
+            </a:r>
+            <a:r>
+              <a:rPr lang="en-US" sz="2000" i="1" dirty="0">
+                <a:latin typeface="Roboto" panose="02000000000000000000" pitchFamily="2" charset="0"/>
+                <a:ea typeface="Roboto" panose="02000000000000000000" pitchFamily="2" charset="0"/>
+                <a:cs typeface="Roboto" panose="02000000000000000000" pitchFamily="2" charset="0"/>
+              </a:rPr>
+              <a:t>Ventricles</a:t>
+            </a:r>
+            <a:r>
+              <a:rPr lang="en-US" sz="2000" dirty="0">
+                <a:latin typeface="Roboto" panose="02000000000000000000" pitchFamily="2" charset="0"/>
+                <a:ea typeface="Roboto" panose="02000000000000000000" pitchFamily="2" charset="0"/>
+                <a:cs typeface="Roboto" panose="02000000000000000000" pitchFamily="2" charset="0"/>
               </a:rPr>
               <a:t>, </a:t>
             </a:r>
             <a:r>
-              <a:rPr lang="en-US" sz="2000" i="1" noProof="0" dirty="0">
-                <a:solidFill>
-                  <a:schemeClr val="dk1"/>
-                </a:solidFill>
-                <a:latin typeface="Roboto"/>
-                <a:ea typeface="Roboto"/>
-                <a:cs typeface="Roboto"/>
-                <a:sym typeface="Roboto"/>
-              </a:rPr>
-              <a:t>EcogSPTotal</a:t>
-            </a:r>
-            <a:r>
-              <a:rPr lang="en-US" sz="2000" noProof="0" dirty="0">
-                <a:solidFill>
-                  <a:schemeClr val="dk1"/>
-                </a:solidFill>
-                <a:latin typeface="Roboto"/>
-                <a:ea typeface="Roboto"/>
-                <a:cs typeface="Roboto"/>
-                <a:sym typeface="Roboto"/>
+              <a:rPr lang="en-US" sz="2000" i="1" dirty="0">
+                <a:latin typeface="Roboto" panose="02000000000000000000" pitchFamily="2" charset="0"/>
+                <a:ea typeface="Roboto" panose="02000000000000000000" pitchFamily="2" charset="0"/>
+                <a:cs typeface="Roboto" panose="02000000000000000000" pitchFamily="2" charset="0"/>
+              </a:rPr>
+              <a:t>Hippocampus</a:t>
+            </a:r>
+            <a:r>
+              <a:rPr lang="en-US" sz="2000" dirty="0">
+                <a:latin typeface="Roboto" panose="02000000000000000000" pitchFamily="2" charset="0"/>
+                <a:ea typeface="Roboto" panose="02000000000000000000" pitchFamily="2" charset="0"/>
+                <a:cs typeface="Roboto" panose="02000000000000000000" pitchFamily="2" charset="0"/>
               </a:rPr>
               <a:t>, </a:t>
             </a:r>
             <a:r>
-              <a:rPr lang="en-US" sz="2000" i="1" noProof="0" dirty="0">
-                <a:solidFill>
-                  <a:schemeClr val="dk1"/>
-                </a:solidFill>
-                <a:latin typeface="Roboto"/>
-                <a:ea typeface="Roboto"/>
-                <a:cs typeface="Roboto"/>
-                <a:sym typeface="Roboto"/>
-              </a:rPr>
-              <a:t>mPACCtrailsB</a:t>
-            </a:r>
-            <a:r>
-              <a:rPr lang="en-US" sz="2000" noProof="0" dirty="0">
-                <a:solidFill>
-                  <a:schemeClr val="dk1"/>
-                </a:solidFill>
-                <a:latin typeface="Roboto"/>
-                <a:ea typeface="Roboto"/>
-                <a:cs typeface="Roboto"/>
-                <a:sym typeface="Roboto"/>
+              <a:rPr lang="en-US" sz="2000" i="1" dirty="0">
+                <a:latin typeface="Roboto" panose="02000000000000000000" pitchFamily="2" charset="0"/>
+                <a:ea typeface="Roboto" panose="02000000000000000000" pitchFamily="2" charset="0"/>
+                <a:cs typeface="Roboto" panose="02000000000000000000" pitchFamily="2" charset="0"/>
+              </a:rPr>
+              <a:t>Entorhinal</a:t>
+            </a:r>
+            <a:r>
+              <a:rPr lang="en-US" sz="2000" dirty="0">
+                <a:latin typeface="Roboto" panose="02000000000000000000" pitchFamily="2" charset="0"/>
+                <a:ea typeface="Roboto" panose="02000000000000000000" pitchFamily="2" charset="0"/>
+                <a:cs typeface="Roboto" panose="02000000000000000000" pitchFamily="2" charset="0"/>
+              </a:rPr>
+              <a:t>, </a:t>
+            </a:r>
+            <a:r>
+              <a:rPr lang="en-US" sz="2000" i="1" dirty="0">
+                <a:latin typeface="Roboto" panose="02000000000000000000" pitchFamily="2" charset="0"/>
+                <a:ea typeface="Roboto" panose="02000000000000000000" pitchFamily="2" charset="0"/>
+                <a:cs typeface="Roboto" panose="02000000000000000000" pitchFamily="2" charset="0"/>
+              </a:rPr>
+              <a:t>Fusiform</a:t>
+            </a:r>
+            <a:r>
+              <a:rPr lang="en-US" sz="2000" dirty="0">
+                <a:latin typeface="Roboto" panose="02000000000000000000" pitchFamily="2" charset="0"/>
+                <a:ea typeface="Roboto" panose="02000000000000000000" pitchFamily="2" charset="0"/>
+                <a:cs typeface="Roboto" panose="02000000000000000000" pitchFamily="2" charset="0"/>
+              </a:rPr>
+              <a:t>, </a:t>
+            </a:r>
+            <a:r>
+              <a:rPr lang="en-US" sz="2000" i="1" dirty="0" err="1">
+                <a:latin typeface="Roboto" panose="02000000000000000000" pitchFamily="2" charset="0"/>
+                <a:ea typeface="Roboto" panose="02000000000000000000" pitchFamily="2" charset="0"/>
+                <a:cs typeface="Roboto" panose="02000000000000000000" pitchFamily="2" charset="0"/>
+              </a:rPr>
+              <a:t>MidTemp</a:t>
+            </a:r>
+            <a:r>
+              <a:rPr lang="en-US" sz="2000" dirty="0">
+                <a:latin typeface="Roboto" panose="02000000000000000000" pitchFamily="2" charset="0"/>
+                <a:ea typeface="Roboto" panose="02000000000000000000" pitchFamily="2" charset="0"/>
+                <a:cs typeface="Roboto" panose="02000000000000000000" pitchFamily="2" charset="0"/>
+              </a:rPr>
+              <a:t>, </a:t>
+            </a:r>
+            <a:r>
+              <a:rPr lang="en-US" sz="2000" i="1" dirty="0" err="1">
+                <a:latin typeface="Roboto" panose="02000000000000000000" pitchFamily="2" charset="0"/>
+                <a:ea typeface="Roboto" panose="02000000000000000000" pitchFamily="2" charset="0"/>
+                <a:cs typeface="Roboto" panose="02000000000000000000" pitchFamily="2" charset="0"/>
+              </a:rPr>
+              <a:t>WholeBrain</a:t>
+            </a:r>
+            <a:r>
+              <a:rPr lang="en-US" sz="2000" dirty="0">
+                <a:latin typeface="Roboto" panose="02000000000000000000" pitchFamily="2" charset="0"/>
+                <a:ea typeface="Roboto" panose="02000000000000000000" pitchFamily="2" charset="0"/>
+                <a:cs typeface="Roboto" panose="02000000000000000000" pitchFamily="2" charset="0"/>
+              </a:rPr>
+              <a:t>, </a:t>
+            </a:r>
+            <a:r>
+              <a:rPr lang="en-US" sz="2000" i="1" dirty="0">
+                <a:latin typeface="Roboto" panose="02000000000000000000" pitchFamily="2" charset="0"/>
+                <a:ea typeface="Roboto" panose="02000000000000000000" pitchFamily="2" charset="0"/>
+                <a:cs typeface="Roboto" panose="02000000000000000000" pitchFamily="2" charset="0"/>
+              </a:rPr>
+              <a:t>ICV</a:t>
+            </a:r>
+            <a:r>
+              <a:rPr lang="en-US" sz="2000" dirty="0">
+                <a:latin typeface="Roboto" panose="02000000000000000000" pitchFamily="2" charset="0"/>
+                <a:ea typeface="Roboto" panose="02000000000000000000" pitchFamily="2" charset="0"/>
+                <a:cs typeface="Roboto" panose="02000000000000000000" pitchFamily="2" charset="0"/>
+              </a:rPr>
+              <a:t> are replaced by </a:t>
+            </a:r>
+            <a:r>
+              <a:rPr lang="en-US" sz="2000" i="1" dirty="0">
+                <a:latin typeface="Roboto" panose="02000000000000000000" pitchFamily="2" charset="0"/>
+                <a:ea typeface="Roboto" panose="02000000000000000000" pitchFamily="2" charset="0"/>
+                <a:cs typeface="Roboto" panose="02000000000000000000" pitchFamily="2" charset="0"/>
+              </a:rPr>
+              <a:t>Ventricles/ICV</a:t>
+            </a:r>
+            <a:r>
+              <a:rPr lang="en-US" sz="2000" dirty="0">
+                <a:latin typeface="Roboto" panose="02000000000000000000" pitchFamily="2" charset="0"/>
+                <a:ea typeface="Roboto" panose="02000000000000000000" pitchFamily="2" charset="0"/>
+                <a:cs typeface="Roboto" panose="02000000000000000000" pitchFamily="2" charset="0"/>
+              </a:rPr>
+              <a:t>, </a:t>
+            </a:r>
+            <a:r>
+              <a:rPr lang="en-US" sz="2000" i="1" dirty="0">
+                <a:latin typeface="Roboto" panose="02000000000000000000" pitchFamily="2" charset="0"/>
+                <a:ea typeface="Roboto" panose="02000000000000000000" pitchFamily="2" charset="0"/>
+                <a:cs typeface="Roboto" panose="02000000000000000000" pitchFamily="2" charset="0"/>
+              </a:rPr>
+              <a:t>Hippocampus/ICV</a:t>
+            </a:r>
+            <a:r>
+              <a:rPr lang="en-US" sz="2000" dirty="0">
+                <a:latin typeface="Roboto" panose="02000000000000000000" pitchFamily="2" charset="0"/>
+                <a:ea typeface="Roboto" panose="02000000000000000000" pitchFamily="2" charset="0"/>
+                <a:cs typeface="Roboto" panose="02000000000000000000" pitchFamily="2" charset="0"/>
+              </a:rPr>
+              <a:t>, </a:t>
+            </a:r>
+            <a:r>
+              <a:rPr lang="en-US" sz="2000" i="1" dirty="0">
+                <a:latin typeface="Roboto" panose="02000000000000000000" pitchFamily="2" charset="0"/>
+                <a:ea typeface="Roboto" panose="02000000000000000000" pitchFamily="2" charset="0"/>
+                <a:cs typeface="Roboto" panose="02000000000000000000" pitchFamily="2" charset="0"/>
+              </a:rPr>
+              <a:t>Entorhinal/ICV</a:t>
+            </a:r>
+            <a:r>
+              <a:rPr lang="en-US" sz="2000" dirty="0">
+                <a:latin typeface="Roboto" panose="02000000000000000000" pitchFamily="2" charset="0"/>
+                <a:ea typeface="Roboto" panose="02000000000000000000" pitchFamily="2" charset="0"/>
+                <a:cs typeface="Roboto" panose="02000000000000000000" pitchFamily="2" charset="0"/>
+              </a:rPr>
+              <a:t>, </a:t>
+            </a:r>
+            <a:r>
+              <a:rPr lang="en-US" sz="2000" i="1" dirty="0">
+                <a:latin typeface="Roboto" panose="02000000000000000000" pitchFamily="2" charset="0"/>
+                <a:ea typeface="Roboto" panose="02000000000000000000" pitchFamily="2" charset="0"/>
+                <a:cs typeface="Roboto" panose="02000000000000000000" pitchFamily="2" charset="0"/>
+              </a:rPr>
+              <a:t>Fusiform/ICV</a:t>
+            </a:r>
+            <a:r>
+              <a:rPr lang="en-US" sz="2000" dirty="0">
+                <a:latin typeface="Roboto" panose="02000000000000000000" pitchFamily="2" charset="0"/>
+                <a:ea typeface="Roboto" panose="02000000000000000000" pitchFamily="2" charset="0"/>
+                <a:cs typeface="Roboto" panose="02000000000000000000" pitchFamily="2" charset="0"/>
+              </a:rPr>
+              <a:t>, </a:t>
+            </a:r>
+            <a:r>
+              <a:rPr lang="en-US" sz="2000" i="1" dirty="0" err="1">
+                <a:latin typeface="Roboto" panose="02000000000000000000" pitchFamily="2" charset="0"/>
+                <a:ea typeface="Roboto" panose="02000000000000000000" pitchFamily="2" charset="0"/>
+                <a:cs typeface="Roboto" panose="02000000000000000000" pitchFamily="2" charset="0"/>
+              </a:rPr>
+              <a:t>MidTemp</a:t>
+            </a:r>
+            <a:r>
+              <a:rPr lang="en-US" sz="2000" i="1" dirty="0">
+                <a:latin typeface="Roboto" panose="02000000000000000000" pitchFamily="2" charset="0"/>
+                <a:ea typeface="Roboto" panose="02000000000000000000" pitchFamily="2" charset="0"/>
+                <a:cs typeface="Roboto" panose="02000000000000000000" pitchFamily="2" charset="0"/>
+              </a:rPr>
+              <a:t>/ICV</a:t>
+            </a:r>
+            <a:r>
+              <a:rPr lang="en-US" sz="2000" dirty="0">
+                <a:latin typeface="Roboto" panose="02000000000000000000" pitchFamily="2" charset="0"/>
+                <a:ea typeface="Roboto" panose="02000000000000000000" pitchFamily="2" charset="0"/>
+                <a:cs typeface="Roboto" panose="02000000000000000000" pitchFamily="2" charset="0"/>
               </a:rPr>
               <a:t>, and </a:t>
             </a:r>
             <a:r>
-              <a:rPr lang="en-US" sz="2000" i="1" noProof="0" dirty="0">
-                <a:solidFill>
-                  <a:schemeClr val="dk1"/>
-                </a:solidFill>
-                <a:latin typeface="Roboto"/>
-                <a:ea typeface="Roboto"/>
-                <a:cs typeface="Roboto"/>
-                <a:sym typeface="Roboto"/>
-              </a:rPr>
-              <a:t>TAU</a:t>
-            </a:r>
-            <a:r>
-              <a:rPr lang="en-US" sz="2000" noProof="0" dirty="0">
-                <a:solidFill>
-                  <a:schemeClr val="dk1"/>
-                </a:solidFill>
-                <a:latin typeface="Roboto"/>
-                <a:ea typeface="Roboto"/>
-                <a:cs typeface="Roboto"/>
-                <a:sym typeface="Roboto"/>
-              </a:rPr>
-              <a:t> were removed because they had a high correlation with other features and their informative value was low.</a:t>
+              <a:rPr lang="en-US" sz="2000" i="1" dirty="0" err="1">
+                <a:latin typeface="Roboto" panose="02000000000000000000" pitchFamily="2" charset="0"/>
+                <a:ea typeface="Roboto" panose="02000000000000000000" pitchFamily="2" charset="0"/>
+                <a:cs typeface="Roboto" panose="02000000000000000000" pitchFamily="2" charset="0"/>
+              </a:rPr>
+              <a:t>WholeBrain</a:t>
+            </a:r>
+            <a:r>
+              <a:rPr lang="en-US" sz="2000" i="1" dirty="0">
+                <a:latin typeface="Roboto" panose="02000000000000000000" pitchFamily="2" charset="0"/>
+                <a:ea typeface="Roboto" panose="02000000000000000000" pitchFamily="2" charset="0"/>
+                <a:cs typeface="Roboto" panose="02000000000000000000" pitchFamily="2" charset="0"/>
+              </a:rPr>
+              <a:t>/ICV</a:t>
+            </a:r>
+            <a:r>
+              <a:rPr lang="en-US" sz="2000" dirty="0">
+                <a:latin typeface="Roboto" panose="02000000000000000000" pitchFamily="2" charset="0"/>
+                <a:ea typeface="Roboto" panose="02000000000000000000" pitchFamily="2" charset="0"/>
+                <a:cs typeface="Roboto" panose="02000000000000000000" pitchFamily="2" charset="0"/>
+              </a:rPr>
+              <a:t>;</a:t>
             </a:r>
           </a:p>
           <a:p>
@@ -23283,34 +24319,174 @@
               <a:buFont typeface="Arial"/>
               <a:buChar char="•"/>
             </a:pPr>
-            <a:endParaRPr lang="en-US" sz="2000" noProof="0" dirty="0">
-              <a:solidFill>
-                <a:schemeClr val="dk1"/>
-              </a:solidFill>
-              <a:latin typeface="Roboto"/>
-              <a:ea typeface="Roboto"/>
-              <a:cs typeface="Roboto"/>
-              <a:sym typeface="Roboto"/>
-            </a:endParaRPr>
-          </a:p>
-          <a:p>
-            <a:pPr marL="228600" lvl="0" indent="-228600">
-              <a:buClr>
-                <a:schemeClr val="dk1"/>
-              </a:buClr>
-              <a:buSzPts val="2000"/>
-              <a:buFont typeface="Arial"/>
-              <a:buChar char="•"/>
-            </a:pPr>
-            <a:endParaRPr lang="en-US" sz="2000" noProof="0" dirty="0">
-              <a:solidFill>
-                <a:schemeClr val="dk1"/>
-              </a:solidFill>
-              <a:latin typeface="Roboto"/>
-              <a:ea typeface="Roboto"/>
-              <a:cs typeface="Roboto"/>
-              <a:sym typeface="Roboto"/>
-            </a:endParaRPr>
+            <a:r>
+              <a:rPr lang="en-US" sz="2000" b="1" noProof="0" dirty="0">
+                <a:solidFill>
+                  <a:schemeClr val="dk1"/>
+                </a:solidFill>
+                <a:latin typeface="Roboto" panose="02000000000000000000" pitchFamily="2" charset="0"/>
+                <a:ea typeface="Roboto" panose="02000000000000000000" pitchFamily="2" charset="0"/>
+                <a:cs typeface="Roboto" panose="02000000000000000000" pitchFamily="2" charset="0"/>
+                <a:sym typeface="Roboto"/>
+              </a:rPr>
+              <a:t>Removal of redundant features: </a:t>
+            </a:r>
+            <a:r>
+              <a:rPr lang="en-US" sz="2000" i="1" noProof="0" dirty="0">
+                <a:solidFill>
+                  <a:schemeClr val="dk1"/>
+                </a:solidFill>
+                <a:latin typeface="Roboto" panose="02000000000000000000" pitchFamily="2" charset="0"/>
+                <a:ea typeface="Roboto" panose="02000000000000000000" pitchFamily="2" charset="0"/>
+                <a:cs typeface="Roboto" panose="02000000000000000000" pitchFamily="2" charset="0"/>
+                <a:sym typeface="Roboto"/>
+              </a:rPr>
+              <a:t>ADAS11</a:t>
+            </a:r>
+            <a:r>
+              <a:rPr lang="en-US" sz="2000" noProof="0" dirty="0">
+                <a:solidFill>
+                  <a:schemeClr val="dk1"/>
+                </a:solidFill>
+                <a:latin typeface="Roboto" panose="02000000000000000000" pitchFamily="2" charset="0"/>
+                <a:ea typeface="Roboto" panose="02000000000000000000" pitchFamily="2" charset="0"/>
+                <a:cs typeface="Roboto" panose="02000000000000000000" pitchFamily="2" charset="0"/>
+                <a:sym typeface="Roboto"/>
+              </a:rPr>
+              <a:t>, </a:t>
+            </a:r>
+            <a:r>
+              <a:rPr lang="en-US" sz="2000" i="1" noProof="0" dirty="0">
+                <a:solidFill>
+                  <a:schemeClr val="dk1"/>
+                </a:solidFill>
+                <a:latin typeface="Roboto" panose="02000000000000000000" pitchFamily="2" charset="0"/>
+                <a:ea typeface="Roboto" panose="02000000000000000000" pitchFamily="2" charset="0"/>
+                <a:cs typeface="Roboto" panose="02000000000000000000" pitchFamily="2" charset="0"/>
+                <a:sym typeface="Roboto"/>
+              </a:rPr>
+              <a:t>ADASQ4</a:t>
+            </a:r>
+            <a:r>
+              <a:rPr lang="en-US" sz="2000" noProof="0" dirty="0">
+                <a:solidFill>
+                  <a:schemeClr val="dk1"/>
+                </a:solidFill>
+                <a:latin typeface="Roboto" panose="02000000000000000000" pitchFamily="2" charset="0"/>
+                <a:ea typeface="Roboto" panose="02000000000000000000" pitchFamily="2" charset="0"/>
+                <a:cs typeface="Roboto" panose="02000000000000000000" pitchFamily="2" charset="0"/>
+                <a:sym typeface="Roboto"/>
+              </a:rPr>
+              <a:t>, </a:t>
+            </a:r>
+            <a:r>
+              <a:rPr lang="en-US" sz="2000" i="1" noProof="0" dirty="0">
+                <a:solidFill>
+                  <a:schemeClr val="dk1"/>
+                </a:solidFill>
+                <a:latin typeface="Roboto" panose="02000000000000000000" pitchFamily="2" charset="0"/>
+                <a:ea typeface="Roboto" panose="02000000000000000000" pitchFamily="2" charset="0"/>
+                <a:cs typeface="Roboto" panose="02000000000000000000" pitchFamily="2" charset="0"/>
+                <a:sym typeface="Roboto"/>
+              </a:rPr>
+              <a:t>EcogPtTotal</a:t>
+            </a:r>
+            <a:r>
+              <a:rPr lang="en-US" sz="2000" noProof="0" dirty="0">
+                <a:solidFill>
+                  <a:schemeClr val="dk1"/>
+                </a:solidFill>
+                <a:latin typeface="Roboto" panose="02000000000000000000" pitchFamily="2" charset="0"/>
+                <a:ea typeface="Roboto" panose="02000000000000000000" pitchFamily="2" charset="0"/>
+                <a:cs typeface="Roboto" panose="02000000000000000000" pitchFamily="2" charset="0"/>
+                <a:sym typeface="Roboto"/>
+              </a:rPr>
+              <a:t>, </a:t>
+            </a:r>
+            <a:r>
+              <a:rPr lang="en-US" sz="2000" i="1" noProof="0" dirty="0" err="1">
+                <a:solidFill>
+                  <a:schemeClr val="dk1"/>
+                </a:solidFill>
+                <a:latin typeface="Roboto" panose="02000000000000000000" pitchFamily="2" charset="0"/>
+                <a:ea typeface="Roboto" panose="02000000000000000000" pitchFamily="2" charset="0"/>
+                <a:cs typeface="Roboto" panose="02000000000000000000" pitchFamily="2" charset="0"/>
+                <a:sym typeface="Roboto"/>
+              </a:rPr>
+              <a:t>EcogSPTotal</a:t>
+            </a:r>
+            <a:r>
+              <a:rPr lang="en-US" sz="2000" noProof="0" dirty="0">
+                <a:solidFill>
+                  <a:schemeClr val="dk1"/>
+                </a:solidFill>
+                <a:latin typeface="Roboto" panose="02000000000000000000" pitchFamily="2" charset="0"/>
+                <a:ea typeface="Roboto" panose="02000000000000000000" pitchFamily="2" charset="0"/>
+                <a:cs typeface="Roboto" panose="02000000000000000000" pitchFamily="2" charset="0"/>
+                <a:sym typeface="Roboto"/>
+              </a:rPr>
+              <a:t>, and </a:t>
+            </a:r>
+            <a:r>
+              <a:rPr lang="en-US" sz="2000" i="1" noProof="0" dirty="0" err="1">
+                <a:solidFill>
+                  <a:schemeClr val="dk1"/>
+                </a:solidFill>
+                <a:latin typeface="Roboto" panose="02000000000000000000" pitchFamily="2" charset="0"/>
+                <a:ea typeface="Roboto" panose="02000000000000000000" pitchFamily="2" charset="0"/>
+                <a:cs typeface="Roboto" panose="02000000000000000000" pitchFamily="2" charset="0"/>
+                <a:sym typeface="Roboto"/>
+              </a:rPr>
+              <a:t>mPACCtrailsB</a:t>
+            </a:r>
+            <a:r>
+              <a:rPr lang="en-US" sz="2000" i="1" dirty="0">
+                <a:solidFill>
+                  <a:schemeClr val="dk1"/>
+                </a:solidFill>
+                <a:latin typeface="Roboto" panose="02000000000000000000" pitchFamily="2" charset="0"/>
+                <a:ea typeface="Roboto" panose="02000000000000000000" pitchFamily="2" charset="0"/>
+                <a:cs typeface="Roboto" panose="02000000000000000000" pitchFamily="2" charset="0"/>
+                <a:sym typeface="Roboto"/>
+              </a:rPr>
+              <a:t> </a:t>
+            </a:r>
+            <a:r>
+              <a:rPr lang="en-US" sz="2000" noProof="0" dirty="0">
+                <a:solidFill>
+                  <a:schemeClr val="dk1"/>
+                </a:solidFill>
+                <a:latin typeface="Roboto" panose="02000000000000000000" pitchFamily="2" charset="0"/>
+                <a:ea typeface="Roboto" panose="02000000000000000000" pitchFamily="2" charset="0"/>
+                <a:cs typeface="Roboto" panose="02000000000000000000" pitchFamily="2" charset="0"/>
+                <a:sym typeface="Roboto"/>
+              </a:rPr>
+              <a:t>were removed because they had a high correlation with other features and their informative value was low</a:t>
+            </a:r>
+            <a:r>
+              <a:rPr lang="en-US" sz="2000" dirty="0">
+                <a:solidFill>
+                  <a:schemeClr val="dk1"/>
+                </a:solidFill>
+                <a:latin typeface="Roboto" panose="02000000000000000000" pitchFamily="2" charset="0"/>
+                <a:ea typeface="Roboto" panose="02000000000000000000" pitchFamily="2" charset="0"/>
+                <a:cs typeface="Roboto" panose="02000000000000000000" pitchFamily="2" charset="0"/>
+                <a:sym typeface="Roboto"/>
+              </a:rPr>
+              <a:t> compared to correlated features</a:t>
+            </a:r>
+            <a:r>
+              <a:rPr lang="en-US" sz="2000" noProof="0" dirty="0">
+                <a:solidFill>
+                  <a:schemeClr val="dk1"/>
+                </a:solidFill>
+                <a:latin typeface="Roboto" panose="02000000000000000000" pitchFamily="2" charset="0"/>
+                <a:ea typeface="Roboto" panose="02000000000000000000" pitchFamily="2" charset="0"/>
+                <a:cs typeface="Roboto" panose="02000000000000000000" pitchFamily="2" charset="0"/>
+                <a:sym typeface="Roboto"/>
+              </a:rPr>
+              <a:t>.</a:t>
+            </a:r>
           </a:p>
           <a:p>
             <a:pPr marL="228600" indent="-228600">
@@ -23322,36 +24498,177 @@
               <a:buChar char="•"/>
             </a:pPr>
             <a:r>
-              <a:rPr lang="en-US" sz="2000" b="1" dirty="0"/>
-              <a:t>Outcome of reduction: </a:t>
-            </a:r>
-            <a:r>
-              <a:rPr lang="en-US" sz="2000" dirty="0">
+              <a:rPr lang="en-US" sz="2000" b="1" dirty="0">
                 <a:latin typeface="Roboto" panose="02000000000000000000" pitchFamily="2" charset="0"/>
                 <a:ea typeface="Roboto" panose="02000000000000000000" pitchFamily="2" charset="0"/>
                 <a:cs typeface="Roboto" panose="02000000000000000000" pitchFamily="2" charset="0"/>
               </a:rPr>
-              <a:t>The resulting dataset is a compact multiclass baseline table containing only the most informative demographic, cognitive, CSF and MRI/ICV features, reducing noise and redundancy and forming a robust foundation for the modelling phase. </a:t>
-            </a:r>
-            <a:endParaRPr lang="en-US" sz="2000" dirty="0">
-              <a:solidFill>
-                <a:schemeClr val="dk1"/>
-              </a:solidFill>
-              <a:latin typeface="Roboto"/>
-              <a:ea typeface="Roboto"/>
-              <a:cs typeface="Roboto"/>
-              <a:sym typeface="Roboto"/>
-            </a:endParaRPr>
-          </a:p>
-          <a:p>
-            <a:pPr marL="228600" lvl="0" indent="-228600">
-              <a:buClr>
-                <a:schemeClr val="dk1"/>
-              </a:buClr>
-              <a:buSzPts val="2000"/>
-              <a:buFont typeface="Arial"/>
-              <a:buChar char="•"/>
-            </a:pPr>
+              <a:t>Outcome of reduction: </a:t>
+            </a:r>
+            <a:r>
+              <a:rPr lang="it-IT" sz="2000" dirty="0"/>
+              <a:t>The dataset </a:t>
+            </a:r>
+            <a:r>
+              <a:rPr lang="it-IT" sz="2000" dirty="0" err="1"/>
+              <a:t>is</a:t>
+            </a:r>
+            <a:r>
+              <a:rPr lang="it-IT" sz="2000" dirty="0"/>
+              <a:t> </a:t>
+            </a:r>
+            <a:r>
+              <a:rPr lang="it-IT" sz="2000" dirty="0" err="1"/>
+              <a:t>streamlined</a:t>
+            </a:r>
+            <a:r>
+              <a:rPr lang="it-IT" sz="2000" dirty="0"/>
+              <a:t> to key </a:t>
+            </a:r>
+            <a:r>
+              <a:rPr lang="it-IT" sz="2000" dirty="0" err="1"/>
+              <a:t>demographic</a:t>
+            </a:r>
+            <a:r>
+              <a:rPr lang="it-IT" sz="2000" dirty="0"/>
+              <a:t>, cognitive, CSF, and MRI features, </a:t>
+            </a:r>
+            <a:r>
+              <a:rPr lang="it-IT" sz="2000" dirty="0" err="1"/>
+              <a:t>minimizing</a:t>
+            </a:r>
+            <a:r>
+              <a:rPr lang="it-IT" sz="2000" dirty="0"/>
+              <a:t> </a:t>
+            </a:r>
+            <a:r>
+              <a:rPr lang="it-IT" sz="2000" dirty="0" err="1"/>
+              <a:t>noise</a:t>
+            </a:r>
+            <a:r>
+              <a:rPr lang="it-IT" sz="2000" dirty="0"/>
+              <a:t> and </a:t>
+            </a:r>
+            <a:r>
+              <a:rPr lang="it-IT" sz="2000" dirty="0" err="1"/>
+              <a:t>redundancy</a:t>
+            </a:r>
+            <a:r>
+              <a:rPr lang="it-IT" sz="2000" dirty="0"/>
+              <a:t> </a:t>
+            </a:r>
+            <a:r>
+              <a:rPr lang="it-IT" sz="2000" dirty="0" err="1"/>
+              <a:t>while</a:t>
+            </a:r>
+            <a:r>
+              <a:rPr lang="it-IT" sz="2000" dirty="0"/>
+              <a:t> </a:t>
+            </a:r>
+            <a:r>
+              <a:rPr lang="it-IT" sz="2000" dirty="0" err="1"/>
+              <a:t>preserving</a:t>
+            </a:r>
+            <a:r>
+              <a:rPr lang="it-IT" sz="2000" dirty="0"/>
+              <a:t> </a:t>
+            </a:r>
+            <a:r>
+              <a:rPr lang="it-IT" sz="2000" dirty="0" err="1"/>
+              <a:t>diagnostic</a:t>
+            </a:r>
+            <a:r>
+              <a:rPr lang="it-IT" sz="2000" dirty="0"/>
+              <a:t> information. </a:t>
+            </a:r>
+            <a:r>
+              <a:rPr lang="it-IT" sz="2000" dirty="0" err="1"/>
+              <a:t>This</a:t>
+            </a:r>
+            <a:r>
+              <a:rPr lang="it-IT" sz="2000" dirty="0"/>
+              <a:t> </a:t>
+            </a:r>
+            <a:r>
+              <a:rPr lang="it-IT" sz="2000" dirty="0" err="1"/>
+              <a:t>focused</a:t>
+            </a:r>
+            <a:r>
+              <a:rPr lang="it-IT" sz="2000" dirty="0"/>
+              <a:t> baseline </a:t>
+            </a:r>
+            <a:r>
+              <a:rPr lang="it-IT" sz="2000" dirty="0" err="1"/>
+              <a:t>table</a:t>
+            </a:r>
+            <a:r>
+              <a:rPr lang="it-IT" sz="2000" dirty="0"/>
+              <a:t> </a:t>
+            </a:r>
+            <a:r>
+              <a:rPr lang="it-IT" sz="2000" dirty="0" err="1"/>
+              <a:t>enhances</a:t>
+            </a:r>
+            <a:r>
+              <a:rPr lang="it-IT" sz="2000" dirty="0"/>
+              <a:t> model </a:t>
+            </a:r>
+            <a:r>
+              <a:rPr lang="it-IT" sz="2000" dirty="0" err="1"/>
+              <a:t>interpretability</a:t>
+            </a:r>
+            <a:r>
+              <a:rPr lang="it-IT" sz="2000" dirty="0"/>
+              <a:t>, </a:t>
+            </a:r>
+            <a:r>
+              <a:rPr lang="it-IT" sz="2000" dirty="0" err="1"/>
+              <a:t>prevents</a:t>
+            </a:r>
+            <a:r>
+              <a:rPr lang="it-IT" sz="2000" dirty="0"/>
+              <a:t> data leakage, and </a:t>
+            </a:r>
+            <a:r>
+              <a:rPr lang="it-IT" sz="2000" dirty="0" err="1"/>
+              <a:t>provides</a:t>
+            </a:r>
+            <a:r>
+              <a:rPr lang="it-IT" sz="2000" dirty="0"/>
+              <a:t> a </a:t>
+            </a:r>
+            <a:r>
+              <a:rPr lang="it-IT" sz="2000" dirty="0" err="1"/>
+              <a:t>robust</a:t>
+            </a:r>
+            <a:r>
+              <a:rPr lang="it-IT" sz="2000" dirty="0"/>
+              <a:t> </a:t>
+            </a:r>
+            <a:r>
+              <a:rPr lang="it-IT" sz="2000" dirty="0" err="1"/>
+              <a:t>foundation</a:t>
+            </a:r>
+            <a:r>
+              <a:rPr lang="it-IT" sz="2000" dirty="0"/>
+              <a:t> for </a:t>
+            </a:r>
+            <a:r>
+              <a:rPr lang="it-IT" sz="2000" dirty="0" err="1"/>
+              <a:t>multiclass</a:t>
+            </a:r>
+            <a:r>
+              <a:rPr lang="it-IT" sz="2000" dirty="0"/>
+              <a:t> </a:t>
+            </a:r>
+            <a:r>
+              <a:rPr lang="it-IT" sz="2000" dirty="0" err="1"/>
+              <a:t>classification</a:t>
+            </a:r>
+            <a:r>
+              <a:rPr lang="it-IT" sz="2000" dirty="0"/>
+              <a:t>. </a:t>
+            </a:r>
             <a:endParaRPr lang="en-US" sz="2000" noProof="0" dirty="0">
               <a:latin typeface="Roboto" panose="02000000000000000000" pitchFamily="2" charset="0"/>
               <a:ea typeface="Roboto" panose="02000000000000000000" pitchFamily="2" charset="0"/>
@@ -23544,7 +24861,7 @@
 </p:sld>
 </file>
 
-<file path=ppt/slides/slide17.xml><?xml version="1.0" encoding="utf-8"?>
+<file path=ppt/slides/slide18.xml><?xml version="1.0" encoding="utf-8"?>
 <p:sld xmlns:a="http://schemas.openxmlformats.org/drawingml/2006/main" xmlns:r="http://schemas.openxmlformats.org/officeDocument/2006/relationships" xmlns:p="http://schemas.openxmlformats.org/presentationml/2006/main">
   <p:cSld>
     <p:bg>
@@ -23980,7 +25297,7 @@
 </p:sld>
 </file>
 
-<file path=ppt/slides/slide18.xml><?xml version="1.0" encoding="utf-8"?>
+<file path=ppt/slides/slide19.xml><?xml version="1.0" encoding="utf-8"?>
 <p:sld xmlns:a="http://schemas.openxmlformats.org/drawingml/2006/main" xmlns:r="http://schemas.openxmlformats.org/officeDocument/2006/relationships" xmlns:p="http://schemas.openxmlformats.org/presentationml/2006/main">
   <p:cSld>
     <p:bg>
@@ -24081,7 +25398,808 @@
 </p:sld>
 </file>
 
-<file path=ppt/slides/slide19.xml><?xml version="1.0" encoding="utf-8"?>
+<file path=ppt/slides/slide2.xml><?xml version="1.0" encoding="utf-8"?>
+<p:sld xmlns:a="http://schemas.openxmlformats.org/drawingml/2006/main" xmlns:r="http://schemas.openxmlformats.org/officeDocument/2006/relationships" xmlns:p="http://schemas.openxmlformats.org/presentationml/2006/main">
+  <p:cSld>
+    <p:bg>
+      <p:bgPr>
+        <a:solidFill>
+          <a:schemeClr val="lt1"/>
+        </a:solidFill>
+        <a:effectLst/>
+      </p:bgPr>
+    </p:bg>
+    <p:spTree>
+      <p:nvGrpSpPr>
+        <p:cNvPr id="1" name="Shape 119"/>
+        <p:cNvGrpSpPr/>
+        <p:nvPr/>
+      </p:nvGrpSpPr>
+      <p:grpSpPr>
+        <a:xfrm>
+          <a:off x="0" y="0"/>
+          <a:ext cx="0" cy="0"/>
+          <a:chOff x="0" y="0"/>
+          <a:chExt cx="0" cy="0"/>
+        </a:xfrm>
+      </p:grpSpPr>
+      <p:sp>
+        <p:nvSpPr>
+          <p:cNvPr id="120" name="Google Shape;120;p3"/>
+          <p:cNvSpPr/>
+          <p:nvPr/>
+        </p:nvSpPr>
+        <p:spPr>
+          <a:xfrm>
+            <a:off x="5422605" y="1981310"/>
+            <a:ext cx="6182020" cy="749596"/>
+          </a:xfrm>
+          <a:prstGeom prst="rect">
+            <a:avLst/>
+          </a:prstGeom>
+          <a:solidFill>
+            <a:schemeClr val="dk2"/>
+          </a:solidFill>
+          <a:ln>
+            <a:noFill/>
+          </a:ln>
+        </p:spPr>
+        <p:txBody>
+          <a:bodyPr spcFirstLastPara="1" wrap="square" lIns="91425" tIns="45700" rIns="91425" bIns="45700" anchor="ctr" anchorCtr="0">
+            <a:noAutofit/>
+          </a:bodyPr>
+          <a:lstStyle/>
+          <a:p>
+            <a:pPr marL="0" marR="0" lvl="0" indent="0" algn="ctr" rtl="0">
+              <a:spcBef>
+                <a:spcPts val="0"/>
+              </a:spcBef>
+              <a:spcAft>
+                <a:spcPts val="0"/>
+              </a:spcAft>
+              <a:buNone/>
+            </a:pPr>
+            <a:endParaRPr lang="en-US" sz="1800" noProof="0" dirty="0">
+              <a:solidFill>
+                <a:schemeClr val="lt1"/>
+              </a:solidFill>
+              <a:latin typeface="Roboto"/>
+              <a:ea typeface="Roboto"/>
+              <a:cs typeface="Roboto"/>
+              <a:sym typeface="Roboto"/>
+            </a:endParaRPr>
+          </a:p>
+        </p:txBody>
+      </p:sp>
+      <p:sp>
+        <p:nvSpPr>
+          <p:cNvPr id="121" name="Google Shape;121;p3"/>
+          <p:cNvSpPr/>
+          <p:nvPr/>
+        </p:nvSpPr>
+        <p:spPr>
+          <a:xfrm>
+            <a:off x="5422605" y="3014839"/>
+            <a:ext cx="6182020" cy="749596"/>
+          </a:xfrm>
+          <a:prstGeom prst="rect">
+            <a:avLst/>
+          </a:prstGeom>
+          <a:solidFill>
+            <a:schemeClr val="dk2"/>
+          </a:solidFill>
+          <a:ln>
+            <a:noFill/>
+          </a:ln>
+        </p:spPr>
+        <p:txBody>
+          <a:bodyPr spcFirstLastPara="1" wrap="square" lIns="91425" tIns="45700" rIns="91425" bIns="45700" anchor="ctr" anchorCtr="0">
+            <a:noAutofit/>
+          </a:bodyPr>
+          <a:lstStyle/>
+          <a:p>
+            <a:pPr marL="0" marR="0" lvl="0" indent="0" algn="ctr" rtl="0">
+              <a:spcBef>
+                <a:spcPts val="0"/>
+              </a:spcBef>
+              <a:spcAft>
+                <a:spcPts val="0"/>
+              </a:spcAft>
+              <a:buNone/>
+            </a:pPr>
+            <a:endParaRPr lang="en-US" sz="1800" noProof="0" dirty="0">
+              <a:solidFill>
+                <a:schemeClr val="lt1"/>
+              </a:solidFill>
+              <a:latin typeface="Roboto"/>
+              <a:ea typeface="Roboto"/>
+              <a:cs typeface="Roboto"/>
+              <a:sym typeface="Roboto"/>
+            </a:endParaRPr>
+          </a:p>
+        </p:txBody>
+      </p:sp>
+      <p:sp>
+        <p:nvSpPr>
+          <p:cNvPr id="122" name="Google Shape;122;p3"/>
+          <p:cNvSpPr/>
+          <p:nvPr/>
+        </p:nvSpPr>
+        <p:spPr>
+          <a:xfrm>
+            <a:off x="5422605" y="4048368"/>
+            <a:ext cx="6182020" cy="749596"/>
+          </a:xfrm>
+          <a:prstGeom prst="rect">
+            <a:avLst/>
+          </a:prstGeom>
+          <a:solidFill>
+            <a:schemeClr val="dk2"/>
+          </a:solidFill>
+          <a:ln>
+            <a:noFill/>
+          </a:ln>
+        </p:spPr>
+        <p:txBody>
+          <a:bodyPr spcFirstLastPara="1" wrap="square" lIns="91425" tIns="45700" rIns="91425" bIns="45700" anchor="ctr" anchorCtr="0">
+            <a:noAutofit/>
+          </a:bodyPr>
+          <a:lstStyle/>
+          <a:p>
+            <a:pPr marL="0" marR="0" lvl="0" indent="0" algn="ctr" rtl="0">
+              <a:spcBef>
+                <a:spcPts val="0"/>
+              </a:spcBef>
+              <a:spcAft>
+                <a:spcPts val="0"/>
+              </a:spcAft>
+              <a:buNone/>
+            </a:pPr>
+            <a:endParaRPr lang="en-US" sz="1800" noProof="0" dirty="0">
+              <a:solidFill>
+                <a:schemeClr val="lt1"/>
+              </a:solidFill>
+              <a:latin typeface="Roboto"/>
+              <a:ea typeface="Roboto"/>
+              <a:cs typeface="Roboto"/>
+              <a:sym typeface="Roboto"/>
+            </a:endParaRPr>
+          </a:p>
+        </p:txBody>
+      </p:sp>
+      <p:sp>
+        <p:nvSpPr>
+          <p:cNvPr id="123" name="Google Shape;123;p3"/>
+          <p:cNvSpPr/>
+          <p:nvPr/>
+        </p:nvSpPr>
+        <p:spPr>
+          <a:xfrm>
+            <a:off x="5422605" y="5081897"/>
+            <a:ext cx="6182020" cy="749596"/>
+          </a:xfrm>
+          <a:prstGeom prst="rect">
+            <a:avLst/>
+          </a:prstGeom>
+          <a:solidFill>
+            <a:schemeClr val="dk2"/>
+          </a:solidFill>
+          <a:ln>
+            <a:noFill/>
+          </a:ln>
+        </p:spPr>
+        <p:txBody>
+          <a:bodyPr spcFirstLastPara="1" wrap="square" lIns="91425" tIns="45700" rIns="91425" bIns="45700" anchor="ctr" anchorCtr="0">
+            <a:noAutofit/>
+          </a:bodyPr>
+          <a:lstStyle/>
+          <a:p>
+            <a:pPr marL="0" marR="0" lvl="0" indent="0" algn="ctr" rtl="0">
+              <a:spcBef>
+                <a:spcPts val="0"/>
+              </a:spcBef>
+              <a:spcAft>
+                <a:spcPts val="0"/>
+              </a:spcAft>
+              <a:buNone/>
+            </a:pPr>
+            <a:endParaRPr lang="en-US" sz="1800" noProof="0" dirty="0">
+              <a:solidFill>
+                <a:schemeClr val="lt1"/>
+              </a:solidFill>
+              <a:latin typeface="Roboto"/>
+              <a:ea typeface="Roboto"/>
+              <a:cs typeface="Roboto"/>
+              <a:sym typeface="Roboto"/>
+            </a:endParaRPr>
+          </a:p>
+        </p:txBody>
+      </p:sp>
+      <p:sp>
+        <p:nvSpPr>
+          <p:cNvPr id="124" name="Google Shape;124;p3"/>
+          <p:cNvSpPr/>
+          <p:nvPr/>
+        </p:nvSpPr>
+        <p:spPr>
+          <a:xfrm>
+            <a:off x="5422605" y="947781"/>
+            <a:ext cx="6182020" cy="749596"/>
+          </a:xfrm>
+          <a:prstGeom prst="rect">
+            <a:avLst/>
+          </a:prstGeom>
+          <a:solidFill>
+            <a:schemeClr val="dk2"/>
+          </a:solidFill>
+          <a:ln>
+            <a:noFill/>
+          </a:ln>
+        </p:spPr>
+        <p:txBody>
+          <a:bodyPr spcFirstLastPara="1" wrap="square" lIns="91425" tIns="45700" rIns="91425" bIns="45700" anchor="ctr" anchorCtr="0">
+            <a:noAutofit/>
+          </a:bodyPr>
+          <a:lstStyle/>
+          <a:p>
+            <a:pPr marL="0" marR="0" lvl="0" indent="0" algn="ctr" rtl="0">
+              <a:spcBef>
+                <a:spcPts val="0"/>
+              </a:spcBef>
+              <a:spcAft>
+                <a:spcPts val="0"/>
+              </a:spcAft>
+              <a:buNone/>
+            </a:pPr>
+            <a:endParaRPr lang="en-US" sz="1800" noProof="0" dirty="0">
+              <a:solidFill>
+                <a:schemeClr val="lt1"/>
+              </a:solidFill>
+              <a:latin typeface="Roboto"/>
+              <a:ea typeface="Roboto"/>
+              <a:cs typeface="Roboto"/>
+              <a:sym typeface="Roboto"/>
+            </a:endParaRPr>
+          </a:p>
+        </p:txBody>
+      </p:sp>
+      <p:sp>
+        <p:nvSpPr>
+          <p:cNvPr id="125" name="Google Shape;125;p3"/>
+          <p:cNvSpPr txBox="1">
+            <a:spLocks noGrp="1"/>
+          </p:cNvSpPr>
+          <p:nvPr>
+            <p:ph type="title"/>
+          </p:nvPr>
+        </p:nvSpPr>
+        <p:spPr>
+          <a:xfrm>
+            <a:off x="587375" y="2988788"/>
+            <a:ext cx="4510026" cy="880422"/>
+          </a:xfrm>
+          <a:prstGeom prst="rect">
+            <a:avLst/>
+          </a:prstGeom>
+          <a:noFill/>
+          <a:ln>
+            <a:noFill/>
+          </a:ln>
+        </p:spPr>
+        <p:txBody>
+          <a:bodyPr spcFirstLastPara="1" wrap="square" lIns="91425" tIns="45700" rIns="91425" bIns="45700" anchor="ctr" anchorCtr="0">
+            <a:normAutofit/>
+          </a:bodyPr>
+          <a:lstStyle/>
+          <a:p>
+            <a:pPr marL="0" lvl="0" indent="0" algn="l" rtl="0">
+              <a:lnSpc>
+                <a:spcPct val="90000"/>
+              </a:lnSpc>
+              <a:spcBef>
+                <a:spcPts val="0"/>
+              </a:spcBef>
+              <a:spcAft>
+                <a:spcPts val="0"/>
+              </a:spcAft>
+              <a:buClr>
+                <a:schemeClr val="dk2"/>
+              </a:buClr>
+              <a:buSzPts val="3200"/>
+              <a:buFont typeface="Roboto Medium"/>
+              <a:buNone/>
+            </a:pPr>
+            <a:r>
+              <a:rPr lang="en-US" sz="3200" b="1" noProof="0" dirty="0">
+                <a:solidFill>
+                  <a:schemeClr val="dk2"/>
+                </a:solidFill>
+                <a:latin typeface="Roboto Medium"/>
+                <a:ea typeface="Roboto Medium"/>
+                <a:cs typeface="Roboto Medium"/>
+                <a:sym typeface="Roboto Medium"/>
+              </a:rPr>
+              <a:t>Table of Contents</a:t>
+            </a:r>
+            <a:endParaRPr lang="en-US" noProof="0" dirty="0"/>
+          </a:p>
+        </p:txBody>
+      </p:sp>
+      <p:sp>
+        <p:nvSpPr>
+          <p:cNvPr id="126" name="Google Shape;126;p3"/>
+          <p:cNvSpPr txBox="1"/>
+          <p:nvPr/>
+        </p:nvSpPr>
+        <p:spPr>
+          <a:xfrm>
+            <a:off x="5854058" y="1091747"/>
+            <a:ext cx="683515" cy="461665"/>
+          </a:xfrm>
+          <a:prstGeom prst="rect">
+            <a:avLst/>
+          </a:prstGeom>
+          <a:noFill/>
+          <a:ln>
+            <a:noFill/>
+          </a:ln>
+        </p:spPr>
+        <p:txBody>
+          <a:bodyPr spcFirstLastPara="1" wrap="square" lIns="91425" tIns="45700" rIns="91425" bIns="45700" anchor="t" anchorCtr="0">
+            <a:spAutoFit/>
+          </a:bodyPr>
+          <a:lstStyle/>
+          <a:p>
+            <a:pPr marL="0" marR="0" lvl="0" indent="0" algn="l" rtl="0">
+              <a:spcBef>
+                <a:spcPts val="0"/>
+              </a:spcBef>
+              <a:spcAft>
+                <a:spcPts val="0"/>
+              </a:spcAft>
+              <a:buNone/>
+            </a:pPr>
+            <a:r>
+              <a:rPr lang="en-US" sz="2400" noProof="0" dirty="0">
+                <a:solidFill>
+                  <a:schemeClr val="lt2"/>
+                </a:solidFill>
+                <a:latin typeface="Roboto"/>
+                <a:ea typeface="Roboto"/>
+                <a:cs typeface="Roboto"/>
+                <a:sym typeface="Roboto"/>
+              </a:rPr>
+              <a:t>I</a:t>
+            </a:r>
+          </a:p>
+        </p:txBody>
+      </p:sp>
+      <p:sp>
+        <p:nvSpPr>
+          <p:cNvPr id="127" name="Google Shape;127;p3"/>
+          <p:cNvSpPr txBox="1"/>
+          <p:nvPr/>
+        </p:nvSpPr>
+        <p:spPr>
+          <a:xfrm>
+            <a:off x="5854058" y="2119441"/>
+            <a:ext cx="683515" cy="461665"/>
+          </a:xfrm>
+          <a:prstGeom prst="rect">
+            <a:avLst/>
+          </a:prstGeom>
+          <a:noFill/>
+          <a:ln>
+            <a:noFill/>
+          </a:ln>
+        </p:spPr>
+        <p:txBody>
+          <a:bodyPr spcFirstLastPara="1" wrap="square" lIns="91425" tIns="45700" rIns="91425" bIns="45700" anchor="t" anchorCtr="0">
+            <a:spAutoFit/>
+          </a:bodyPr>
+          <a:lstStyle/>
+          <a:p>
+            <a:pPr marL="0" marR="0" lvl="0" indent="0" algn="l" rtl="0">
+              <a:spcBef>
+                <a:spcPts val="0"/>
+              </a:spcBef>
+              <a:spcAft>
+                <a:spcPts val="0"/>
+              </a:spcAft>
+              <a:buNone/>
+            </a:pPr>
+            <a:r>
+              <a:rPr lang="en-US" sz="2400" noProof="0" dirty="0">
+                <a:solidFill>
+                  <a:schemeClr val="lt2"/>
+                </a:solidFill>
+                <a:latin typeface="Roboto"/>
+                <a:ea typeface="Roboto"/>
+                <a:cs typeface="Roboto"/>
+                <a:sym typeface="Roboto"/>
+              </a:rPr>
+              <a:t>II</a:t>
+            </a:r>
+          </a:p>
+        </p:txBody>
+      </p:sp>
+      <p:sp>
+        <p:nvSpPr>
+          <p:cNvPr id="128" name="Google Shape;128;p3"/>
+          <p:cNvSpPr txBox="1"/>
+          <p:nvPr/>
+        </p:nvSpPr>
+        <p:spPr>
+          <a:xfrm>
+            <a:off x="5854058" y="3157768"/>
+            <a:ext cx="683515" cy="461665"/>
+          </a:xfrm>
+          <a:prstGeom prst="rect">
+            <a:avLst/>
+          </a:prstGeom>
+          <a:noFill/>
+          <a:ln>
+            <a:noFill/>
+          </a:ln>
+        </p:spPr>
+        <p:txBody>
+          <a:bodyPr spcFirstLastPara="1" wrap="square" lIns="91425" tIns="45700" rIns="91425" bIns="45700" anchor="t" anchorCtr="0">
+            <a:spAutoFit/>
+          </a:bodyPr>
+          <a:lstStyle/>
+          <a:p>
+            <a:pPr marL="0" marR="0" lvl="0" indent="0" algn="l" rtl="0">
+              <a:spcBef>
+                <a:spcPts val="0"/>
+              </a:spcBef>
+              <a:spcAft>
+                <a:spcPts val="0"/>
+              </a:spcAft>
+              <a:buNone/>
+            </a:pPr>
+            <a:r>
+              <a:rPr lang="en-US" sz="2400" noProof="0" dirty="0">
+                <a:solidFill>
+                  <a:schemeClr val="lt2"/>
+                </a:solidFill>
+                <a:latin typeface="Roboto"/>
+                <a:ea typeface="Roboto"/>
+                <a:cs typeface="Roboto"/>
+                <a:sym typeface="Roboto"/>
+              </a:rPr>
+              <a:t>III</a:t>
+            </a:r>
+          </a:p>
+        </p:txBody>
+      </p:sp>
+      <p:sp>
+        <p:nvSpPr>
+          <p:cNvPr id="129" name="Google Shape;129;p3"/>
+          <p:cNvSpPr txBox="1"/>
+          <p:nvPr/>
+        </p:nvSpPr>
+        <p:spPr>
+          <a:xfrm>
+            <a:off x="5854058" y="4232015"/>
+            <a:ext cx="683515" cy="461665"/>
+          </a:xfrm>
+          <a:prstGeom prst="rect">
+            <a:avLst/>
+          </a:prstGeom>
+          <a:noFill/>
+          <a:ln>
+            <a:noFill/>
+          </a:ln>
+        </p:spPr>
+        <p:txBody>
+          <a:bodyPr spcFirstLastPara="1" wrap="square" lIns="91425" tIns="45700" rIns="91425" bIns="45700" anchor="t" anchorCtr="0">
+            <a:spAutoFit/>
+          </a:bodyPr>
+          <a:lstStyle/>
+          <a:p>
+            <a:pPr marL="0" marR="0" lvl="0" indent="0" algn="l" rtl="0">
+              <a:spcBef>
+                <a:spcPts val="0"/>
+              </a:spcBef>
+              <a:spcAft>
+                <a:spcPts val="0"/>
+              </a:spcAft>
+              <a:buNone/>
+            </a:pPr>
+            <a:r>
+              <a:rPr lang="en-US" sz="2400" noProof="0" dirty="0">
+                <a:solidFill>
+                  <a:schemeClr val="lt2"/>
+                </a:solidFill>
+                <a:latin typeface="Roboto"/>
+                <a:ea typeface="Roboto"/>
+                <a:cs typeface="Roboto"/>
+                <a:sym typeface="Roboto"/>
+              </a:rPr>
+              <a:t>IV</a:t>
+            </a:r>
+          </a:p>
+        </p:txBody>
+      </p:sp>
+      <p:sp>
+        <p:nvSpPr>
+          <p:cNvPr id="130" name="Google Shape;130;p3"/>
+          <p:cNvSpPr txBox="1"/>
+          <p:nvPr/>
+        </p:nvSpPr>
+        <p:spPr>
+          <a:xfrm>
+            <a:off x="5854058" y="5223790"/>
+            <a:ext cx="683515" cy="461665"/>
+          </a:xfrm>
+          <a:prstGeom prst="rect">
+            <a:avLst/>
+          </a:prstGeom>
+          <a:noFill/>
+          <a:ln>
+            <a:noFill/>
+          </a:ln>
+        </p:spPr>
+        <p:txBody>
+          <a:bodyPr spcFirstLastPara="1" wrap="square" lIns="91425" tIns="45700" rIns="91425" bIns="45700" anchor="t" anchorCtr="0">
+            <a:spAutoFit/>
+          </a:bodyPr>
+          <a:lstStyle/>
+          <a:p>
+            <a:pPr marL="0" marR="0" lvl="0" indent="0" algn="l" rtl="0">
+              <a:spcBef>
+                <a:spcPts val="0"/>
+              </a:spcBef>
+              <a:spcAft>
+                <a:spcPts val="0"/>
+              </a:spcAft>
+              <a:buNone/>
+            </a:pPr>
+            <a:r>
+              <a:rPr lang="en-US" sz="2400" noProof="0" dirty="0">
+                <a:solidFill>
+                  <a:schemeClr val="lt2"/>
+                </a:solidFill>
+                <a:latin typeface="Roboto"/>
+                <a:ea typeface="Roboto"/>
+                <a:cs typeface="Roboto"/>
+                <a:sym typeface="Roboto"/>
+              </a:rPr>
+              <a:t>V</a:t>
+            </a:r>
+          </a:p>
+        </p:txBody>
+      </p:sp>
+      <p:sp>
+        <p:nvSpPr>
+          <p:cNvPr id="131" name="Google Shape;131;p3"/>
+          <p:cNvSpPr txBox="1"/>
+          <p:nvPr/>
+        </p:nvSpPr>
+        <p:spPr>
+          <a:xfrm>
+            <a:off x="6715796" y="1091747"/>
+            <a:ext cx="4888829" cy="400069"/>
+          </a:xfrm>
+          <a:prstGeom prst="rect">
+            <a:avLst/>
+          </a:prstGeom>
+          <a:noFill/>
+          <a:ln>
+            <a:noFill/>
+          </a:ln>
+        </p:spPr>
+        <p:txBody>
+          <a:bodyPr spcFirstLastPara="1" wrap="square" lIns="91425" tIns="45700" rIns="91425" bIns="45700" anchor="t" anchorCtr="0">
+            <a:spAutoFit/>
+          </a:bodyPr>
+          <a:lstStyle/>
+          <a:p>
+            <a:pPr lvl="0"/>
+            <a:r>
+              <a:rPr lang="en-US" sz="2000" noProof="0" dirty="0">
+                <a:solidFill>
+                  <a:schemeClr val="lt1"/>
+                </a:solidFill>
+                <a:latin typeface="Roboto"/>
+                <a:ea typeface="Roboto"/>
+                <a:cs typeface="Roboto"/>
+                <a:sym typeface="Roboto"/>
+              </a:rPr>
+              <a:t>Motivations and Clinical Background</a:t>
+            </a:r>
+          </a:p>
+        </p:txBody>
+      </p:sp>
+      <p:sp>
+        <p:nvSpPr>
+          <p:cNvPr id="132" name="Google Shape;132;p3"/>
+          <p:cNvSpPr txBox="1"/>
+          <p:nvPr/>
+        </p:nvSpPr>
+        <p:spPr>
+          <a:xfrm>
+            <a:off x="6715796" y="2119441"/>
+            <a:ext cx="4888829" cy="400069"/>
+          </a:xfrm>
+          <a:prstGeom prst="rect">
+            <a:avLst/>
+          </a:prstGeom>
+          <a:noFill/>
+          <a:ln>
+            <a:noFill/>
+          </a:ln>
+        </p:spPr>
+        <p:txBody>
+          <a:bodyPr spcFirstLastPara="1" wrap="square" lIns="91425" tIns="45700" rIns="91425" bIns="45700" anchor="t" anchorCtr="0">
+            <a:spAutoFit/>
+          </a:bodyPr>
+          <a:lstStyle/>
+          <a:p>
+            <a:pPr marL="0" marR="0" lvl="0" indent="0" algn="l" rtl="0">
+              <a:spcBef>
+                <a:spcPts val="0"/>
+              </a:spcBef>
+              <a:spcAft>
+                <a:spcPts val="0"/>
+              </a:spcAft>
+              <a:buNone/>
+            </a:pPr>
+            <a:r>
+              <a:rPr lang="en-US" sz="2000" noProof="0" dirty="0">
+                <a:solidFill>
+                  <a:schemeClr val="lt1"/>
+                </a:solidFill>
+                <a:latin typeface="Roboto"/>
+                <a:ea typeface="Roboto"/>
+                <a:cs typeface="Roboto"/>
+                <a:sym typeface="Roboto"/>
+              </a:rPr>
+              <a:t>Dataset ADNI</a:t>
+            </a:r>
+          </a:p>
+        </p:txBody>
+      </p:sp>
+      <p:sp>
+        <p:nvSpPr>
+          <p:cNvPr id="133" name="Google Shape;133;p3"/>
+          <p:cNvSpPr txBox="1"/>
+          <p:nvPr/>
+        </p:nvSpPr>
+        <p:spPr>
+          <a:xfrm>
+            <a:off x="6715796" y="3157768"/>
+            <a:ext cx="4888829" cy="400069"/>
+          </a:xfrm>
+          <a:prstGeom prst="rect">
+            <a:avLst/>
+          </a:prstGeom>
+          <a:noFill/>
+          <a:ln>
+            <a:noFill/>
+          </a:ln>
+        </p:spPr>
+        <p:txBody>
+          <a:bodyPr spcFirstLastPara="1" wrap="square" lIns="91425" tIns="45700" rIns="91425" bIns="45700" anchor="t" anchorCtr="0">
+            <a:spAutoFit/>
+          </a:bodyPr>
+          <a:lstStyle/>
+          <a:p>
+            <a:pPr lvl="0"/>
+            <a:r>
+              <a:rPr lang="en-US" sz="2000" noProof="0" dirty="0">
+                <a:solidFill>
+                  <a:schemeClr val="lt1"/>
+                </a:solidFill>
+                <a:latin typeface="Roboto"/>
+                <a:ea typeface="Roboto"/>
+                <a:cs typeface="Roboto"/>
+                <a:sym typeface="Roboto"/>
+              </a:rPr>
+              <a:t>Preprocessing</a:t>
+            </a:r>
+          </a:p>
+        </p:txBody>
+      </p:sp>
+      <p:sp>
+        <p:nvSpPr>
+          <p:cNvPr id="134" name="Google Shape;134;p3"/>
+          <p:cNvSpPr txBox="1"/>
+          <p:nvPr/>
+        </p:nvSpPr>
+        <p:spPr>
+          <a:xfrm>
+            <a:off x="6715796" y="4232015"/>
+            <a:ext cx="4888829" cy="400069"/>
+          </a:xfrm>
+          <a:prstGeom prst="rect">
+            <a:avLst/>
+          </a:prstGeom>
+          <a:noFill/>
+          <a:ln>
+            <a:noFill/>
+          </a:ln>
+        </p:spPr>
+        <p:txBody>
+          <a:bodyPr spcFirstLastPara="1" wrap="square" lIns="91425" tIns="45700" rIns="91425" bIns="45700" anchor="t" anchorCtr="0">
+            <a:spAutoFit/>
+          </a:bodyPr>
+          <a:lstStyle/>
+          <a:p>
+            <a:pPr marL="0" marR="0" lvl="0" indent="0" algn="l" rtl="0">
+              <a:spcBef>
+                <a:spcPts val="0"/>
+              </a:spcBef>
+              <a:spcAft>
+                <a:spcPts val="0"/>
+              </a:spcAft>
+              <a:buNone/>
+            </a:pPr>
+            <a:r>
+              <a:rPr lang="en-US" sz="2000" noProof="0" dirty="0">
+                <a:solidFill>
+                  <a:schemeClr val="lt1"/>
+                </a:solidFill>
+                <a:latin typeface="Roboto"/>
+                <a:ea typeface="Roboto"/>
+                <a:cs typeface="Roboto"/>
+                <a:sym typeface="Roboto"/>
+              </a:rPr>
+              <a:t>Classification &amp; Results</a:t>
+            </a:r>
+          </a:p>
+        </p:txBody>
+      </p:sp>
+      <p:sp>
+        <p:nvSpPr>
+          <p:cNvPr id="135" name="Google Shape;135;p3"/>
+          <p:cNvSpPr txBox="1"/>
+          <p:nvPr/>
+        </p:nvSpPr>
+        <p:spPr>
+          <a:xfrm>
+            <a:off x="6715796" y="5223790"/>
+            <a:ext cx="4888829" cy="400069"/>
+          </a:xfrm>
+          <a:prstGeom prst="rect">
+            <a:avLst/>
+          </a:prstGeom>
+          <a:noFill/>
+          <a:ln>
+            <a:noFill/>
+          </a:ln>
+        </p:spPr>
+        <p:txBody>
+          <a:bodyPr spcFirstLastPara="1" wrap="square" lIns="91425" tIns="45700" rIns="91425" bIns="45700" anchor="t" anchorCtr="0">
+            <a:spAutoFit/>
+          </a:bodyPr>
+          <a:lstStyle/>
+          <a:p>
+            <a:pPr lvl="0"/>
+            <a:r>
+              <a:rPr lang="en-US" sz="2000" noProof="0" dirty="0">
+                <a:solidFill>
+                  <a:schemeClr val="lt1"/>
+                </a:solidFill>
+                <a:latin typeface="Roboto"/>
+                <a:ea typeface="Roboto"/>
+                <a:cs typeface="Roboto"/>
+                <a:sym typeface="Roboto"/>
+              </a:rPr>
+              <a:t>Application &amp; Conclusions</a:t>
+            </a:r>
+          </a:p>
+        </p:txBody>
+      </p:sp>
+    </p:spTree>
+  </p:cSld>
+  <p:clrMapOvr>
+    <a:masterClrMapping/>
+  </p:clrMapOvr>
+</p:sld>
+</file>
+
+<file path=ppt/slides/slide20.xml><?xml version="1.0" encoding="utf-8"?>
 <p:sld xmlns:a="http://schemas.openxmlformats.org/drawingml/2006/main" xmlns:r="http://schemas.openxmlformats.org/officeDocument/2006/relationships" xmlns:p="http://schemas.openxmlformats.org/presentationml/2006/main">
   <p:cSld>
     <p:spTree>
@@ -24315,7 +26433,7 @@
                 <a:ea typeface="Roboto" panose="02000000000000000000" pitchFamily="2" charset="0"/>
                 <a:cs typeface="Roboto" panose="02000000000000000000" pitchFamily="2" charset="0"/>
               </a:rPr>
-              <a:t>AdaBoost</a:t>
+              <a:t>Adaptive Boosting</a:t>
             </a:r>
           </a:p>
           <a:p>
@@ -24494,808 +26612,7 @@
 </p:sld>
 </file>
 
-<file path=ppt/slides/slide2.xml><?xml version="1.0" encoding="utf-8"?>
-<p:sld xmlns:a="http://schemas.openxmlformats.org/drawingml/2006/main" xmlns:r="http://schemas.openxmlformats.org/officeDocument/2006/relationships" xmlns:p="http://schemas.openxmlformats.org/presentationml/2006/main">
-  <p:cSld>
-    <p:bg>
-      <p:bgPr>
-        <a:solidFill>
-          <a:schemeClr val="lt1"/>
-        </a:solidFill>
-        <a:effectLst/>
-      </p:bgPr>
-    </p:bg>
-    <p:spTree>
-      <p:nvGrpSpPr>
-        <p:cNvPr id="1" name="Shape 119"/>
-        <p:cNvGrpSpPr/>
-        <p:nvPr/>
-      </p:nvGrpSpPr>
-      <p:grpSpPr>
-        <a:xfrm>
-          <a:off x="0" y="0"/>
-          <a:ext cx="0" cy="0"/>
-          <a:chOff x="0" y="0"/>
-          <a:chExt cx="0" cy="0"/>
-        </a:xfrm>
-      </p:grpSpPr>
-      <p:sp>
-        <p:nvSpPr>
-          <p:cNvPr id="120" name="Google Shape;120;p3"/>
-          <p:cNvSpPr/>
-          <p:nvPr/>
-        </p:nvSpPr>
-        <p:spPr>
-          <a:xfrm>
-            <a:off x="5422605" y="1981310"/>
-            <a:ext cx="6182020" cy="749596"/>
-          </a:xfrm>
-          <a:prstGeom prst="rect">
-            <a:avLst/>
-          </a:prstGeom>
-          <a:solidFill>
-            <a:schemeClr val="dk2"/>
-          </a:solidFill>
-          <a:ln>
-            <a:noFill/>
-          </a:ln>
-        </p:spPr>
-        <p:txBody>
-          <a:bodyPr spcFirstLastPara="1" wrap="square" lIns="91425" tIns="45700" rIns="91425" bIns="45700" anchor="ctr" anchorCtr="0">
-            <a:noAutofit/>
-          </a:bodyPr>
-          <a:lstStyle/>
-          <a:p>
-            <a:pPr marL="0" marR="0" lvl="0" indent="0" algn="ctr" rtl="0">
-              <a:spcBef>
-                <a:spcPts val="0"/>
-              </a:spcBef>
-              <a:spcAft>
-                <a:spcPts val="0"/>
-              </a:spcAft>
-              <a:buNone/>
-            </a:pPr>
-            <a:endParaRPr lang="en-US" sz="1800" noProof="0" dirty="0">
-              <a:solidFill>
-                <a:schemeClr val="lt1"/>
-              </a:solidFill>
-              <a:latin typeface="Roboto"/>
-              <a:ea typeface="Roboto"/>
-              <a:cs typeface="Roboto"/>
-              <a:sym typeface="Roboto"/>
-            </a:endParaRPr>
-          </a:p>
-        </p:txBody>
-      </p:sp>
-      <p:sp>
-        <p:nvSpPr>
-          <p:cNvPr id="121" name="Google Shape;121;p3"/>
-          <p:cNvSpPr/>
-          <p:nvPr/>
-        </p:nvSpPr>
-        <p:spPr>
-          <a:xfrm>
-            <a:off x="5422605" y="3014839"/>
-            <a:ext cx="6182020" cy="749596"/>
-          </a:xfrm>
-          <a:prstGeom prst="rect">
-            <a:avLst/>
-          </a:prstGeom>
-          <a:solidFill>
-            <a:schemeClr val="dk2"/>
-          </a:solidFill>
-          <a:ln>
-            <a:noFill/>
-          </a:ln>
-        </p:spPr>
-        <p:txBody>
-          <a:bodyPr spcFirstLastPara="1" wrap="square" lIns="91425" tIns="45700" rIns="91425" bIns="45700" anchor="ctr" anchorCtr="0">
-            <a:noAutofit/>
-          </a:bodyPr>
-          <a:lstStyle/>
-          <a:p>
-            <a:pPr marL="0" marR="0" lvl="0" indent="0" algn="ctr" rtl="0">
-              <a:spcBef>
-                <a:spcPts val="0"/>
-              </a:spcBef>
-              <a:spcAft>
-                <a:spcPts val="0"/>
-              </a:spcAft>
-              <a:buNone/>
-            </a:pPr>
-            <a:endParaRPr lang="en-US" sz="1800" noProof="0" dirty="0">
-              <a:solidFill>
-                <a:schemeClr val="lt1"/>
-              </a:solidFill>
-              <a:latin typeface="Roboto"/>
-              <a:ea typeface="Roboto"/>
-              <a:cs typeface="Roboto"/>
-              <a:sym typeface="Roboto"/>
-            </a:endParaRPr>
-          </a:p>
-        </p:txBody>
-      </p:sp>
-      <p:sp>
-        <p:nvSpPr>
-          <p:cNvPr id="122" name="Google Shape;122;p3"/>
-          <p:cNvSpPr/>
-          <p:nvPr/>
-        </p:nvSpPr>
-        <p:spPr>
-          <a:xfrm>
-            <a:off x="5422605" y="4048368"/>
-            <a:ext cx="6182020" cy="749596"/>
-          </a:xfrm>
-          <a:prstGeom prst="rect">
-            <a:avLst/>
-          </a:prstGeom>
-          <a:solidFill>
-            <a:schemeClr val="dk2"/>
-          </a:solidFill>
-          <a:ln>
-            <a:noFill/>
-          </a:ln>
-        </p:spPr>
-        <p:txBody>
-          <a:bodyPr spcFirstLastPara="1" wrap="square" lIns="91425" tIns="45700" rIns="91425" bIns="45700" anchor="ctr" anchorCtr="0">
-            <a:noAutofit/>
-          </a:bodyPr>
-          <a:lstStyle/>
-          <a:p>
-            <a:pPr marL="0" marR="0" lvl="0" indent="0" algn="ctr" rtl="0">
-              <a:spcBef>
-                <a:spcPts val="0"/>
-              </a:spcBef>
-              <a:spcAft>
-                <a:spcPts val="0"/>
-              </a:spcAft>
-              <a:buNone/>
-            </a:pPr>
-            <a:endParaRPr lang="en-US" sz="1800" noProof="0" dirty="0">
-              <a:solidFill>
-                <a:schemeClr val="lt1"/>
-              </a:solidFill>
-              <a:latin typeface="Roboto"/>
-              <a:ea typeface="Roboto"/>
-              <a:cs typeface="Roboto"/>
-              <a:sym typeface="Roboto"/>
-            </a:endParaRPr>
-          </a:p>
-        </p:txBody>
-      </p:sp>
-      <p:sp>
-        <p:nvSpPr>
-          <p:cNvPr id="123" name="Google Shape;123;p3"/>
-          <p:cNvSpPr/>
-          <p:nvPr/>
-        </p:nvSpPr>
-        <p:spPr>
-          <a:xfrm>
-            <a:off x="5422605" y="5081897"/>
-            <a:ext cx="6182020" cy="749596"/>
-          </a:xfrm>
-          <a:prstGeom prst="rect">
-            <a:avLst/>
-          </a:prstGeom>
-          <a:solidFill>
-            <a:schemeClr val="dk2"/>
-          </a:solidFill>
-          <a:ln>
-            <a:noFill/>
-          </a:ln>
-        </p:spPr>
-        <p:txBody>
-          <a:bodyPr spcFirstLastPara="1" wrap="square" lIns="91425" tIns="45700" rIns="91425" bIns="45700" anchor="ctr" anchorCtr="0">
-            <a:noAutofit/>
-          </a:bodyPr>
-          <a:lstStyle/>
-          <a:p>
-            <a:pPr marL="0" marR="0" lvl="0" indent="0" algn="ctr" rtl="0">
-              <a:spcBef>
-                <a:spcPts val="0"/>
-              </a:spcBef>
-              <a:spcAft>
-                <a:spcPts val="0"/>
-              </a:spcAft>
-              <a:buNone/>
-            </a:pPr>
-            <a:endParaRPr lang="en-US" sz="1800" noProof="0" dirty="0">
-              <a:solidFill>
-                <a:schemeClr val="lt1"/>
-              </a:solidFill>
-              <a:latin typeface="Roboto"/>
-              <a:ea typeface="Roboto"/>
-              <a:cs typeface="Roboto"/>
-              <a:sym typeface="Roboto"/>
-            </a:endParaRPr>
-          </a:p>
-        </p:txBody>
-      </p:sp>
-      <p:sp>
-        <p:nvSpPr>
-          <p:cNvPr id="124" name="Google Shape;124;p3"/>
-          <p:cNvSpPr/>
-          <p:nvPr/>
-        </p:nvSpPr>
-        <p:spPr>
-          <a:xfrm>
-            <a:off x="5422605" y="947781"/>
-            <a:ext cx="6182020" cy="749596"/>
-          </a:xfrm>
-          <a:prstGeom prst="rect">
-            <a:avLst/>
-          </a:prstGeom>
-          <a:solidFill>
-            <a:schemeClr val="dk2"/>
-          </a:solidFill>
-          <a:ln>
-            <a:noFill/>
-          </a:ln>
-        </p:spPr>
-        <p:txBody>
-          <a:bodyPr spcFirstLastPara="1" wrap="square" lIns="91425" tIns="45700" rIns="91425" bIns="45700" anchor="ctr" anchorCtr="0">
-            <a:noAutofit/>
-          </a:bodyPr>
-          <a:lstStyle/>
-          <a:p>
-            <a:pPr marL="0" marR="0" lvl="0" indent="0" algn="ctr" rtl="0">
-              <a:spcBef>
-                <a:spcPts val="0"/>
-              </a:spcBef>
-              <a:spcAft>
-                <a:spcPts val="0"/>
-              </a:spcAft>
-              <a:buNone/>
-            </a:pPr>
-            <a:endParaRPr lang="en-US" sz="1800" noProof="0" dirty="0">
-              <a:solidFill>
-                <a:schemeClr val="lt1"/>
-              </a:solidFill>
-              <a:latin typeface="Roboto"/>
-              <a:ea typeface="Roboto"/>
-              <a:cs typeface="Roboto"/>
-              <a:sym typeface="Roboto"/>
-            </a:endParaRPr>
-          </a:p>
-        </p:txBody>
-      </p:sp>
-      <p:sp>
-        <p:nvSpPr>
-          <p:cNvPr id="125" name="Google Shape;125;p3"/>
-          <p:cNvSpPr txBox="1">
-            <a:spLocks noGrp="1"/>
-          </p:cNvSpPr>
-          <p:nvPr>
-            <p:ph type="title"/>
-          </p:nvPr>
-        </p:nvSpPr>
-        <p:spPr>
-          <a:xfrm>
-            <a:off x="587375" y="2988788"/>
-            <a:ext cx="4510026" cy="880422"/>
-          </a:xfrm>
-          <a:prstGeom prst="rect">
-            <a:avLst/>
-          </a:prstGeom>
-          <a:noFill/>
-          <a:ln>
-            <a:noFill/>
-          </a:ln>
-        </p:spPr>
-        <p:txBody>
-          <a:bodyPr spcFirstLastPara="1" wrap="square" lIns="91425" tIns="45700" rIns="91425" bIns="45700" anchor="ctr" anchorCtr="0">
-            <a:normAutofit/>
-          </a:bodyPr>
-          <a:lstStyle/>
-          <a:p>
-            <a:pPr marL="0" lvl="0" indent="0" algn="l" rtl="0">
-              <a:lnSpc>
-                <a:spcPct val="90000"/>
-              </a:lnSpc>
-              <a:spcBef>
-                <a:spcPts val="0"/>
-              </a:spcBef>
-              <a:spcAft>
-                <a:spcPts val="0"/>
-              </a:spcAft>
-              <a:buClr>
-                <a:schemeClr val="dk2"/>
-              </a:buClr>
-              <a:buSzPts val="3200"/>
-              <a:buFont typeface="Roboto Medium"/>
-              <a:buNone/>
-            </a:pPr>
-            <a:r>
-              <a:rPr lang="en-US" sz="3200" b="1" noProof="0" dirty="0">
-                <a:solidFill>
-                  <a:schemeClr val="dk2"/>
-                </a:solidFill>
-                <a:latin typeface="Roboto Medium"/>
-                <a:ea typeface="Roboto Medium"/>
-                <a:cs typeface="Roboto Medium"/>
-                <a:sym typeface="Roboto Medium"/>
-              </a:rPr>
-              <a:t>Table of Contents</a:t>
-            </a:r>
-            <a:endParaRPr lang="en-US" noProof="0" dirty="0"/>
-          </a:p>
-        </p:txBody>
-      </p:sp>
-      <p:sp>
-        <p:nvSpPr>
-          <p:cNvPr id="126" name="Google Shape;126;p3"/>
-          <p:cNvSpPr txBox="1"/>
-          <p:nvPr/>
-        </p:nvSpPr>
-        <p:spPr>
-          <a:xfrm>
-            <a:off x="5854058" y="1091747"/>
-            <a:ext cx="683515" cy="461665"/>
-          </a:xfrm>
-          <a:prstGeom prst="rect">
-            <a:avLst/>
-          </a:prstGeom>
-          <a:noFill/>
-          <a:ln>
-            <a:noFill/>
-          </a:ln>
-        </p:spPr>
-        <p:txBody>
-          <a:bodyPr spcFirstLastPara="1" wrap="square" lIns="91425" tIns="45700" rIns="91425" bIns="45700" anchor="t" anchorCtr="0">
-            <a:spAutoFit/>
-          </a:bodyPr>
-          <a:lstStyle/>
-          <a:p>
-            <a:pPr marL="0" marR="0" lvl="0" indent="0" algn="l" rtl="0">
-              <a:spcBef>
-                <a:spcPts val="0"/>
-              </a:spcBef>
-              <a:spcAft>
-                <a:spcPts val="0"/>
-              </a:spcAft>
-              <a:buNone/>
-            </a:pPr>
-            <a:r>
-              <a:rPr lang="en-US" sz="2400" noProof="0" dirty="0">
-                <a:solidFill>
-                  <a:schemeClr val="lt2"/>
-                </a:solidFill>
-                <a:latin typeface="Roboto"/>
-                <a:ea typeface="Roboto"/>
-                <a:cs typeface="Roboto"/>
-                <a:sym typeface="Roboto"/>
-              </a:rPr>
-              <a:t>I</a:t>
-            </a:r>
-          </a:p>
-        </p:txBody>
-      </p:sp>
-      <p:sp>
-        <p:nvSpPr>
-          <p:cNvPr id="127" name="Google Shape;127;p3"/>
-          <p:cNvSpPr txBox="1"/>
-          <p:nvPr/>
-        </p:nvSpPr>
-        <p:spPr>
-          <a:xfrm>
-            <a:off x="5854058" y="2119441"/>
-            <a:ext cx="683515" cy="461665"/>
-          </a:xfrm>
-          <a:prstGeom prst="rect">
-            <a:avLst/>
-          </a:prstGeom>
-          <a:noFill/>
-          <a:ln>
-            <a:noFill/>
-          </a:ln>
-        </p:spPr>
-        <p:txBody>
-          <a:bodyPr spcFirstLastPara="1" wrap="square" lIns="91425" tIns="45700" rIns="91425" bIns="45700" anchor="t" anchorCtr="0">
-            <a:spAutoFit/>
-          </a:bodyPr>
-          <a:lstStyle/>
-          <a:p>
-            <a:pPr marL="0" marR="0" lvl="0" indent="0" algn="l" rtl="0">
-              <a:spcBef>
-                <a:spcPts val="0"/>
-              </a:spcBef>
-              <a:spcAft>
-                <a:spcPts val="0"/>
-              </a:spcAft>
-              <a:buNone/>
-            </a:pPr>
-            <a:r>
-              <a:rPr lang="en-US" sz="2400" noProof="0" dirty="0">
-                <a:solidFill>
-                  <a:schemeClr val="lt2"/>
-                </a:solidFill>
-                <a:latin typeface="Roboto"/>
-                <a:ea typeface="Roboto"/>
-                <a:cs typeface="Roboto"/>
-                <a:sym typeface="Roboto"/>
-              </a:rPr>
-              <a:t>II</a:t>
-            </a:r>
-          </a:p>
-        </p:txBody>
-      </p:sp>
-      <p:sp>
-        <p:nvSpPr>
-          <p:cNvPr id="128" name="Google Shape;128;p3"/>
-          <p:cNvSpPr txBox="1"/>
-          <p:nvPr/>
-        </p:nvSpPr>
-        <p:spPr>
-          <a:xfrm>
-            <a:off x="5854058" y="3157768"/>
-            <a:ext cx="683515" cy="461665"/>
-          </a:xfrm>
-          <a:prstGeom prst="rect">
-            <a:avLst/>
-          </a:prstGeom>
-          <a:noFill/>
-          <a:ln>
-            <a:noFill/>
-          </a:ln>
-        </p:spPr>
-        <p:txBody>
-          <a:bodyPr spcFirstLastPara="1" wrap="square" lIns="91425" tIns="45700" rIns="91425" bIns="45700" anchor="t" anchorCtr="0">
-            <a:spAutoFit/>
-          </a:bodyPr>
-          <a:lstStyle/>
-          <a:p>
-            <a:pPr marL="0" marR="0" lvl="0" indent="0" algn="l" rtl="0">
-              <a:spcBef>
-                <a:spcPts val="0"/>
-              </a:spcBef>
-              <a:spcAft>
-                <a:spcPts val="0"/>
-              </a:spcAft>
-              <a:buNone/>
-            </a:pPr>
-            <a:r>
-              <a:rPr lang="en-US" sz="2400" noProof="0" dirty="0">
-                <a:solidFill>
-                  <a:schemeClr val="lt2"/>
-                </a:solidFill>
-                <a:latin typeface="Roboto"/>
-                <a:ea typeface="Roboto"/>
-                <a:cs typeface="Roboto"/>
-                <a:sym typeface="Roboto"/>
-              </a:rPr>
-              <a:t>III</a:t>
-            </a:r>
-          </a:p>
-        </p:txBody>
-      </p:sp>
-      <p:sp>
-        <p:nvSpPr>
-          <p:cNvPr id="129" name="Google Shape;129;p3"/>
-          <p:cNvSpPr txBox="1"/>
-          <p:nvPr/>
-        </p:nvSpPr>
-        <p:spPr>
-          <a:xfrm>
-            <a:off x="5854058" y="4232015"/>
-            <a:ext cx="683515" cy="461665"/>
-          </a:xfrm>
-          <a:prstGeom prst="rect">
-            <a:avLst/>
-          </a:prstGeom>
-          <a:noFill/>
-          <a:ln>
-            <a:noFill/>
-          </a:ln>
-        </p:spPr>
-        <p:txBody>
-          <a:bodyPr spcFirstLastPara="1" wrap="square" lIns="91425" tIns="45700" rIns="91425" bIns="45700" anchor="t" anchorCtr="0">
-            <a:spAutoFit/>
-          </a:bodyPr>
-          <a:lstStyle/>
-          <a:p>
-            <a:pPr marL="0" marR="0" lvl="0" indent="0" algn="l" rtl="0">
-              <a:spcBef>
-                <a:spcPts val="0"/>
-              </a:spcBef>
-              <a:spcAft>
-                <a:spcPts val="0"/>
-              </a:spcAft>
-              <a:buNone/>
-            </a:pPr>
-            <a:r>
-              <a:rPr lang="en-US" sz="2400" noProof="0" dirty="0">
-                <a:solidFill>
-                  <a:schemeClr val="lt2"/>
-                </a:solidFill>
-                <a:latin typeface="Roboto"/>
-                <a:ea typeface="Roboto"/>
-                <a:cs typeface="Roboto"/>
-                <a:sym typeface="Roboto"/>
-              </a:rPr>
-              <a:t>IV</a:t>
-            </a:r>
-          </a:p>
-        </p:txBody>
-      </p:sp>
-      <p:sp>
-        <p:nvSpPr>
-          <p:cNvPr id="130" name="Google Shape;130;p3"/>
-          <p:cNvSpPr txBox="1"/>
-          <p:nvPr/>
-        </p:nvSpPr>
-        <p:spPr>
-          <a:xfrm>
-            <a:off x="5854058" y="5223790"/>
-            <a:ext cx="683515" cy="461665"/>
-          </a:xfrm>
-          <a:prstGeom prst="rect">
-            <a:avLst/>
-          </a:prstGeom>
-          <a:noFill/>
-          <a:ln>
-            <a:noFill/>
-          </a:ln>
-        </p:spPr>
-        <p:txBody>
-          <a:bodyPr spcFirstLastPara="1" wrap="square" lIns="91425" tIns="45700" rIns="91425" bIns="45700" anchor="t" anchorCtr="0">
-            <a:spAutoFit/>
-          </a:bodyPr>
-          <a:lstStyle/>
-          <a:p>
-            <a:pPr marL="0" marR="0" lvl="0" indent="0" algn="l" rtl="0">
-              <a:spcBef>
-                <a:spcPts val="0"/>
-              </a:spcBef>
-              <a:spcAft>
-                <a:spcPts val="0"/>
-              </a:spcAft>
-              <a:buNone/>
-            </a:pPr>
-            <a:r>
-              <a:rPr lang="en-US" sz="2400" noProof="0" dirty="0">
-                <a:solidFill>
-                  <a:schemeClr val="lt2"/>
-                </a:solidFill>
-                <a:latin typeface="Roboto"/>
-                <a:ea typeface="Roboto"/>
-                <a:cs typeface="Roboto"/>
-                <a:sym typeface="Roboto"/>
-              </a:rPr>
-              <a:t>V</a:t>
-            </a:r>
-          </a:p>
-        </p:txBody>
-      </p:sp>
-      <p:sp>
-        <p:nvSpPr>
-          <p:cNvPr id="131" name="Google Shape;131;p3"/>
-          <p:cNvSpPr txBox="1"/>
-          <p:nvPr/>
-        </p:nvSpPr>
-        <p:spPr>
-          <a:xfrm>
-            <a:off x="6715796" y="1091747"/>
-            <a:ext cx="4888829" cy="400069"/>
-          </a:xfrm>
-          <a:prstGeom prst="rect">
-            <a:avLst/>
-          </a:prstGeom>
-          <a:noFill/>
-          <a:ln>
-            <a:noFill/>
-          </a:ln>
-        </p:spPr>
-        <p:txBody>
-          <a:bodyPr spcFirstLastPara="1" wrap="square" lIns="91425" tIns="45700" rIns="91425" bIns="45700" anchor="t" anchorCtr="0">
-            <a:spAutoFit/>
-          </a:bodyPr>
-          <a:lstStyle/>
-          <a:p>
-            <a:pPr lvl="0"/>
-            <a:r>
-              <a:rPr lang="en-US" sz="2000" noProof="0" dirty="0">
-                <a:solidFill>
-                  <a:schemeClr val="lt1"/>
-                </a:solidFill>
-                <a:latin typeface="Roboto"/>
-                <a:ea typeface="Roboto"/>
-                <a:cs typeface="Roboto"/>
-                <a:sym typeface="Roboto"/>
-              </a:rPr>
-              <a:t>Motivations and Clinical Background</a:t>
-            </a:r>
-          </a:p>
-        </p:txBody>
-      </p:sp>
-      <p:sp>
-        <p:nvSpPr>
-          <p:cNvPr id="132" name="Google Shape;132;p3"/>
-          <p:cNvSpPr txBox="1"/>
-          <p:nvPr/>
-        </p:nvSpPr>
-        <p:spPr>
-          <a:xfrm>
-            <a:off x="6715796" y="2119441"/>
-            <a:ext cx="4888829" cy="400069"/>
-          </a:xfrm>
-          <a:prstGeom prst="rect">
-            <a:avLst/>
-          </a:prstGeom>
-          <a:noFill/>
-          <a:ln>
-            <a:noFill/>
-          </a:ln>
-        </p:spPr>
-        <p:txBody>
-          <a:bodyPr spcFirstLastPara="1" wrap="square" lIns="91425" tIns="45700" rIns="91425" bIns="45700" anchor="t" anchorCtr="0">
-            <a:spAutoFit/>
-          </a:bodyPr>
-          <a:lstStyle/>
-          <a:p>
-            <a:pPr marL="0" marR="0" lvl="0" indent="0" algn="l" rtl="0">
-              <a:spcBef>
-                <a:spcPts val="0"/>
-              </a:spcBef>
-              <a:spcAft>
-                <a:spcPts val="0"/>
-              </a:spcAft>
-              <a:buNone/>
-            </a:pPr>
-            <a:r>
-              <a:rPr lang="en-US" sz="2000" noProof="0" dirty="0">
-                <a:solidFill>
-                  <a:schemeClr val="lt1"/>
-                </a:solidFill>
-                <a:latin typeface="Roboto"/>
-                <a:ea typeface="Roboto"/>
-                <a:cs typeface="Roboto"/>
-                <a:sym typeface="Roboto"/>
-              </a:rPr>
-              <a:t>Dataset ADNI</a:t>
-            </a:r>
-          </a:p>
-        </p:txBody>
-      </p:sp>
-      <p:sp>
-        <p:nvSpPr>
-          <p:cNvPr id="133" name="Google Shape;133;p3"/>
-          <p:cNvSpPr txBox="1"/>
-          <p:nvPr/>
-        </p:nvSpPr>
-        <p:spPr>
-          <a:xfrm>
-            <a:off x="6715796" y="3157768"/>
-            <a:ext cx="4888829" cy="400069"/>
-          </a:xfrm>
-          <a:prstGeom prst="rect">
-            <a:avLst/>
-          </a:prstGeom>
-          <a:noFill/>
-          <a:ln>
-            <a:noFill/>
-          </a:ln>
-        </p:spPr>
-        <p:txBody>
-          <a:bodyPr spcFirstLastPara="1" wrap="square" lIns="91425" tIns="45700" rIns="91425" bIns="45700" anchor="t" anchorCtr="0">
-            <a:spAutoFit/>
-          </a:bodyPr>
-          <a:lstStyle/>
-          <a:p>
-            <a:pPr lvl="0"/>
-            <a:r>
-              <a:rPr lang="en-US" sz="2000" noProof="0" dirty="0">
-                <a:solidFill>
-                  <a:schemeClr val="lt1"/>
-                </a:solidFill>
-                <a:latin typeface="Roboto"/>
-                <a:ea typeface="Roboto"/>
-                <a:cs typeface="Roboto"/>
-                <a:sym typeface="Roboto"/>
-              </a:rPr>
-              <a:t>Preprocessing</a:t>
-            </a:r>
-          </a:p>
-        </p:txBody>
-      </p:sp>
-      <p:sp>
-        <p:nvSpPr>
-          <p:cNvPr id="134" name="Google Shape;134;p3"/>
-          <p:cNvSpPr txBox="1"/>
-          <p:nvPr/>
-        </p:nvSpPr>
-        <p:spPr>
-          <a:xfrm>
-            <a:off x="6715796" y="4232015"/>
-            <a:ext cx="4888829" cy="400069"/>
-          </a:xfrm>
-          <a:prstGeom prst="rect">
-            <a:avLst/>
-          </a:prstGeom>
-          <a:noFill/>
-          <a:ln>
-            <a:noFill/>
-          </a:ln>
-        </p:spPr>
-        <p:txBody>
-          <a:bodyPr spcFirstLastPara="1" wrap="square" lIns="91425" tIns="45700" rIns="91425" bIns="45700" anchor="t" anchorCtr="0">
-            <a:spAutoFit/>
-          </a:bodyPr>
-          <a:lstStyle/>
-          <a:p>
-            <a:pPr marL="0" marR="0" lvl="0" indent="0" algn="l" rtl="0">
-              <a:spcBef>
-                <a:spcPts val="0"/>
-              </a:spcBef>
-              <a:spcAft>
-                <a:spcPts val="0"/>
-              </a:spcAft>
-              <a:buNone/>
-            </a:pPr>
-            <a:r>
-              <a:rPr lang="en-US" sz="2000" noProof="0" dirty="0">
-                <a:solidFill>
-                  <a:schemeClr val="lt1"/>
-                </a:solidFill>
-                <a:latin typeface="Roboto"/>
-                <a:ea typeface="Roboto"/>
-                <a:cs typeface="Roboto"/>
-                <a:sym typeface="Roboto"/>
-              </a:rPr>
-              <a:t>Classification &amp; Results</a:t>
-            </a:r>
-          </a:p>
-        </p:txBody>
-      </p:sp>
-      <p:sp>
-        <p:nvSpPr>
-          <p:cNvPr id="135" name="Google Shape;135;p3"/>
-          <p:cNvSpPr txBox="1"/>
-          <p:nvPr/>
-        </p:nvSpPr>
-        <p:spPr>
-          <a:xfrm>
-            <a:off x="6715796" y="5223790"/>
-            <a:ext cx="4888829" cy="400069"/>
-          </a:xfrm>
-          <a:prstGeom prst="rect">
-            <a:avLst/>
-          </a:prstGeom>
-          <a:noFill/>
-          <a:ln>
-            <a:noFill/>
-          </a:ln>
-        </p:spPr>
-        <p:txBody>
-          <a:bodyPr spcFirstLastPara="1" wrap="square" lIns="91425" tIns="45700" rIns="91425" bIns="45700" anchor="t" anchorCtr="0">
-            <a:spAutoFit/>
-          </a:bodyPr>
-          <a:lstStyle/>
-          <a:p>
-            <a:pPr lvl="0"/>
-            <a:r>
-              <a:rPr lang="en-US" sz="2000" noProof="0" dirty="0">
-                <a:solidFill>
-                  <a:schemeClr val="lt1"/>
-                </a:solidFill>
-                <a:latin typeface="Roboto"/>
-                <a:ea typeface="Roboto"/>
-                <a:cs typeface="Roboto"/>
-                <a:sym typeface="Roboto"/>
-              </a:rPr>
-              <a:t>Application &amp; Conclusions</a:t>
-            </a:r>
-          </a:p>
-        </p:txBody>
-      </p:sp>
-    </p:spTree>
-  </p:cSld>
-  <p:clrMapOvr>
-    <a:masterClrMapping/>
-  </p:clrMapOvr>
-</p:sld>
-</file>
-
-<file path=ppt/slides/slide20.xml><?xml version="1.0" encoding="utf-8"?>
+<file path=ppt/slides/slide21.xml><?xml version="1.0" encoding="utf-8"?>
 <p:sld xmlns:a="http://schemas.openxmlformats.org/drawingml/2006/main" xmlns:r="http://schemas.openxmlformats.org/officeDocument/2006/relationships" xmlns:p="http://schemas.openxmlformats.org/presentationml/2006/main">
   <p:cSld>
     <p:bg>
@@ -26526,7 +27843,7 @@
 </p:sld>
 </file>
 
-<file path=ppt/slides/slide21.xml><?xml version="1.0" encoding="utf-8"?>
+<file path=ppt/slides/slide22.xml><?xml version="1.0" encoding="utf-8"?>
 <p:sld xmlns:a="http://schemas.openxmlformats.org/drawingml/2006/main" xmlns:r="http://schemas.openxmlformats.org/officeDocument/2006/relationships" xmlns:p="http://schemas.openxmlformats.org/presentationml/2006/main">
   <p:cSld>
     <p:spTree>
@@ -29787,7 +31104,7 @@
                 <a:cs typeface="Roboto Medium"/>
                 <a:sym typeface="Roboto Medium"/>
               </a:rPr>
-              <a:t>Results</a:t>
+              <a:t>Results (on Test set)</a:t>
             </a:r>
             <a:endParaRPr lang="en-US" noProof="0" dirty="0"/>
           </a:p>
@@ -29806,7 +31123,7 @@
 </p:sld>
 </file>
 
-<file path=ppt/slides/slide22.xml><?xml version="1.0" encoding="utf-8"?>
+<file path=ppt/slides/slide23.xml><?xml version="1.0" encoding="utf-8"?>
 <p:sld xmlns:a="http://schemas.openxmlformats.org/drawingml/2006/main" xmlns:r="http://schemas.openxmlformats.org/officeDocument/2006/relationships" xmlns:p="http://schemas.openxmlformats.org/presentationml/2006/main">
   <p:cSld>
     <p:spTree>
@@ -30408,7 +31725,372 @@
 </p:sld>
 </file>
 
-<file path=ppt/slides/slide23.xml><?xml version="1.0" encoding="utf-8"?>
+<file path=ppt/slides/slide24.xml><?xml version="1.0" encoding="utf-8"?>
+<p:sld xmlns:a="http://schemas.openxmlformats.org/drawingml/2006/main" xmlns:r="http://schemas.openxmlformats.org/officeDocument/2006/relationships" xmlns:p="http://schemas.openxmlformats.org/presentationml/2006/main">
+  <p:cSld>
+    <p:spTree>
+      <p:nvGrpSpPr>
+        <p:cNvPr id="1" name=""/>
+        <p:cNvGrpSpPr/>
+        <p:nvPr/>
+      </p:nvGrpSpPr>
+      <p:grpSpPr>
+        <a:xfrm>
+          <a:off x="0" y="0"/>
+          <a:ext cx="0" cy="0"/>
+          <a:chOff x="0" y="0"/>
+          <a:chExt cx="0" cy="0"/>
+        </a:xfrm>
+      </p:grpSpPr>
+      <p:sp>
+        <p:nvSpPr>
+          <p:cNvPr id="4" name="Google Shape;289;p15">
+            <a:extLst>
+              <a:ext uri="{FF2B5EF4-FFF2-40B4-BE49-F238E27FC236}">
+                <a16:creationId xmlns:a16="http://schemas.microsoft.com/office/drawing/2014/main" id="{85B5BE90-94A7-ED97-828F-62481FB36969}"/>
+              </a:ext>
+            </a:extLst>
+          </p:cNvPr>
+          <p:cNvSpPr txBox="1"/>
+          <p:nvPr/>
+        </p:nvSpPr>
+        <p:spPr>
+          <a:xfrm>
+            <a:off x="587376" y="310860"/>
+            <a:ext cx="396136" cy="307777"/>
+          </a:xfrm>
+          <a:prstGeom prst="rect">
+            <a:avLst/>
+          </a:prstGeom>
+          <a:noFill/>
+          <a:ln>
+            <a:noFill/>
+          </a:ln>
+        </p:spPr>
+        <p:txBody>
+          <a:bodyPr spcFirstLastPara="1" wrap="square" lIns="91425" tIns="45700" rIns="91425" bIns="45700" anchor="t" anchorCtr="0">
+            <a:spAutoFit/>
+          </a:bodyPr>
+          <a:lstStyle/>
+          <a:p>
+            <a:pPr marL="0" marR="0" lvl="0" indent="0" algn="l" rtl="0">
+              <a:lnSpc>
+                <a:spcPct val="100000"/>
+              </a:lnSpc>
+              <a:spcBef>
+                <a:spcPts val="0"/>
+              </a:spcBef>
+              <a:spcAft>
+                <a:spcPts val="0"/>
+              </a:spcAft>
+              <a:buClr>
+                <a:schemeClr val="accent1"/>
+              </a:buClr>
+              <a:buSzPts val="1400"/>
+              <a:buFont typeface="Roboto"/>
+              <a:buNone/>
+            </a:pPr>
+            <a:r>
+              <a:rPr lang="en-US" sz="1400" u="none" strike="noStrike" cap="none" noProof="0" dirty="0">
+                <a:solidFill>
+                  <a:schemeClr val="accent1"/>
+                </a:solidFill>
+                <a:latin typeface="Roboto"/>
+                <a:ea typeface="Roboto"/>
+                <a:cs typeface="Roboto"/>
+                <a:sym typeface="Roboto"/>
+              </a:rPr>
+              <a:t>IV</a:t>
+            </a:r>
+          </a:p>
+        </p:txBody>
+      </p:sp>
+      <p:sp>
+        <p:nvSpPr>
+          <p:cNvPr id="5" name="Google Shape;290;p15">
+            <a:extLst>
+              <a:ext uri="{FF2B5EF4-FFF2-40B4-BE49-F238E27FC236}">
+                <a16:creationId xmlns:a16="http://schemas.microsoft.com/office/drawing/2014/main" id="{2DFD7AC6-B23E-8F89-E5E5-9E626693B9E6}"/>
+              </a:ext>
+            </a:extLst>
+          </p:cNvPr>
+          <p:cNvSpPr txBox="1"/>
+          <p:nvPr/>
+        </p:nvSpPr>
+        <p:spPr>
+          <a:xfrm>
+            <a:off x="843555" y="310860"/>
+            <a:ext cx="2356845" cy="307736"/>
+          </a:xfrm>
+          <a:prstGeom prst="rect">
+            <a:avLst/>
+          </a:prstGeom>
+          <a:noFill/>
+          <a:ln>
+            <a:noFill/>
+          </a:ln>
+        </p:spPr>
+        <p:txBody>
+          <a:bodyPr spcFirstLastPara="1" wrap="square" lIns="91425" tIns="45700" rIns="91425" bIns="45700" anchor="t" anchorCtr="0">
+            <a:spAutoFit/>
+          </a:bodyPr>
+          <a:lstStyle/>
+          <a:p>
+            <a:pPr marL="0" marR="0" lvl="0" indent="0" algn="l" rtl="0">
+              <a:lnSpc>
+                <a:spcPct val="100000"/>
+              </a:lnSpc>
+              <a:spcBef>
+                <a:spcPts val="0"/>
+              </a:spcBef>
+              <a:spcAft>
+                <a:spcPts val="0"/>
+              </a:spcAft>
+              <a:buClr>
+                <a:schemeClr val="accent1"/>
+              </a:buClr>
+              <a:buSzPts val="1400"/>
+              <a:buFont typeface="Roboto"/>
+              <a:buNone/>
+            </a:pPr>
+            <a:r>
+              <a:rPr lang="en-US" sz="1400" u="none" strike="noStrike" cap="none" noProof="0" dirty="0">
+                <a:solidFill>
+                  <a:schemeClr val="accent1"/>
+                </a:solidFill>
+                <a:latin typeface="Roboto"/>
+                <a:ea typeface="Roboto"/>
+                <a:cs typeface="Roboto"/>
+                <a:sym typeface="Roboto"/>
+              </a:rPr>
+              <a:t>Classificatio</a:t>
+            </a:r>
+            <a:r>
+              <a:rPr lang="en-US" noProof="0" dirty="0">
+                <a:solidFill>
+                  <a:schemeClr val="accent1"/>
+                </a:solidFill>
+                <a:latin typeface="Roboto"/>
+                <a:ea typeface="Roboto"/>
+                <a:cs typeface="Roboto"/>
+                <a:sym typeface="Roboto"/>
+              </a:rPr>
+              <a:t>n &amp; Results</a:t>
+            </a:r>
+            <a:endParaRPr lang="en-US" sz="1400" u="none" strike="noStrike" cap="none" noProof="0" dirty="0">
+              <a:solidFill>
+                <a:schemeClr val="accent1"/>
+              </a:solidFill>
+              <a:latin typeface="Roboto"/>
+              <a:ea typeface="Roboto"/>
+              <a:cs typeface="Roboto"/>
+              <a:sym typeface="Roboto"/>
+            </a:endParaRPr>
+          </a:p>
+        </p:txBody>
+      </p:sp>
+      <p:pic>
+        <p:nvPicPr>
+          <p:cNvPr id="2050" name="Picture 2" descr="No description has been provided for this image">
+            <a:extLst>
+              <a:ext uri="{FF2B5EF4-FFF2-40B4-BE49-F238E27FC236}">
+                <a16:creationId xmlns:a16="http://schemas.microsoft.com/office/drawing/2014/main" id="{D7FCA212-DAC7-523A-6495-CC5580242D60}"/>
+              </a:ext>
+            </a:extLst>
+          </p:cNvPr>
+          <p:cNvPicPr>
+            <a:picLocks noChangeArrowheads="1"/>
+          </p:cNvPicPr>
+          <p:nvPr/>
+        </p:nvPicPr>
+        <p:blipFill>
+          <a:blip r:embed="rId2">
+            <a:extLst>
+              <a:ext uri="{28A0092B-C50C-407E-A947-70E740481C1C}">
+                <a14:useLocalDpi xmlns:a14="http://schemas.microsoft.com/office/drawing/2010/main" val="0"/>
+              </a:ext>
+            </a:extLst>
+          </a:blip>
+          <a:srcRect/>
+          <a:stretch>
+            <a:fillRect/>
+          </a:stretch>
+        </p:blipFill>
+        <p:spPr bwMode="auto">
+          <a:xfrm>
+            <a:off x="0" y="887296"/>
+            <a:ext cx="3024000" cy="5940000"/>
+          </a:xfrm>
+          <a:prstGeom prst="rect">
+            <a:avLst/>
+          </a:prstGeom>
+          <a:noFill/>
+          <a:extLst>
+            <a:ext uri="{909E8E84-426E-40DD-AFC4-6F175D3DCCD1}">
+              <a14:hiddenFill xmlns:a14="http://schemas.microsoft.com/office/drawing/2010/main">
+                <a:solidFill>
+                  <a:srgbClr val="FFFFFF"/>
+                </a:solidFill>
+              </a14:hiddenFill>
+            </a:ext>
+          </a:extLst>
+        </p:spPr>
+      </p:pic>
+      <p:pic>
+        <p:nvPicPr>
+          <p:cNvPr id="2052" name="Picture 4" descr="No description has been provided for this image">
+            <a:extLst>
+              <a:ext uri="{FF2B5EF4-FFF2-40B4-BE49-F238E27FC236}">
+                <a16:creationId xmlns:a16="http://schemas.microsoft.com/office/drawing/2014/main" id="{1305918A-7335-D13C-6796-BE80D50D3FE4}"/>
+              </a:ext>
+            </a:extLst>
+          </p:cNvPr>
+          <p:cNvPicPr>
+            <a:picLocks noChangeArrowheads="1"/>
+          </p:cNvPicPr>
+          <p:nvPr/>
+        </p:nvPicPr>
+        <p:blipFill>
+          <a:blip r:embed="rId3">
+            <a:extLst>
+              <a:ext uri="{28A0092B-C50C-407E-A947-70E740481C1C}">
+                <a14:useLocalDpi xmlns:a14="http://schemas.microsoft.com/office/drawing/2010/main" val="0"/>
+              </a:ext>
+            </a:extLst>
+          </a:blip>
+          <a:srcRect/>
+          <a:stretch>
+            <a:fillRect/>
+          </a:stretch>
+        </p:blipFill>
+        <p:spPr bwMode="auto">
+          <a:xfrm>
+            <a:off x="3036000" y="887296"/>
+            <a:ext cx="3024000" cy="5940000"/>
+          </a:xfrm>
+          <a:prstGeom prst="rect">
+            <a:avLst/>
+          </a:prstGeom>
+          <a:noFill/>
+          <a:extLst>
+            <a:ext uri="{909E8E84-426E-40DD-AFC4-6F175D3DCCD1}">
+              <a14:hiddenFill xmlns:a14="http://schemas.microsoft.com/office/drawing/2010/main">
+                <a:solidFill>
+                  <a:srgbClr val="FFFFFF"/>
+                </a:solidFill>
+              </a14:hiddenFill>
+            </a:ext>
+          </a:extLst>
+        </p:spPr>
+      </p:pic>
+      <p:pic>
+        <p:nvPicPr>
+          <p:cNvPr id="2054" name="Picture 6" descr="No description has been provided for this image">
+            <a:extLst>
+              <a:ext uri="{FF2B5EF4-FFF2-40B4-BE49-F238E27FC236}">
+                <a16:creationId xmlns:a16="http://schemas.microsoft.com/office/drawing/2014/main" id="{E6E1B67E-E8D2-7F3D-21DB-774810DACA6A}"/>
+              </a:ext>
+            </a:extLst>
+          </p:cNvPr>
+          <p:cNvPicPr>
+            <a:picLocks noChangeArrowheads="1"/>
+          </p:cNvPicPr>
+          <p:nvPr/>
+        </p:nvPicPr>
+        <p:blipFill>
+          <a:blip r:embed="rId4">
+            <a:extLst>
+              <a:ext uri="{28A0092B-C50C-407E-A947-70E740481C1C}">
+                <a14:useLocalDpi xmlns:a14="http://schemas.microsoft.com/office/drawing/2010/main" val="0"/>
+              </a:ext>
+            </a:extLst>
+          </a:blip>
+          <a:srcRect/>
+          <a:stretch>
+            <a:fillRect/>
+          </a:stretch>
+        </p:blipFill>
+        <p:spPr bwMode="auto">
+          <a:xfrm>
+            <a:off x="6096000" y="887296"/>
+            <a:ext cx="3024000" cy="5940000"/>
+          </a:xfrm>
+          <a:prstGeom prst="rect">
+            <a:avLst/>
+          </a:prstGeom>
+          <a:noFill/>
+          <a:extLst>
+            <a:ext uri="{909E8E84-426E-40DD-AFC4-6F175D3DCCD1}">
+              <a14:hiddenFill xmlns:a14="http://schemas.microsoft.com/office/drawing/2010/main">
+                <a:solidFill>
+                  <a:srgbClr val="FFFFFF"/>
+                </a:solidFill>
+              </a14:hiddenFill>
+            </a:ext>
+          </a:extLst>
+        </p:spPr>
+      </p:pic>
+      <p:pic>
+        <p:nvPicPr>
+          <p:cNvPr id="2058" name="Picture 10" descr="No description has been provided for this image">
+            <a:extLst>
+              <a:ext uri="{FF2B5EF4-FFF2-40B4-BE49-F238E27FC236}">
+                <a16:creationId xmlns:a16="http://schemas.microsoft.com/office/drawing/2014/main" id="{866475AF-BDFC-EB5A-F56A-C9C92E0D046C}"/>
+              </a:ext>
+            </a:extLst>
+          </p:cNvPr>
+          <p:cNvPicPr>
+            <a:picLocks noChangeArrowheads="1"/>
+          </p:cNvPicPr>
+          <p:nvPr/>
+        </p:nvPicPr>
+        <p:blipFill>
+          <a:blip r:embed="rId5">
+            <a:extLst>
+              <a:ext uri="{28A0092B-C50C-407E-A947-70E740481C1C}">
+                <a14:useLocalDpi xmlns:a14="http://schemas.microsoft.com/office/drawing/2010/main" val="0"/>
+              </a:ext>
+            </a:extLst>
+          </a:blip>
+          <a:srcRect/>
+          <a:stretch>
+            <a:fillRect/>
+          </a:stretch>
+        </p:blipFill>
+        <p:spPr bwMode="auto">
+          <a:xfrm>
+            <a:off x="9156000" y="887296"/>
+            <a:ext cx="3024000" cy="5940000"/>
+          </a:xfrm>
+          <a:prstGeom prst="rect">
+            <a:avLst/>
+          </a:prstGeom>
+          <a:noFill/>
+          <a:extLst>
+            <a:ext uri="{909E8E84-426E-40DD-AFC4-6F175D3DCCD1}">
+              <a14:hiddenFill xmlns:a14="http://schemas.microsoft.com/office/drawing/2010/main">
+                <a:solidFill>
+                  <a:srgbClr val="FFFFFF"/>
+                </a:solidFill>
+              </a14:hiddenFill>
+            </a:ext>
+          </a:extLst>
+        </p:spPr>
+      </p:pic>
+    </p:spTree>
+    <p:extLst>
+      <p:ext uri="{BB962C8B-B14F-4D97-AF65-F5344CB8AC3E}">
+        <p14:creationId xmlns:p14="http://schemas.microsoft.com/office/powerpoint/2010/main" val="3117423591"/>
+      </p:ext>
+    </p:extLst>
+  </p:cSld>
+  <p:clrMapOvr>
+    <a:masterClrMapping/>
+  </p:clrMapOvr>
+</p:sld>
+</file>
+
+<file path=ppt/slides/slide25.xml><?xml version="1.0" encoding="utf-8"?>
 <p:sld xmlns:a="http://schemas.openxmlformats.org/drawingml/2006/main" xmlns:r="http://schemas.openxmlformats.org/officeDocument/2006/relationships" xmlns:p="http://schemas.openxmlformats.org/presentationml/2006/main">
   <p:cSld>
     <p:spTree>
@@ -33807,7 +35489,7 @@
 </p:sld>
 </file>
 
-<file path=ppt/slides/slide24.xml><?xml version="1.0" encoding="utf-8"?>
+<file path=ppt/slides/slide26.xml><?xml version="1.0" encoding="utf-8"?>
 <p:sld xmlns:a="http://schemas.openxmlformats.org/drawingml/2006/main" xmlns:r="http://schemas.openxmlformats.org/officeDocument/2006/relationships" xmlns:p="http://schemas.openxmlformats.org/presentationml/2006/main">
   <p:cSld>
     <p:bg>
@@ -34131,10 +35813,10 @@
                 <a:cs typeface="Roboto"/>
                 <a:sym typeface="Roboto"/>
               </a:rPr>
-              <a:t>With CDRSB, LDELTOTAL, and mPACCdigit: (DS1, DS2)</a:t>
+              <a:t>With CDRSB, LDELTOTAL, and mPACCdigit: </a:t>
             </a:r>
             <a:br>
-              <a:rPr lang="en-US" sz="1800" noProof="0" dirty="0">
+              <a:rPr lang="en-US" sz="1800" b="1" noProof="0" dirty="0">
                 <a:solidFill>
                   <a:schemeClr val="dk1"/>
                 </a:solidFill>
@@ -34279,7 +35961,43 @@
                 <a:cs typeface="Roboto"/>
                 <a:sym typeface="Roboto"/>
               </a:rPr>
-              <a:t>Without CDRSB, LDELTOTAL, and mPACCdigit: (DS3, DS4)</a:t>
+              <a:t>Without CDRSB, LDELTOTAL, and </a:t>
+            </a:r>
+            <a:r>
+              <a:rPr lang="en-US" sz="1800" b="1" noProof="0" dirty="0" err="1">
+                <a:solidFill>
+                  <a:schemeClr val="dk1"/>
+                </a:solidFill>
+                <a:latin typeface="Roboto"/>
+                <a:ea typeface="Roboto"/>
+                <a:cs typeface="Roboto"/>
+                <a:sym typeface="Roboto"/>
+              </a:rPr>
+              <a:t>mPACCdigit</a:t>
+            </a:r>
+            <a:r>
+              <a:rPr lang="en-US" sz="1800" b="1" noProof="0" dirty="0">
+                <a:solidFill>
+                  <a:schemeClr val="dk1"/>
+                </a:solidFill>
+                <a:latin typeface="Roboto"/>
+                <a:ea typeface="Roboto"/>
+                <a:cs typeface="Roboto"/>
+                <a:sym typeface="Roboto"/>
+              </a:rPr>
+              <a:t>:</a:t>
+            </a:r>
+            <a:r>
+              <a:rPr lang="en-US" sz="1800" b="1" dirty="0">
+                <a:solidFill>
+                  <a:schemeClr val="dk1"/>
+                </a:solidFill>
+                <a:latin typeface="Roboto"/>
+                <a:ea typeface="Roboto"/>
+                <a:cs typeface="Roboto"/>
+                <a:sym typeface="Roboto"/>
+              </a:rPr>
+              <a:t> </a:t>
             </a:r>
             <a:br>
               <a:rPr lang="en-US" sz="1800" b="1" noProof="0" dirty="0">
@@ -34613,7 +36331,7 @@
 </p:sld>
 </file>
 
-<file path=ppt/slides/slide25.xml><?xml version="1.0" encoding="utf-8"?>
+<file path=ppt/slides/slide27.xml><?xml version="1.0" encoding="utf-8"?>
 <p:sld xmlns:a="http://schemas.openxmlformats.org/drawingml/2006/main" xmlns:r="http://schemas.openxmlformats.org/officeDocument/2006/relationships" xmlns:p="http://schemas.openxmlformats.org/presentationml/2006/main">
   <p:cSld>
     <p:bg>
@@ -34714,7 +36432,7 @@
 </p:sld>
 </file>
 
-<file path=ppt/slides/slide26.xml><?xml version="1.0" encoding="utf-8"?>
+<file path=ppt/slides/slide28.xml><?xml version="1.0" encoding="utf-8"?>
 <p:sld xmlns:a="http://schemas.openxmlformats.org/drawingml/2006/main" xmlns:r="http://schemas.openxmlformats.org/officeDocument/2006/relationships" xmlns:p="http://schemas.openxmlformats.org/presentationml/2006/main">
   <p:cSld>
     <p:bg>
@@ -34997,7 +36715,7 @@
         </p:blipFill>
         <p:spPr>
           <a:xfrm>
-            <a:off x="-19839" y="912995"/>
+            <a:off x="-19839" y="885002"/>
             <a:ext cx="6094800" cy="2890800"/>
           </a:xfrm>
           <a:prstGeom prst="rect">
@@ -35027,7 +36745,7 @@
         </p:blipFill>
         <p:spPr>
           <a:xfrm>
-            <a:off x="6105917" y="912995"/>
+            <a:off x="6105917" y="885002"/>
             <a:ext cx="6094800" cy="2890800"/>
           </a:xfrm>
           <a:prstGeom prst="rect">
@@ -35043,7 +36761,7 @@
 </p:sld>
 </file>
 
-<file path=ppt/slides/slide27.xml><?xml version="1.0" encoding="utf-8"?>
+<file path=ppt/slides/slide29.xml><?xml version="1.0" encoding="utf-8"?>
 <p:sld xmlns:a="http://schemas.openxmlformats.org/drawingml/2006/main" xmlns:r="http://schemas.openxmlformats.org/officeDocument/2006/relationships" xmlns:p="http://schemas.openxmlformats.org/presentationml/2006/main">
   <p:cSld>
     <p:bg>
@@ -35377,7 +37095,7 @@
                 <a:cs typeface="Roboto"/>
                 <a:sym typeface="Roboto"/>
               </a:rPr>
-              <a:t>only 2,429 patients, many missing values ​​(CSF, PET), strong dependence on three cognitive scores. Risk of local overfitting, dataset bias, and imputations increasing noise. External validation required.</a:t>
+              <a:t>only 2,419 patients, many missing values ​​(CSF, PET), strong dependence on three cognitive scores. Risk of local overfitting, dataset bias, and imputations increasing noise. External validation required.</a:t>
             </a:r>
           </a:p>
           <a:p>
@@ -35735,7 +37453,91 @@
 </p:sld>
 </file>
 
-<file path=ppt/slides/slide28.xml><?xml version="1.0" encoding="utf-8"?>
+<file path=ppt/slides/slide3.xml><?xml version="1.0" encoding="utf-8"?>
+<p:sld xmlns:a="http://schemas.openxmlformats.org/drawingml/2006/main" xmlns:r="http://schemas.openxmlformats.org/officeDocument/2006/relationships" xmlns:p="http://schemas.openxmlformats.org/presentationml/2006/main">
+  <p:cSld>
+    <p:bg>
+      <p:bgPr>
+        <a:solidFill>
+          <a:schemeClr val="dk2"/>
+        </a:solidFill>
+        <a:effectLst/>
+      </p:bgPr>
+    </p:bg>
+    <p:spTree>
+      <p:nvGrpSpPr>
+        <p:cNvPr id="1" name="Shape 184"/>
+        <p:cNvGrpSpPr/>
+        <p:nvPr/>
+      </p:nvGrpSpPr>
+      <p:grpSpPr>
+        <a:xfrm>
+          <a:off x="0" y="0"/>
+          <a:ext cx="0" cy="0"/>
+          <a:chOff x="0" y="0"/>
+          <a:chExt cx="0" cy="0"/>
+        </a:xfrm>
+      </p:grpSpPr>
+      <p:sp>
+        <p:nvSpPr>
+          <p:cNvPr id="185" name="Google Shape;185;p8"/>
+          <p:cNvSpPr txBox="1">
+            <a:spLocks noGrp="1"/>
+          </p:cNvSpPr>
+          <p:nvPr>
+            <p:ph type="title"/>
+          </p:nvPr>
+        </p:nvSpPr>
+        <p:spPr>
+          <a:xfrm>
+            <a:off x="927616" y="1874143"/>
+            <a:ext cx="10273783" cy="1360669"/>
+          </a:xfrm>
+          <a:prstGeom prst="rect">
+            <a:avLst/>
+          </a:prstGeom>
+          <a:noFill/>
+          <a:ln>
+            <a:noFill/>
+          </a:ln>
+        </p:spPr>
+        <p:txBody>
+          <a:bodyPr spcFirstLastPara="1" wrap="square" lIns="91425" tIns="45700" rIns="91425" bIns="45700" anchor="ctr" anchorCtr="0">
+            <a:noAutofit/>
+          </a:bodyPr>
+          <a:lstStyle/>
+          <a:p>
+            <a:pPr lvl="0" algn="ctr">
+              <a:buClr>
+                <a:schemeClr val="lt1"/>
+              </a:buClr>
+              <a:buSzPts val="3200"/>
+            </a:pPr>
+            <a:r>
+              <a:rPr lang="en-US" sz="4000" b="1" noProof="0" dirty="0">
+                <a:solidFill>
+                  <a:schemeClr val="lt1"/>
+                </a:solidFill>
+                <a:latin typeface="Roboto Medium"/>
+                <a:ea typeface="Roboto Medium"/>
+                <a:cs typeface="Roboto Medium"/>
+                <a:sym typeface="Roboto Medium"/>
+              </a:rPr>
+              <a:t>Motivations and Clinical Background</a:t>
+            </a:r>
+            <a:endParaRPr lang="en-US" sz="4000" noProof="0" dirty="0"/>
+          </a:p>
+        </p:txBody>
+      </p:sp>
+    </p:spTree>
+  </p:cSld>
+  <p:clrMapOvr>
+    <a:masterClrMapping/>
+  </p:clrMapOvr>
+</p:sld>
+</file>
+
+<file path=ppt/slides/slide30.xml><?xml version="1.0" encoding="utf-8"?>
 <p:sld xmlns:a="http://schemas.openxmlformats.org/drawingml/2006/main" xmlns:r="http://schemas.openxmlformats.org/officeDocument/2006/relationships" xmlns:p="http://schemas.openxmlformats.org/presentationml/2006/main">
   <p:cSld>
     <p:bg>
@@ -36839,90 +38641,6 @@
 </p:sld>
 </file>
 
-<file path=ppt/slides/slide3.xml><?xml version="1.0" encoding="utf-8"?>
-<p:sld xmlns:a="http://schemas.openxmlformats.org/drawingml/2006/main" xmlns:r="http://schemas.openxmlformats.org/officeDocument/2006/relationships" xmlns:p="http://schemas.openxmlformats.org/presentationml/2006/main">
-  <p:cSld>
-    <p:bg>
-      <p:bgPr>
-        <a:solidFill>
-          <a:schemeClr val="dk2"/>
-        </a:solidFill>
-        <a:effectLst/>
-      </p:bgPr>
-    </p:bg>
-    <p:spTree>
-      <p:nvGrpSpPr>
-        <p:cNvPr id="1" name="Shape 184"/>
-        <p:cNvGrpSpPr/>
-        <p:nvPr/>
-      </p:nvGrpSpPr>
-      <p:grpSpPr>
-        <a:xfrm>
-          <a:off x="0" y="0"/>
-          <a:ext cx="0" cy="0"/>
-          <a:chOff x="0" y="0"/>
-          <a:chExt cx="0" cy="0"/>
-        </a:xfrm>
-      </p:grpSpPr>
-      <p:sp>
-        <p:nvSpPr>
-          <p:cNvPr id="185" name="Google Shape;185;p8"/>
-          <p:cNvSpPr txBox="1">
-            <a:spLocks noGrp="1"/>
-          </p:cNvSpPr>
-          <p:nvPr>
-            <p:ph type="title"/>
-          </p:nvPr>
-        </p:nvSpPr>
-        <p:spPr>
-          <a:xfrm>
-            <a:off x="927616" y="1874143"/>
-            <a:ext cx="10273783" cy="1360669"/>
-          </a:xfrm>
-          <a:prstGeom prst="rect">
-            <a:avLst/>
-          </a:prstGeom>
-          <a:noFill/>
-          <a:ln>
-            <a:noFill/>
-          </a:ln>
-        </p:spPr>
-        <p:txBody>
-          <a:bodyPr spcFirstLastPara="1" wrap="square" lIns="91425" tIns="45700" rIns="91425" bIns="45700" anchor="ctr" anchorCtr="0">
-            <a:noAutofit/>
-          </a:bodyPr>
-          <a:lstStyle/>
-          <a:p>
-            <a:pPr lvl="0" algn="ctr">
-              <a:buClr>
-                <a:schemeClr val="lt1"/>
-              </a:buClr>
-              <a:buSzPts val="3200"/>
-            </a:pPr>
-            <a:r>
-              <a:rPr lang="en-US" sz="4000" b="1" noProof="0" dirty="0">
-                <a:solidFill>
-                  <a:schemeClr val="lt1"/>
-                </a:solidFill>
-                <a:latin typeface="Roboto Medium"/>
-                <a:ea typeface="Roboto Medium"/>
-                <a:cs typeface="Roboto Medium"/>
-                <a:sym typeface="Roboto Medium"/>
-              </a:rPr>
-              <a:t>Motivations and Clinical Background</a:t>
-            </a:r>
-            <a:endParaRPr lang="en-US" sz="4000" noProof="0" dirty="0"/>
-          </a:p>
-        </p:txBody>
-      </p:sp>
-    </p:spTree>
-  </p:cSld>
-  <p:clrMapOvr>
-    <a:masterClrMapping/>
-  </p:clrMapOvr>
-</p:sld>
-</file>
-
 <file path=ppt/slides/slide4.xml><?xml version="1.0" encoding="utf-8"?>
 <p:sld xmlns:a="http://schemas.openxmlformats.org/drawingml/2006/main" xmlns:r="http://schemas.openxmlformats.org/officeDocument/2006/relationships" xmlns:p="http://schemas.openxmlformats.org/presentationml/2006/main">
   <p:cSld>
@@ -38855,7 +40573,7 @@
                 <a:cs typeface="Roboto"/>
                 <a:sym typeface="Roboto"/>
               </a:rPr>
-              <a:t>16,421 rows x 116 columns. </a:t>
+              <a:t>16,420 rows x 116 columns. </a:t>
             </a:r>
             <a:r>
               <a:rPr lang="en-US" sz="2000" noProof="0" dirty="0"/>

</xml_diff>

<commit_message>
Correction on description of the Project
</commit_message>
<xml_diff>
--- a/Presentation.pptx
+++ b/Presentation.pptx
@@ -317,7 +317,7 @@
       </p15:sldGuideLst>
     </p:ext>
     <p:ext uri="GoogleSlidesCustomDataVersion2">
-      <go:slidesCustomData xmlns:go="http://customooxmlschemas.google.com/" xmlns:ahyp="http://schemas.microsoft.com/office/drawing/2018/hyperlinkcolor" xmlns:p15="http://schemas.microsoft.com/office/powerpoint/2012/main" xmlns:p14="http://schemas.microsoft.com/office/powerpoint/2010/main" xmlns:com="http://schemas.openxmlformats.org/drawingml/2006/compatibility" xmlns:pvml="urn:schemas-microsoft-com:office:powerpoint" xmlns:v="urn:schemas-microsoft-com:vml" xmlns:o="urn:schemas-microsoft-com:office:office" xmlns:dgm="http://schemas.openxmlformats.org/drawingml/2006/diagram" xmlns:c="http://schemas.openxmlformats.org/drawingml/2006/chart" xmlns:mv="urn:schemas-microsoft-com:mac:vml" xmlns:mc="http://schemas.openxmlformats.org/markup-compatibility/2006" xmlns="" r:id="rId43" roundtripDataSignature="AMtx7mjwiTGL8P6MkGzLtFLYmbztPPfd0A=="/>
+      <go:slidesCustomData xmlns="" xmlns:mc="http://schemas.openxmlformats.org/markup-compatibility/2006" xmlns:mv="urn:schemas-microsoft-com:mac:vml" xmlns:c="http://schemas.openxmlformats.org/drawingml/2006/chart" xmlns:dgm="http://schemas.openxmlformats.org/drawingml/2006/diagram" xmlns:o="urn:schemas-microsoft-com:office:office" xmlns:v="urn:schemas-microsoft-com:vml" xmlns:pvml="urn:schemas-microsoft-com:office:powerpoint" xmlns:com="http://schemas.openxmlformats.org/drawingml/2006/compatibility" xmlns:p14="http://schemas.microsoft.com/office/powerpoint/2010/main" xmlns:p15="http://schemas.microsoft.com/office/powerpoint/2012/main" xmlns:ahyp="http://schemas.microsoft.com/office/drawing/2018/hyperlinkcolor" xmlns:go="http://customooxmlschemas.google.com/" r:id="rId43" roundtripDataSignature="AMtx7mjwiTGL8P6MkGzLtFLYmbztPPfd0A=="/>
     </p:ext>
   </p:extLst>
 </p:presentation>
@@ -21302,7 +21302,31 @@
                 <a:cs typeface="Roboto"/>
                 <a:sym typeface="Roboto"/>
               </a:rPr>
-              <a:t>create groups of columns (EcogPt, EcogSP, Cognitive Score, MRI/ICV, CSF/ABETA), apply </a:t>
+              <a:t>create groups of </a:t>
+            </a:r>
+            <a:r>
+              <a:rPr lang="en-US" sz="1800" noProof="0">
+                <a:solidFill>
+                  <a:schemeClr val="dk1"/>
+                </a:solidFill>
+                <a:latin typeface="Roboto"/>
+                <a:ea typeface="Roboto"/>
+                <a:cs typeface="Roboto"/>
+                <a:sym typeface="Roboto"/>
+              </a:rPr>
+              <a:t>columns (Cognitive </a:t>
+            </a:r>
+            <a:r>
+              <a:rPr lang="en-US" sz="1800" noProof="0" dirty="0">
+                <a:solidFill>
+                  <a:schemeClr val="dk1"/>
+                </a:solidFill>
+                <a:latin typeface="Roboto"/>
+                <a:ea typeface="Roboto"/>
+                <a:cs typeface="Roboto"/>
+                <a:sym typeface="Roboto"/>
+              </a:rPr>
+              <a:t>Score, MRI/ICV, CSF/ABETA), apply </a:t>
             </a:r>
             <a:r>
               <a:rPr lang="en-US" sz="1800" i="1" noProof="0" dirty="0">

</xml_diff>

<commit_message>
Grammatical Correction on Documentation
</commit_message>
<xml_diff>
--- a/Presentation.pptx
+++ b/Presentation.pptx
@@ -317,7 +317,7 @@
       </p15:sldGuideLst>
     </p:ext>
     <p:ext uri="GoogleSlidesCustomDataVersion2">
-      <go:slidesCustomData xmlns="" xmlns:mc="http://schemas.openxmlformats.org/markup-compatibility/2006" xmlns:mv="urn:schemas-microsoft-com:mac:vml" xmlns:c="http://schemas.openxmlformats.org/drawingml/2006/chart" xmlns:dgm="http://schemas.openxmlformats.org/drawingml/2006/diagram" xmlns:o="urn:schemas-microsoft-com:office:office" xmlns:v="urn:schemas-microsoft-com:vml" xmlns:pvml="urn:schemas-microsoft-com:office:powerpoint" xmlns:com="http://schemas.openxmlformats.org/drawingml/2006/compatibility" xmlns:p14="http://schemas.microsoft.com/office/powerpoint/2010/main" xmlns:p15="http://schemas.microsoft.com/office/powerpoint/2012/main" xmlns:ahyp="http://schemas.microsoft.com/office/drawing/2018/hyperlinkcolor" xmlns:go="http://customooxmlschemas.google.com/" r:id="rId43" roundtripDataSignature="AMtx7mjwiTGL8P6MkGzLtFLYmbztPPfd0A=="/>
+      <go:slidesCustomData xmlns:go="http://customooxmlschemas.google.com/" xmlns:ahyp="http://schemas.microsoft.com/office/drawing/2018/hyperlinkcolor" xmlns:p15="http://schemas.microsoft.com/office/powerpoint/2012/main" xmlns:p14="http://schemas.microsoft.com/office/powerpoint/2010/main" xmlns:com="http://schemas.openxmlformats.org/drawingml/2006/compatibility" xmlns:pvml="urn:schemas-microsoft-com:office:powerpoint" xmlns:v="urn:schemas-microsoft-com:vml" xmlns:o="urn:schemas-microsoft-com:office:office" xmlns:dgm="http://schemas.openxmlformats.org/drawingml/2006/diagram" xmlns:c="http://schemas.openxmlformats.org/drawingml/2006/chart" xmlns:mv="urn:schemas-microsoft-com:mac:vml" xmlns:mc="http://schemas.openxmlformats.org/markup-compatibility/2006" xmlns="" r:id="rId43" roundtripDataSignature="AMtx7mjwiTGL8P6MkGzLtFLYmbztPPfd0A=="/>
     </p:ext>
   </p:extLst>
 </p:presentation>
@@ -40588,6 +40588,18 @@
               <a:buChar char="•"/>
             </a:pPr>
             <a:r>
+              <a:rPr lang="en-US" sz="2000" b="1" noProof="0">
+                <a:solidFill>
+                  <a:schemeClr val="dk1"/>
+                </a:solidFill>
+                <a:latin typeface="Roboto"/>
+                <a:ea typeface="Roboto"/>
+                <a:cs typeface="Roboto"/>
+                <a:sym typeface="Roboto"/>
+              </a:rPr>
+              <a:t>16,421 </a:t>
+            </a:r>
+            <a:r>
               <a:rPr lang="en-US" sz="2000" b="1" noProof="0" dirty="0">
                 <a:solidFill>
                   <a:schemeClr val="dk1"/>
@@ -40597,7 +40609,7 @@
                 <a:cs typeface="Roboto"/>
                 <a:sym typeface="Roboto"/>
               </a:rPr>
-              <a:t>16,420 rows x 116 columns. </a:t>
+              <a:t>rows x 116 columns. </a:t>
             </a:r>
             <a:r>
               <a:rPr lang="en-US" sz="2000" noProof="0" dirty="0"/>

</xml_diff>